<commit_message>
Rmd and ppt updates
</commit_message>
<xml_diff>
--- a/case_study_1_budweiser.pptx
+++ b/case_study_1_budweiser.pptx
@@ -8,18 +8,19 @@
     <p:sldId id="256" r:id="rId2"/>
     <p:sldId id="257" r:id="rId3"/>
     <p:sldId id="269" r:id="rId4"/>
-    <p:sldId id="261" r:id="rId5"/>
-    <p:sldId id="274" r:id="rId6"/>
-    <p:sldId id="273" r:id="rId7"/>
-    <p:sldId id="263" r:id="rId8"/>
-    <p:sldId id="264" r:id="rId9"/>
-    <p:sldId id="280" r:id="rId10"/>
-    <p:sldId id="276" r:id="rId11"/>
-    <p:sldId id="279" r:id="rId12"/>
-    <p:sldId id="282" r:id="rId13"/>
-    <p:sldId id="281" r:id="rId14"/>
-    <p:sldId id="266" r:id="rId15"/>
-    <p:sldId id="267" r:id="rId16"/>
+    <p:sldId id="284" r:id="rId5"/>
+    <p:sldId id="261" r:id="rId6"/>
+    <p:sldId id="274" r:id="rId7"/>
+    <p:sldId id="273" r:id="rId8"/>
+    <p:sldId id="263" r:id="rId9"/>
+    <p:sldId id="264" r:id="rId10"/>
+    <p:sldId id="280" r:id="rId11"/>
+    <p:sldId id="276" r:id="rId12"/>
+    <p:sldId id="279" r:id="rId13"/>
+    <p:sldId id="282" r:id="rId14"/>
+    <p:sldId id="281" r:id="rId15"/>
+    <p:sldId id="266" r:id="rId16"/>
+    <p:sldId id="267" r:id="rId17"/>
   </p:sldIdLst>
   <p:sldSz cx="9144000" cy="6858000" type="screen4x3"/>
   <p:notesSz cx="6858000" cy="9144000"/>
@@ -3282,10 +3283,10 @@
       </p:cxnSp>
       <p:sp>
         <p:nvSpPr>
-          <p:cNvPr id="8" name="Rectangle 7">
-            <a:extLst>
-              <a:ext uri="{FF2B5EF4-FFF2-40B4-BE49-F238E27FC236}">
-                <a16:creationId xmlns:a16="http://schemas.microsoft.com/office/drawing/2014/main" id="{4B363F80-022E-4602-9A5F-3E374C1947F0}"/>
+          <p:cNvPr id="9" name="Rectangle 8">
+            <a:extLst>
+              <a:ext uri="{FF2B5EF4-FFF2-40B4-BE49-F238E27FC236}">
+                <a16:creationId xmlns:a16="http://schemas.microsoft.com/office/drawing/2014/main" id="{D3662D42-9512-446C-BE69-C03097B0858E}"/>
               </a:ext>
             </a:extLst>
           </p:cNvPr>
@@ -3295,7 +3296,7 @@
         <p:spPr>
           <a:xfrm>
             <a:off x="497711" y="1018454"/>
-            <a:ext cx="8273064" cy="1477328"/>
+            <a:ext cx="8273064" cy="369332"/>
           </a:xfrm>
           <a:prstGeom prst="rect">
             <a:avLst/>
@@ -3309,6 +3310,240 @@
           <a:p>
             <a:r>
               <a:rPr lang="en-US" dirty="0"/>
+              <a:t>IPAs have higher average ABV and IBU than other ales.</a:t>
+            </a:r>
+          </a:p>
+        </p:txBody>
+      </p:sp>
+      <p:pic>
+        <p:nvPicPr>
+          <p:cNvPr id="5122" name="Picture 2">
+            <a:extLst>
+              <a:ext uri="{FF2B5EF4-FFF2-40B4-BE49-F238E27FC236}">
+                <a16:creationId xmlns:a16="http://schemas.microsoft.com/office/drawing/2014/main" id="{8EBF9489-1D18-4EDD-939B-48E6C1C619C8}"/>
+              </a:ext>
+            </a:extLst>
+          </p:cNvPr>
+          <p:cNvPicPr>
+            <a:picLocks noChangeAspect="1" noChangeArrowheads="1"/>
+          </p:cNvPicPr>
+          <p:nvPr/>
+        </p:nvPicPr>
+        <p:blipFill>
+          <a:blip r:embed="rId3">
+            <a:extLst>
+              <a:ext uri="{28A0092B-C50C-407E-A947-70E740481C1C}">
+                <a14:useLocalDpi xmlns:a14="http://schemas.microsoft.com/office/drawing/2010/main" val="0"/>
+              </a:ext>
+            </a:extLst>
+          </a:blip>
+          <a:srcRect/>
+          <a:stretch>
+            <a:fillRect/>
+          </a:stretch>
+        </p:blipFill>
+        <p:spPr bwMode="auto">
+          <a:xfrm>
+            <a:off x="574876" y="1596799"/>
+            <a:ext cx="8273064" cy="4596147"/>
+          </a:xfrm>
+          <a:prstGeom prst="rect">
+            <a:avLst/>
+          </a:prstGeom>
+          <a:noFill/>
+          <a:extLst>
+            <a:ext uri="{909E8E84-426E-40DD-AFC4-6F175D3DCCD1}">
+              <a14:hiddenFill xmlns:a14="http://schemas.microsoft.com/office/drawing/2010/main">
+                <a:solidFill>
+                  <a:srgbClr val="FFFFFF"/>
+                </a:solidFill>
+              </a14:hiddenFill>
+            </a:ext>
+          </a:extLst>
+        </p:spPr>
+      </p:pic>
+    </p:spTree>
+    <p:extLst>
+      <p:ext uri="{BB962C8B-B14F-4D97-AF65-F5344CB8AC3E}">
+        <p14:creationId xmlns:p14="http://schemas.microsoft.com/office/powerpoint/2010/main" val="2445654958"/>
+      </p:ext>
+    </p:extLst>
+  </p:cSld>
+  <p:clrMapOvr>
+    <a:masterClrMapping/>
+  </p:clrMapOvr>
+</p:sld>
+</file>
+
+<file path=ppt/slides/slide11.xml><?xml version="1.0" encoding="utf-8"?>
+<p:sld xmlns:a="http://schemas.openxmlformats.org/drawingml/2006/main" xmlns:r="http://schemas.openxmlformats.org/officeDocument/2006/relationships" xmlns:p="http://schemas.openxmlformats.org/presentationml/2006/main">
+  <p:cSld>
+    <p:spTree>
+      <p:nvGrpSpPr>
+        <p:cNvPr id="1" name=""/>
+        <p:cNvGrpSpPr/>
+        <p:nvPr/>
+      </p:nvGrpSpPr>
+      <p:grpSpPr>
+        <a:xfrm>
+          <a:off x="0" y="0"/>
+          <a:ext cx="0" cy="0"/>
+          <a:chOff x="0" y="0"/>
+          <a:chExt cx="0" cy="0"/>
+        </a:xfrm>
+      </p:grpSpPr>
+      <p:sp>
+        <p:nvSpPr>
+          <p:cNvPr id="2" name="Title 1">
+            <a:extLst>
+              <a:ext uri="{FF2B5EF4-FFF2-40B4-BE49-F238E27FC236}">
+                <a16:creationId xmlns:a16="http://schemas.microsoft.com/office/drawing/2014/main" id="{ED95135E-4283-4599-B850-F011CF9B7C74}"/>
+              </a:ext>
+            </a:extLst>
+          </p:cNvPr>
+          <p:cNvSpPr>
+            <a:spLocks noGrp="1"/>
+          </p:cNvSpPr>
+          <p:nvPr>
+            <p:ph type="title"/>
+          </p:nvPr>
+        </p:nvSpPr>
+        <p:spPr>
+          <a:xfrm>
+            <a:off x="497711" y="336771"/>
+            <a:ext cx="7886700" cy="780398"/>
+          </a:xfrm>
+        </p:spPr>
+        <p:txBody>
+          <a:bodyPr>
+            <a:normAutofit/>
+          </a:bodyPr>
+          <a:lstStyle/>
+          <a:p>
+            <a:r>
+              <a:rPr lang="en-US" sz="2200" dirty="0">
+                <a:solidFill>
+                  <a:schemeClr val="tx1">
+                    <a:lumMod val="65000"/>
+                    <a:lumOff val="35000"/>
+                  </a:schemeClr>
+                </a:solidFill>
+              </a:rPr>
+              <a:t>What is the difference in ABV and IBU between IPAs and other Ales?</a:t>
+            </a:r>
+          </a:p>
+        </p:txBody>
+      </p:sp>
+      <p:pic>
+        <p:nvPicPr>
+          <p:cNvPr id="5" name="Picture 4" descr="A close up of a sign&#10;&#10;Description automatically generated">
+            <a:extLst>
+              <a:ext uri="{FF2B5EF4-FFF2-40B4-BE49-F238E27FC236}">
+                <a16:creationId xmlns:a16="http://schemas.microsoft.com/office/drawing/2014/main" id="{F9271491-99A6-4D00-B738-0E34E6686EFF}"/>
+              </a:ext>
+            </a:extLst>
+          </p:cNvPr>
+          <p:cNvPicPr>
+            <a:picLocks noChangeAspect="1"/>
+          </p:cNvPicPr>
+          <p:nvPr/>
+        </p:nvPicPr>
+        <p:blipFill>
+          <a:blip r:embed="rId2">
+            <a:extLst>
+              <a:ext uri="{28A0092B-C50C-407E-A947-70E740481C1C}">
+                <a14:useLocalDpi xmlns:a14="http://schemas.microsoft.com/office/drawing/2010/main" val="0"/>
+              </a:ext>
+            </a:extLst>
+          </a:blip>
+          <a:stretch>
+            <a:fillRect/>
+          </a:stretch>
+        </p:blipFill>
+        <p:spPr>
+          <a:xfrm>
+            <a:off x="7492438" y="6106511"/>
+            <a:ext cx="1153851" cy="414718"/>
+          </a:xfrm>
+          <a:prstGeom prst="rect">
+            <a:avLst/>
+          </a:prstGeom>
+        </p:spPr>
+      </p:pic>
+      <p:cxnSp>
+        <p:nvCxnSpPr>
+          <p:cNvPr id="7" name="Straight Connector 6">
+            <a:extLst>
+              <a:ext uri="{FF2B5EF4-FFF2-40B4-BE49-F238E27FC236}">
+                <a16:creationId xmlns:a16="http://schemas.microsoft.com/office/drawing/2014/main" id="{754C5E05-D462-4273-82D1-C656D562E12C}"/>
+              </a:ext>
+            </a:extLst>
+          </p:cNvPr>
+          <p:cNvCxnSpPr>
+            <a:cxnSpLocks/>
+          </p:cNvCxnSpPr>
+          <p:nvPr/>
+        </p:nvCxnSpPr>
+        <p:spPr>
+          <a:xfrm>
+            <a:off x="574876" y="945266"/>
+            <a:ext cx="8071413" cy="0"/>
+          </a:xfrm>
+          <a:prstGeom prst="line">
+            <a:avLst/>
+          </a:prstGeom>
+          <a:ln>
+            <a:solidFill>
+              <a:schemeClr val="bg2">
+                <a:lumMod val="75000"/>
+              </a:schemeClr>
+            </a:solidFill>
+          </a:ln>
+        </p:spPr>
+        <p:style>
+          <a:lnRef idx="1">
+            <a:schemeClr val="accent6"/>
+          </a:lnRef>
+          <a:fillRef idx="0">
+            <a:schemeClr val="accent6"/>
+          </a:fillRef>
+          <a:effectRef idx="0">
+            <a:schemeClr val="accent6"/>
+          </a:effectRef>
+          <a:fontRef idx="minor">
+            <a:schemeClr val="tx1"/>
+          </a:fontRef>
+        </p:style>
+      </p:cxnSp>
+      <p:sp>
+        <p:nvSpPr>
+          <p:cNvPr id="8" name="Rectangle 7">
+            <a:extLst>
+              <a:ext uri="{FF2B5EF4-FFF2-40B4-BE49-F238E27FC236}">
+                <a16:creationId xmlns:a16="http://schemas.microsoft.com/office/drawing/2014/main" id="{4B363F80-022E-4602-9A5F-3E374C1947F0}"/>
+              </a:ext>
+            </a:extLst>
+          </p:cNvPr>
+          <p:cNvSpPr/>
+          <p:nvPr/>
+        </p:nvSpPr>
+        <p:spPr>
+          <a:xfrm>
+            <a:off x="497711" y="1018454"/>
+            <a:ext cx="8273064" cy="1477328"/>
+          </a:xfrm>
+          <a:prstGeom prst="rect">
+            <a:avLst/>
+          </a:prstGeom>
+        </p:spPr>
+        <p:txBody>
+          <a:bodyPr wrap="square">
+            <a:spAutoFit/>
+          </a:bodyPr>
+          <a:lstStyle/>
+          <a:p>
+            <a:r>
+              <a:rPr lang="en-US" dirty="0"/>
               <a:t>Using K-Nearest Neighbors machine learning classification on a training and test dataset, the model can predict whether a beer is an IPA or an other ale based on its ABV and IBU values with an accuracy of 85.16%.</a:t>
             </a:r>
           </a:p>
@@ -3335,13 +3570,13 @@
           <p:nvPr>
             <p:extLst>
               <p:ext uri="{D42A27DB-BD31-4B8C-83A1-F6EECF244321}">
-                <p14:modId xmlns:p14="http://schemas.microsoft.com/office/powerpoint/2010/main" val="1918783648"/>
+                <p14:modId xmlns:p14="http://schemas.microsoft.com/office/powerpoint/2010/main" val="2607709015"/>
               </p:ext>
             </p:extLst>
           </p:nvPr>
         </p:nvGraphicFramePr>
         <p:xfrm>
-          <a:off x="574876" y="2124930"/>
+          <a:off x="918808" y="2246765"/>
           <a:ext cx="5703081" cy="1232183"/>
         </p:xfrm>
         <a:graphic>
@@ -3582,7 +3817,7 @@
         </p:nvSpPr>
         <p:spPr>
           <a:xfrm rot="16200000">
-            <a:off x="-316235" y="2569055"/>
+            <a:off x="-49467" y="2690890"/>
             <a:ext cx="1438290" cy="343932"/>
           </a:xfrm>
           <a:prstGeom prst="rect">
@@ -3618,7 +3853,7 @@
         </p:nvSpPr>
         <p:spPr>
           <a:xfrm>
-            <a:off x="574876" y="3943350"/>
+            <a:off x="497711" y="3943350"/>
             <a:ext cx="7626149" cy="646331"/>
           </a:xfrm>
           <a:prstGeom prst="rect">
@@ -3634,7 +3869,7 @@
           <a:p>
             <a:r>
               <a:rPr lang="en-US" dirty="0"/>
-              <a:t>There are 241 craft beers that are classified accurately and 42 craft beers are misclassified. </a:t>
+              <a:t>There are 241 craft beers that are classified accurately, and 42 craft beers are misclassified. </a:t>
             </a:r>
           </a:p>
         </p:txBody>
@@ -3643,202 +3878,6 @@
     <p:extLst>
       <p:ext uri="{BB962C8B-B14F-4D97-AF65-F5344CB8AC3E}">
         <p14:creationId xmlns:p14="http://schemas.microsoft.com/office/powerpoint/2010/main" val="3882199973"/>
-      </p:ext>
-    </p:extLst>
-  </p:cSld>
-  <p:clrMapOvr>
-    <a:masterClrMapping/>
-  </p:clrMapOvr>
-</p:sld>
-</file>
-
-<file path=ppt/slides/slide11.xml><?xml version="1.0" encoding="utf-8"?>
-<p:sld xmlns:a="http://schemas.openxmlformats.org/drawingml/2006/main" xmlns:r="http://schemas.openxmlformats.org/officeDocument/2006/relationships" xmlns:p="http://schemas.openxmlformats.org/presentationml/2006/main">
-  <p:cSld>
-    <p:spTree>
-      <p:nvGrpSpPr>
-        <p:cNvPr id="1" name=""/>
-        <p:cNvGrpSpPr/>
-        <p:nvPr/>
-      </p:nvGrpSpPr>
-      <p:grpSpPr>
-        <a:xfrm>
-          <a:off x="0" y="0"/>
-          <a:ext cx="0" cy="0"/>
-          <a:chOff x="0" y="0"/>
-          <a:chExt cx="0" cy="0"/>
-        </a:xfrm>
-      </p:grpSpPr>
-      <p:sp>
-        <p:nvSpPr>
-          <p:cNvPr id="2" name="Title 1">
-            <a:extLst>
-              <a:ext uri="{FF2B5EF4-FFF2-40B4-BE49-F238E27FC236}">
-                <a16:creationId xmlns:a16="http://schemas.microsoft.com/office/drawing/2014/main" id="{ED95135E-4283-4599-B850-F011CF9B7C74}"/>
-              </a:ext>
-            </a:extLst>
-          </p:cNvPr>
-          <p:cNvSpPr>
-            <a:spLocks noGrp="1"/>
-          </p:cNvSpPr>
-          <p:nvPr>
-            <p:ph type="title"/>
-          </p:nvPr>
-        </p:nvSpPr>
-        <p:spPr>
-          <a:xfrm>
-            <a:off x="497711" y="336771"/>
-            <a:ext cx="7886700" cy="780398"/>
-          </a:xfrm>
-        </p:spPr>
-        <p:txBody>
-          <a:bodyPr>
-            <a:normAutofit/>
-          </a:bodyPr>
-          <a:lstStyle/>
-          <a:p>
-            <a:r>
-              <a:rPr lang="en-US" sz="2200" dirty="0">
-                <a:solidFill>
-                  <a:schemeClr val="tx1">
-                    <a:lumMod val="65000"/>
-                    <a:lumOff val="35000"/>
-                  </a:schemeClr>
-                </a:solidFill>
-              </a:rPr>
-              <a:t>What is the difference in ABV and IBU between IPAs and other Ales?</a:t>
-            </a:r>
-          </a:p>
-        </p:txBody>
-      </p:sp>
-      <p:pic>
-        <p:nvPicPr>
-          <p:cNvPr id="5" name="Picture 4" descr="A close up of a sign&#10;&#10;Description automatically generated">
-            <a:extLst>
-              <a:ext uri="{FF2B5EF4-FFF2-40B4-BE49-F238E27FC236}">
-                <a16:creationId xmlns:a16="http://schemas.microsoft.com/office/drawing/2014/main" id="{F9271491-99A6-4D00-B738-0E34E6686EFF}"/>
-              </a:ext>
-            </a:extLst>
-          </p:cNvPr>
-          <p:cNvPicPr>
-            <a:picLocks noChangeAspect="1"/>
-          </p:cNvPicPr>
-          <p:nvPr/>
-        </p:nvPicPr>
-        <p:blipFill>
-          <a:blip r:embed="rId2">
-            <a:extLst>
-              <a:ext uri="{28A0092B-C50C-407E-A947-70E740481C1C}">
-                <a14:useLocalDpi xmlns:a14="http://schemas.microsoft.com/office/drawing/2010/main" val="0"/>
-              </a:ext>
-            </a:extLst>
-          </a:blip>
-          <a:stretch>
-            <a:fillRect/>
-          </a:stretch>
-        </p:blipFill>
-        <p:spPr>
-          <a:xfrm>
-            <a:off x="7492438" y="6106511"/>
-            <a:ext cx="1153851" cy="414718"/>
-          </a:xfrm>
-          <a:prstGeom prst="rect">
-            <a:avLst/>
-          </a:prstGeom>
-        </p:spPr>
-      </p:pic>
-      <p:cxnSp>
-        <p:nvCxnSpPr>
-          <p:cNvPr id="7" name="Straight Connector 6">
-            <a:extLst>
-              <a:ext uri="{FF2B5EF4-FFF2-40B4-BE49-F238E27FC236}">
-                <a16:creationId xmlns:a16="http://schemas.microsoft.com/office/drawing/2014/main" id="{754C5E05-D462-4273-82D1-C656D562E12C}"/>
-              </a:ext>
-            </a:extLst>
-          </p:cNvPr>
-          <p:cNvCxnSpPr>
-            <a:cxnSpLocks/>
-          </p:cNvCxnSpPr>
-          <p:nvPr/>
-        </p:nvCxnSpPr>
-        <p:spPr>
-          <a:xfrm>
-            <a:off x="574876" y="945266"/>
-            <a:ext cx="8071413" cy="0"/>
-          </a:xfrm>
-          <a:prstGeom prst="line">
-            <a:avLst/>
-          </a:prstGeom>
-          <a:ln>
-            <a:solidFill>
-              <a:schemeClr val="bg2">
-                <a:lumMod val="75000"/>
-              </a:schemeClr>
-            </a:solidFill>
-          </a:ln>
-        </p:spPr>
-        <p:style>
-          <a:lnRef idx="1">
-            <a:schemeClr val="accent6"/>
-          </a:lnRef>
-          <a:fillRef idx="0">
-            <a:schemeClr val="accent6"/>
-          </a:fillRef>
-          <a:effectRef idx="0">
-            <a:schemeClr val="accent6"/>
-          </a:effectRef>
-          <a:fontRef idx="minor">
-            <a:schemeClr val="tx1"/>
-          </a:fontRef>
-        </p:style>
-      </p:cxnSp>
-      <p:sp>
-        <p:nvSpPr>
-          <p:cNvPr id="3" name="Rectangle 2">
-            <a:extLst>
-              <a:ext uri="{FF2B5EF4-FFF2-40B4-BE49-F238E27FC236}">
-                <a16:creationId xmlns:a16="http://schemas.microsoft.com/office/drawing/2014/main" id="{6337412A-3C1B-4CB0-9026-C0FA00BC1378}"/>
-              </a:ext>
-            </a:extLst>
-          </p:cNvPr>
-          <p:cNvSpPr/>
-          <p:nvPr/>
-        </p:nvSpPr>
-        <p:spPr>
-          <a:xfrm>
-            <a:off x="497711" y="1184613"/>
-            <a:ext cx="8503414" cy="2308324"/>
-          </a:xfrm>
-          <a:prstGeom prst="rect">
-            <a:avLst/>
-          </a:prstGeom>
-        </p:spPr>
-        <p:txBody>
-          <a:bodyPr wrap="square">
-            <a:spAutoFit/>
-          </a:bodyPr>
-          <a:lstStyle/>
-          <a:p>
-            <a:r>
-              <a:rPr lang="en-US" dirty="0"/>
-              <a:t>We used Welch two sample t-test to test for the mean differences of ABV/IBU between IPAs and Ales. At alpha=.05 level of significance, there is sufficient evidence to suggest that the mean ABV/IBU of IPAs is significantly different from the mean ABV/IBU of Ales (p-value &lt;2.2e-16).</a:t>
-            </a:r>
-          </a:p>
-          <a:p>
-            <a:r>
-              <a:rPr lang="en-US" dirty="0"/>
-              <a:t>We are 95% confident that the mean differences in ABV stay within (0.011, 0.014) and the mean differences in IBU stay within (35.16, 40.07) between IPAs and other Ales groups.</a:t>
-            </a:r>
-          </a:p>
-          <a:p>
-            <a:endParaRPr lang="en-US" dirty="0"/>
-          </a:p>
-        </p:txBody>
-      </p:sp>
-    </p:spTree>
-    <p:extLst>
-      <p:ext uri="{BB962C8B-B14F-4D97-AF65-F5344CB8AC3E}">
-        <p14:creationId xmlns:p14="http://schemas.microsoft.com/office/powerpoint/2010/main" val="2794249314"/>
       </p:ext>
     </p:extLst>
   </p:cSld>
@@ -3988,46 +4027,56 @@
           </a:fontRef>
         </p:style>
       </p:cxnSp>
-      <p:pic>
-        <p:nvPicPr>
-          <p:cNvPr id="6" name="Picture 5">
-            <a:extLst>
-              <a:ext uri="{FF2B5EF4-FFF2-40B4-BE49-F238E27FC236}">
-                <a16:creationId xmlns:a16="http://schemas.microsoft.com/office/drawing/2014/main" id="{7421F4E0-AE3E-4AA0-9322-869444E8AB26}"/>
-              </a:ext>
-            </a:extLst>
-          </p:cNvPr>
-          <p:cNvPicPr>
-            <a:picLocks noChangeAspect="1"/>
-          </p:cNvPicPr>
+      <p:sp>
+        <p:nvSpPr>
+          <p:cNvPr id="3" name="Rectangle 2">
+            <a:extLst>
+              <a:ext uri="{FF2B5EF4-FFF2-40B4-BE49-F238E27FC236}">
+                <a16:creationId xmlns:a16="http://schemas.microsoft.com/office/drawing/2014/main" id="{6337412A-3C1B-4CB0-9026-C0FA00BC1378}"/>
+              </a:ext>
+            </a:extLst>
+          </p:cNvPr>
+          <p:cNvSpPr/>
           <p:nvPr/>
-        </p:nvPicPr>
-        <p:blipFill>
-          <a:blip r:embed="rId3">
-            <a:extLst>
-              <a:ext uri="{28A0092B-C50C-407E-A947-70E740481C1C}">
-                <a14:useLocalDpi xmlns:a14="http://schemas.microsoft.com/office/drawing/2010/main" val="0"/>
-              </a:ext>
-            </a:extLst>
-          </a:blip>
-          <a:stretch>
-            <a:fillRect/>
-          </a:stretch>
-        </p:blipFill>
-        <p:spPr>
-          <a:xfrm>
-            <a:off x="0" y="945266"/>
-            <a:ext cx="9144000" cy="4179181"/>
+        </p:nvSpPr>
+        <p:spPr>
+          <a:xfrm>
+            <a:off x="497711" y="1184613"/>
+            <a:ext cx="8503414" cy="2585323"/>
           </a:xfrm>
           <a:prstGeom prst="rect">
             <a:avLst/>
           </a:prstGeom>
         </p:spPr>
-      </p:pic>
+        <p:txBody>
+          <a:bodyPr wrap="square">
+            <a:spAutoFit/>
+          </a:bodyPr>
+          <a:lstStyle/>
+          <a:p>
+            <a:r>
+              <a:rPr lang="en-US" dirty="0"/>
+              <a:t>We used Welch two sample t-test to test for the mean differences of ABV/IBU between IPAs and Ales. At alpha=.05 level of significance, there is sufficient evidence to suggest that the mean ABV/IBU of IPAs is significantly different from the mean ABV/IBU of Ales (p-value &lt;2.2e-16).</a:t>
+            </a:r>
+          </a:p>
+          <a:p>
+            <a:endParaRPr lang="en-US" dirty="0"/>
+          </a:p>
+          <a:p>
+            <a:r>
+              <a:rPr lang="en-US" dirty="0"/>
+              <a:t>We are 95% confident that the mean differences in ABV stay within (0.011, 0.014) and the mean differences in IBU stay within (35.16, 40.07) between IPAs and other Ales groups.</a:t>
+            </a:r>
+          </a:p>
+          <a:p>
+            <a:endParaRPr lang="en-US" dirty="0"/>
+          </a:p>
+        </p:txBody>
+      </p:sp>
     </p:spTree>
     <p:extLst>
       <p:ext uri="{BB962C8B-B14F-4D97-AF65-F5344CB8AC3E}">
-        <p14:creationId xmlns:p14="http://schemas.microsoft.com/office/powerpoint/2010/main" val="343221352"/>
+        <p14:creationId xmlns:p14="http://schemas.microsoft.com/office/powerpoint/2010/main" val="2794249314"/>
       </p:ext>
     </p:extLst>
   </p:cSld>
@@ -4177,83 +4226,57 @@
           </a:fontRef>
         </p:style>
       </p:cxnSp>
-      <p:sp>
-        <p:nvSpPr>
-          <p:cNvPr id="3" name="Rectangle 2">
-            <a:extLst>
-              <a:ext uri="{FF2B5EF4-FFF2-40B4-BE49-F238E27FC236}">
-                <a16:creationId xmlns:a16="http://schemas.microsoft.com/office/drawing/2014/main" id="{6337412A-3C1B-4CB0-9026-C0FA00BC1378}"/>
-              </a:ext>
-            </a:extLst>
-          </p:cNvPr>
-          <p:cNvSpPr/>
+      <p:pic>
+        <p:nvPicPr>
+          <p:cNvPr id="6146" name="Picture 2">
+            <a:extLst>
+              <a:ext uri="{FF2B5EF4-FFF2-40B4-BE49-F238E27FC236}">
+                <a16:creationId xmlns:a16="http://schemas.microsoft.com/office/drawing/2014/main" id="{3848A575-D9B8-41D6-971F-14F1BC85DA8D}"/>
+              </a:ext>
+            </a:extLst>
+          </p:cNvPr>
+          <p:cNvPicPr>
+            <a:picLocks noChangeAspect="1" noChangeArrowheads="1"/>
+          </p:cNvPicPr>
           <p:nvPr/>
-        </p:nvSpPr>
-        <p:spPr>
-          <a:xfrm>
-            <a:off x="497711" y="1184613"/>
-            <a:ext cx="8503414" cy="646331"/>
+        </p:nvPicPr>
+        <p:blipFill>
+          <a:blip r:embed="rId3">
+            <a:extLst>
+              <a:ext uri="{28A0092B-C50C-407E-A947-70E740481C1C}">
+                <a14:useLocalDpi xmlns:a14="http://schemas.microsoft.com/office/drawing/2010/main" val="0"/>
+              </a:ext>
+            </a:extLst>
+          </a:blip>
+          <a:srcRect/>
+          <a:stretch>
+            <a:fillRect/>
+          </a:stretch>
+        </p:blipFill>
+        <p:spPr bwMode="auto">
+          <a:xfrm>
+            <a:off x="371455" y="1230999"/>
+            <a:ext cx="8508555" cy="4254278"/>
           </a:xfrm>
           <a:prstGeom prst="rect">
             <a:avLst/>
           </a:prstGeom>
-        </p:spPr>
-        <p:txBody>
-          <a:bodyPr wrap="square">
-            <a:spAutoFit/>
-          </a:bodyPr>
-          <a:lstStyle/>
-          <a:p>
-            <a:r>
-              <a:rPr lang="en-US" dirty="0"/>
-              <a:t>This model’s prediction Budweiser (ABV = .05, IBU = 12) is Ale with 100% probability when the model uses 5 of the nearest neighbors.</a:t>
-            </a:r>
-          </a:p>
-        </p:txBody>
-      </p:sp>
-      <p:sp>
-        <p:nvSpPr>
-          <p:cNvPr id="8" name="Rectangle 7">
-            <a:extLst>
-              <a:ext uri="{FF2B5EF4-FFF2-40B4-BE49-F238E27FC236}">
-                <a16:creationId xmlns:a16="http://schemas.microsoft.com/office/drawing/2014/main" id="{A119875C-4A68-49E9-909A-36DDE19C73F4}"/>
-              </a:ext>
-            </a:extLst>
-          </p:cNvPr>
-          <p:cNvSpPr/>
-          <p:nvPr/>
-        </p:nvSpPr>
-        <p:spPr>
-          <a:xfrm>
-            <a:off x="574876" y="2691396"/>
-            <a:ext cx="8503414" cy="369332"/>
-          </a:xfrm>
-          <a:prstGeom prst="rect">
-            <a:avLst/>
-          </a:prstGeom>
-        </p:spPr>
-        <p:txBody>
-          <a:bodyPr wrap="square">
-            <a:spAutoFit/>
-          </a:bodyPr>
-          <a:lstStyle/>
-          <a:p>
-            <a:pPr algn="ctr"/>
-            <a:r>
-              <a:rPr lang="en-US" dirty="0">
+          <a:noFill/>
+          <a:extLst>
+            <a:ext uri="{909E8E84-426E-40DD-AFC4-6F175D3DCCD1}">
+              <a14:hiddenFill xmlns:a14="http://schemas.microsoft.com/office/drawing/2010/main">
                 <a:solidFill>
-                  <a:srgbClr val="C00000"/>
+                  <a:srgbClr val="FFFFFF"/>
                 </a:solidFill>
-              </a:rPr>
-              <a:t>[insert decision boundary chart]</a:t>
-            </a:r>
-          </a:p>
-        </p:txBody>
-      </p:sp>
+              </a14:hiddenFill>
+            </a:ext>
+          </a:extLst>
+        </p:spPr>
+      </p:pic>
     </p:spTree>
     <p:extLst>
       <p:ext uri="{BB962C8B-B14F-4D97-AF65-F5344CB8AC3E}">
-        <p14:creationId xmlns:p14="http://schemas.microsoft.com/office/powerpoint/2010/main" val="3754363430"/>
+        <p14:creationId xmlns:p14="http://schemas.microsoft.com/office/powerpoint/2010/main" val="343221352"/>
       </p:ext>
     </p:extLst>
   </p:cSld>
@@ -4317,56 +4340,8 @@
                   </a:schemeClr>
                 </a:solidFill>
               </a:rPr>
-              <a:t>Possible States for Budweiser to open a new brewery</a:t>
-            </a:r>
-          </a:p>
-        </p:txBody>
-      </p:sp>
-      <p:sp>
-        <p:nvSpPr>
-          <p:cNvPr id="3" name="Content Placeholder 2">
-            <a:extLst>
-              <a:ext uri="{FF2B5EF4-FFF2-40B4-BE49-F238E27FC236}">
-                <a16:creationId xmlns:a16="http://schemas.microsoft.com/office/drawing/2014/main" id="{2DD55975-366F-4C51-B7D6-EEAFD411A8C3}"/>
-              </a:ext>
-            </a:extLst>
-          </p:cNvPr>
-          <p:cNvSpPr>
-            <a:spLocks noGrp="1"/>
-          </p:cNvSpPr>
-          <p:nvPr>
-            <p:ph idx="1"/>
-          </p:nvPr>
-        </p:nvSpPr>
-        <p:spPr>
-          <a:xfrm>
-            <a:off x="574876" y="1162010"/>
-            <a:ext cx="7886700" cy="4351338"/>
-          </a:xfrm>
-        </p:spPr>
-        <p:txBody>
-          <a:bodyPr/>
-          <a:lstStyle/>
-          <a:p>
-            <a:pPr marL="0" indent="0">
-              <a:spcAft>
-                <a:spcPts val="600"/>
-              </a:spcAft>
-              <a:buNone/>
-            </a:pPr>
-            <a:r>
-              <a:rPr lang="en-US" sz="1600" dirty="0"/>
-              <a:t>Budweiser might consider opening new breweries in X, Y, Z states based on ABV and IBU within those states.</a:t>
-            </a:r>
-          </a:p>
-          <a:p>
-            <a:endParaRPr lang="en-US" sz="1600" dirty="0"/>
-          </a:p>
-          <a:p>
-            <a:pPr marL="0" indent="0">
-              <a:buNone/>
-            </a:pPr>
-            <a:endParaRPr lang="en-US" dirty="0"/>
+              <a:t>What is the difference in ABV and IBU between IPAs and other Ales?</a:t>
+            </a:r>
           </a:p>
         </p:txBody>
       </p:sp>
@@ -4453,6 +4428,280 @@
       </p:cxnSp>
       <p:sp>
         <p:nvSpPr>
+          <p:cNvPr id="3" name="Rectangle 2">
+            <a:extLst>
+              <a:ext uri="{FF2B5EF4-FFF2-40B4-BE49-F238E27FC236}">
+                <a16:creationId xmlns:a16="http://schemas.microsoft.com/office/drawing/2014/main" id="{6337412A-3C1B-4CB0-9026-C0FA00BC1378}"/>
+              </a:ext>
+            </a:extLst>
+          </p:cNvPr>
+          <p:cNvSpPr/>
+          <p:nvPr/>
+        </p:nvSpPr>
+        <p:spPr>
+          <a:xfrm>
+            <a:off x="497711" y="1184613"/>
+            <a:ext cx="8503414" cy="646331"/>
+          </a:xfrm>
+          <a:prstGeom prst="rect">
+            <a:avLst/>
+          </a:prstGeom>
+        </p:spPr>
+        <p:txBody>
+          <a:bodyPr wrap="square">
+            <a:spAutoFit/>
+          </a:bodyPr>
+          <a:lstStyle/>
+          <a:p>
+            <a:r>
+              <a:rPr lang="en-US" dirty="0"/>
+              <a:t>This model’s prediction Budweiser (ABV = .05, IBU = 12) is Ale with 100% probability when the model uses 5 of the nearest neighbors.</a:t>
+            </a:r>
+          </a:p>
+        </p:txBody>
+      </p:sp>
+      <p:sp>
+        <p:nvSpPr>
+          <p:cNvPr id="8" name="Rectangle 7">
+            <a:extLst>
+              <a:ext uri="{FF2B5EF4-FFF2-40B4-BE49-F238E27FC236}">
+                <a16:creationId xmlns:a16="http://schemas.microsoft.com/office/drawing/2014/main" id="{A119875C-4A68-49E9-909A-36DDE19C73F4}"/>
+              </a:ext>
+            </a:extLst>
+          </p:cNvPr>
+          <p:cNvSpPr/>
+          <p:nvPr/>
+        </p:nvSpPr>
+        <p:spPr>
+          <a:xfrm>
+            <a:off x="574876" y="2691396"/>
+            <a:ext cx="8503414" cy="369332"/>
+          </a:xfrm>
+          <a:prstGeom prst="rect">
+            <a:avLst/>
+          </a:prstGeom>
+        </p:spPr>
+        <p:txBody>
+          <a:bodyPr wrap="square">
+            <a:spAutoFit/>
+          </a:bodyPr>
+          <a:lstStyle/>
+          <a:p>
+            <a:pPr algn="ctr"/>
+            <a:r>
+              <a:rPr lang="en-US" dirty="0">
+                <a:solidFill>
+                  <a:srgbClr val="C00000"/>
+                </a:solidFill>
+              </a:rPr>
+              <a:t>[insert decision boundary chart]</a:t>
+            </a:r>
+          </a:p>
+        </p:txBody>
+      </p:sp>
+    </p:spTree>
+    <p:extLst>
+      <p:ext uri="{BB962C8B-B14F-4D97-AF65-F5344CB8AC3E}">
+        <p14:creationId xmlns:p14="http://schemas.microsoft.com/office/powerpoint/2010/main" val="3754363430"/>
+      </p:ext>
+    </p:extLst>
+  </p:cSld>
+  <p:clrMapOvr>
+    <a:masterClrMapping/>
+  </p:clrMapOvr>
+</p:sld>
+</file>
+
+<file path=ppt/slides/slide15.xml><?xml version="1.0" encoding="utf-8"?>
+<p:sld xmlns:a="http://schemas.openxmlformats.org/drawingml/2006/main" xmlns:r="http://schemas.openxmlformats.org/officeDocument/2006/relationships" xmlns:p="http://schemas.openxmlformats.org/presentationml/2006/main">
+  <p:cSld>
+    <p:spTree>
+      <p:nvGrpSpPr>
+        <p:cNvPr id="1" name=""/>
+        <p:cNvGrpSpPr/>
+        <p:nvPr/>
+      </p:nvGrpSpPr>
+      <p:grpSpPr>
+        <a:xfrm>
+          <a:off x="0" y="0"/>
+          <a:ext cx="0" cy="0"/>
+          <a:chOff x="0" y="0"/>
+          <a:chExt cx="0" cy="0"/>
+        </a:xfrm>
+      </p:grpSpPr>
+      <p:sp>
+        <p:nvSpPr>
+          <p:cNvPr id="2" name="Title 1">
+            <a:extLst>
+              <a:ext uri="{FF2B5EF4-FFF2-40B4-BE49-F238E27FC236}">
+                <a16:creationId xmlns:a16="http://schemas.microsoft.com/office/drawing/2014/main" id="{ED95135E-4283-4599-B850-F011CF9B7C74}"/>
+              </a:ext>
+            </a:extLst>
+          </p:cNvPr>
+          <p:cNvSpPr>
+            <a:spLocks noGrp="1"/>
+          </p:cNvSpPr>
+          <p:nvPr>
+            <p:ph type="title"/>
+          </p:nvPr>
+        </p:nvSpPr>
+        <p:spPr>
+          <a:xfrm>
+            <a:off x="497711" y="336771"/>
+            <a:ext cx="7886700" cy="780398"/>
+          </a:xfrm>
+        </p:spPr>
+        <p:txBody>
+          <a:bodyPr>
+            <a:normAutofit/>
+          </a:bodyPr>
+          <a:lstStyle/>
+          <a:p>
+            <a:r>
+              <a:rPr lang="en-US" sz="2200" dirty="0">
+                <a:solidFill>
+                  <a:schemeClr val="tx1">
+                    <a:lumMod val="65000"/>
+                    <a:lumOff val="35000"/>
+                  </a:schemeClr>
+                </a:solidFill>
+              </a:rPr>
+              <a:t>Possible States for Budweiser to open a new brewery</a:t>
+            </a:r>
+          </a:p>
+        </p:txBody>
+      </p:sp>
+      <p:sp>
+        <p:nvSpPr>
+          <p:cNvPr id="3" name="Content Placeholder 2">
+            <a:extLst>
+              <a:ext uri="{FF2B5EF4-FFF2-40B4-BE49-F238E27FC236}">
+                <a16:creationId xmlns:a16="http://schemas.microsoft.com/office/drawing/2014/main" id="{2DD55975-366F-4C51-B7D6-EEAFD411A8C3}"/>
+              </a:ext>
+            </a:extLst>
+          </p:cNvPr>
+          <p:cNvSpPr>
+            <a:spLocks noGrp="1"/>
+          </p:cNvSpPr>
+          <p:nvPr>
+            <p:ph idx="1"/>
+          </p:nvPr>
+        </p:nvSpPr>
+        <p:spPr>
+          <a:xfrm>
+            <a:off x="574876" y="1162010"/>
+            <a:ext cx="7886700" cy="4351338"/>
+          </a:xfrm>
+        </p:spPr>
+        <p:txBody>
+          <a:bodyPr/>
+          <a:lstStyle/>
+          <a:p>
+            <a:pPr marL="0" indent="0">
+              <a:spcAft>
+                <a:spcPts val="600"/>
+              </a:spcAft>
+              <a:buNone/>
+            </a:pPr>
+            <a:r>
+              <a:rPr lang="en-US" sz="1600" dirty="0"/>
+              <a:t>Budweiser might consider opening new breweries in X, Y, Z states based on ABV and IBU within those states.</a:t>
+            </a:r>
+          </a:p>
+          <a:p>
+            <a:endParaRPr lang="en-US" sz="1600" dirty="0"/>
+          </a:p>
+          <a:p>
+            <a:pPr marL="0" indent="0">
+              <a:buNone/>
+            </a:pPr>
+            <a:endParaRPr lang="en-US" dirty="0"/>
+          </a:p>
+        </p:txBody>
+      </p:sp>
+      <p:pic>
+        <p:nvPicPr>
+          <p:cNvPr id="5" name="Picture 4" descr="A close up of a sign&#10;&#10;Description automatically generated">
+            <a:extLst>
+              <a:ext uri="{FF2B5EF4-FFF2-40B4-BE49-F238E27FC236}">
+                <a16:creationId xmlns:a16="http://schemas.microsoft.com/office/drawing/2014/main" id="{F9271491-99A6-4D00-B738-0E34E6686EFF}"/>
+              </a:ext>
+            </a:extLst>
+          </p:cNvPr>
+          <p:cNvPicPr>
+            <a:picLocks noChangeAspect="1"/>
+          </p:cNvPicPr>
+          <p:nvPr/>
+        </p:nvPicPr>
+        <p:blipFill>
+          <a:blip r:embed="rId2">
+            <a:extLst>
+              <a:ext uri="{28A0092B-C50C-407E-A947-70E740481C1C}">
+                <a14:useLocalDpi xmlns:a14="http://schemas.microsoft.com/office/drawing/2010/main" val="0"/>
+              </a:ext>
+            </a:extLst>
+          </a:blip>
+          <a:stretch>
+            <a:fillRect/>
+          </a:stretch>
+        </p:blipFill>
+        <p:spPr>
+          <a:xfrm>
+            <a:off x="7492438" y="6106511"/>
+            <a:ext cx="1153851" cy="414718"/>
+          </a:xfrm>
+          <a:prstGeom prst="rect">
+            <a:avLst/>
+          </a:prstGeom>
+        </p:spPr>
+      </p:pic>
+      <p:cxnSp>
+        <p:nvCxnSpPr>
+          <p:cNvPr id="7" name="Straight Connector 6">
+            <a:extLst>
+              <a:ext uri="{FF2B5EF4-FFF2-40B4-BE49-F238E27FC236}">
+                <a16:creationId xmlns:a16="http://schemas.microsoft.com/office/drawing/2014/main" id="{754C5E05-D462-4273-82D1-C656D562E12C}"/>
+              </a:ext>
+            </a:extLst>
+          </p:cNvPr>
+          <p:cNvCxnSpPr>
+            <a:cxnSpLocks/>
+          </p:cNvCxnSpPr>
+          <p:nvPr/>
+        </p:nvCxnSpPr>
+        <p:spPr>
+          <a:xfrm>
+            <a:off x="574876" y="945266"/>
+            <a:ext cx="8071413" cy="0"/>
+          </a:xfrm>
+          <a:prstGeom prst="line">
+            <a:avLst/>
+          </a:prstGeom>
+          <a:ln>
+            <a:solidFill>
+              <a:schemeClr val="bg2">
+                <a:lumMod val="75000"/>
+              </a:schemeClr>
+            </a:solidFill>
+          </a:ln>
+        </p:spPr>
+        <p:style>
+          <a:lnRef idx="1">
+            <a:schemeClr val="accent6"/>
+          </a:lnRef>
+          <a:fillRef idx="0">
+            <a:schemeClr val="accent6"/>
+          </a:fillRef>
+          <a:effectRef idx="0">
+            <a:schemeClr val="accent6"/>
+          </a:effectRef>
+          <a:fontRef idx="minor">
+            <a:schemeClr val="tx1"/>
+          </a:fontRef>
+        </p:style>
+      </p:cxnSp>
+      <p:sp>
+        <p:nvSpPr>
           <p:cNvPr id="6" name="Rectangle 5">
             <a:extLst>
               <a:ext uri="{FF2B5EF4-FFF2-40B4-BE49-F238E27FC236}">
@@ -4503,7 +4752,7 @@
 </p:sld>
 </file>
 
-<file path=ppt/slides/slide15.xml><?xml version="1.0" encoding="utf-8"?>
+<file path=ppt/slides/slide16.xml><?xml version="1.0" encoding="utf-8"?>
 <p:sld xmlns:a="http://schemas.openxmlformats.org/drawingml/2006/main" xmlns:r="http://schemas.openxmlformats.org/officeDocument/2006/relationships" xmlns:p="http://schemas.openxmlformats.org/presentationml/2006/main">
   <p:cSld>
     <p:bg>
@@ -4869,6 +5118,53 @@
           <a:chExt cx="0" cy="0"/>
         </a:xfrm>
       </p:grpSpPr>
+      <p:pic>
+        <p:nvPicPr>
+          <p:cNvPr id="1026" name="Picture 2">
+            <a:extLst>
+              <a:ext uri="{FF2B5EF4-FFF2-40B4-BE49-F238E27FC236}">
+                <a16:creationId xmlns:a16="http://schemas.microsoft.com/office/drawing/2014/main" id="{115DA2B4-6BFC-4088-8D3B-05FFA449EB86}"/>
+              </a:ext>
+            </a:extLst>
+          </p:cNvPr>
+          <p:cNvPicPr>
+            <a:picLocks noChangeAspect="1" noChangeArrowheads="1"/>
+          </p:cNvPicPr>
+          <p:nvPr/>
+        </p:nvPicPr>
+        <p:blipFill>
+          <a:blip r:embed="rId2">
+            <a:extLst>
+              <a:ext uri="{28A0092B-C50C-407E-A947-70E740481C1C}">
+                <a14:useLocalDpi xmlns:a14="http://schemas.microsoft.com/office/drawing/2010/main" val="0"/>
+              </a:ext>
+            </a:extLst>
+          </a:blip>
+          <a:srcRect/>
+          <a:stretch>
+            <a:fillRect/>
+          </a:stretch>
+        </p:blipFill>
+        <p:spPr bwMode="auto">
+          <a:xfrm>
+            <a:off x="441904" y="1143000"/>
+            <a:ext cx="8426628" cy="4213314"/>
+          </a:xfrm>
+          <a:prstGeom prst="rect">
+            <a:avLst/>
+          </a:prstGeom>
+          <a:noFill/>
+          <a:extLst>
+            <a:ext uri="{909E8E84-426E-40DD-AFC4-6F175D3DCCD1}">
+              <a14:hiddenFill xmlns:a14="http://schemas.microsoft.com/office/drawing/2010/main">
+                <a:solidFill>
+                  <a:srgbClr val="FFFFFF"/>
+                </a:solidFill>
+              </a14:hiddenFill>
+            </a:ext>
+          </a:extLst>
+        </p:spPr>
+      </p:pic>
       <p:sp>
         <p:nvSpPr>
           <p:cNvPr id="2" name="Title 1">
@@ -4977,7 +5273,7 @@
           <p:nvPr/>
         </p:nvPicPr>
         <p:blipFill>
-          <a:blip r:embed="rId2">
+          <a:blip r:embed="rId3">
             <a:extLst>
               <a:ext uri="{28A0092B-C50C-407E-A947-70E740481C1C}">
                 <a14:useLocalDpi xmlns:a14="http://schemas.microsoft.com/office/drawing/2010/main" val="0"/>
@@ -5043,42 +5339,6 @@
           </a:fontRef>
         </p:style>
       </p:cxnSp>
-      <p:pic>
-        <p:nvPicPr>
-          <p:cNvPr id="9" name="Picture 8">
-            <a:extLst>
-              <a:ext uri="{FF2B5EF4-FFF2-40B4-BE49-F238E27FC236}">
-                <a16:creationId xmlns:a16="http://schemas.microsoft.com/office/drawing/2014/main" id="{869DE400-21AB-4069-8D44-DA670245B939}"/>
-              </a:ext>
-            </a:extLst>
-          </p:cNvPr>
-          <p:cNvPicPr>
-            <a:picLocks noChangeAspect="1"/>
-          </p:cNvPicPr>
-          <p:nvPr/>
-        </p:nvPicPr>
-        <p:blipFill>
-          <a:blip r:embed="rId3">
-            <a:extLst>
-              <a:ext uri="{28A0092B-C50C-407E-A947-70E740481C1C}">
-                <a14:useLocalDpi xmlns:a14="http://schemas.microsoft.com/office/drawing/2010/main" val="0"/>
-              </a:ext>
-            </a:extLst>
-          </a:blip>
-          <a:stretch>
-            <a:fillRect/>
-          </a:stretch>
-        </p:blipFill>
-        <p:spPr>
-          <a:xfrm>
-            <a:off x="57873" y="1117169"/>
-            <a:ext cx="9105418" cy="4857750"/>
-          </a:xfrm>
-          <a:prstGeom prst="rect">
-            <a:avLst/>
-          </a:prstGeom>
-        </p:spPr>
-      </p:pic>
       <p:sp>
         <p:nvSpPr>
           <p:cNvPr id="4" name="TextBox 3">
@@ -5093,8 +5353,8 @@
         </p:nvSpPr>
         <p:spPr>
           <a:xfrm>
-            <a:off x="1538029" y="1512931"/>
-            <a:ext cx="5275973" cy="523220"/>
+            <a:off x="2253482" y="1464054"/>
+            <a:ext cx="3971326" cy="523220"/>
           </a:xfrm>
           <a:prstGeom prst="rect">
             <a:avLst/>
@@ -5108,9 +5368,69 @@
           <a:lstStyle/>
           <a:p>
             <a:r>
-              <a:rPr lang="en-US" sz="1400" dirty="0"/>
-              <a:t>Every state has at least one craft brewery.  Colorado has the highest number of craft breweries.</a:t>
-            </a:r>
+              <a:rPr lang="en-US" sz="1400" dirty="0">
+                <a:solidFill>
+                  <a:schemeClr val="accent1"/>
+                </a:solidFill>
+              </a:rPr>
+              <a:t>Every state has at least one craft brewery.  </a:t>
+            </a:r>
+          </a:p>
+          <a:p>
+            <a:r>
+              <a:rPr lang="en-US" sz="1400" dirty="0">
+                <a:solidFill>
+                  <a:schemeClr val="accent1"/>
+                </a:solidFill>
+              </a:rPr>
+              <a:t>Colorado has the highest number of craft breweries.</a:t>
+            </a:r>
+          </a:p>
+        </p:txBody>
+      </p:sp>
+      <p:sp>
+        <p:nvSpPr>
+          <p:cNvPr id="8" name="Arrow: Down 7">
+            <a:extLst>
+              <a:ext uri="{FF2B5EF4-FFF2-40B4-BE49-F238E27FC236}">
+                <a16:creationId xmlns:a16="http://schemas.microsoft.com/office/drawing/2014/main" id="{AC594DD3-DC91-41D4-AE60-6E6F71B7D756}"/>
+              </a:ext>
+            </a:extLst>
+          </p:cNvPr>
+          <p:cNvSpPr/>
+          <p:nvPr/>
+        </p:nvSpPr>
+        <p:spPr>
+          <a:xfrm rot="7127799">
+            <a:off x="2111732" y="1634069"/>
+            <a:ext cx="114300" cy="258451"/>
+          </a:xfrm>
+          <a:prstGeom prst="downArrow">
+            <a:avLst/>
+          </a:prstGeom>
+        </p:spPr>
+        <p:style>
+          <a:lnRef idx="2">
+            <a:schemeClr val="accent1">
+              <a:shade val="50000"/>
+            </a:schemeClr>
+          </a:lnRef>
+          <a:fillRef idx="1">
+            <a:schemeClr val="accent1"/>
+          </a:fillRef>
+          <a:effectRef idx="0">
+            <a:schemeClr val="accent1"/>
+          </a:effectRef>
+          <a:fontRef idx="minor">
+            <a:schemeClr val="lt1"/>
+          </a:fontRef>
+        </p:style>
+        <p:txBody>
+          <a:bodyPr rtlCol="0" anchor="ctr"/>
+          <a:lstStyle/>
+          <a:p>
+            <a:pPr algn="ctr"/>
+            <a:endParaRPr lang="en-US"/>
           </a:p>
         </p:txBody>
       </p:sp>
@@ -5144,6 +5464,53 @@
           <a:chExt cx="0" cy="0"/>
         </a:xfrm>
       </p:grpSpPr>
+      <p:pic>
+        <p:nvPicPr>
+          <p:cNvPr id="8" name="Picture 4">
+            <a:extLst>
+              <a:ext uri="{FF2B5EF4-FFF2-40B4-BE49-F238E27FC236}">
+                <a16:creationId xmlns:a16="http://schemas.microsoft.com/office/drawing/2014/main" id="{EAD5C34A-0B11-4369-875B-947BE70AF61D}"/>
+              </a:ext>
+            </a:extLst>
+          </p:cNvPr>
+          <p:cNvPicPr>
+            <a:picLocks noChangeAspect="1" noChangeArrowheads="1"/>
+          </p:cNvPicPr>
+          <p:nvPr/>
+        </p:nvPicPr>
+        <p:blipFill>
+          <a:blip r:embed="rId2">
+            <a:extLst>
+              <a:ext uri="{28A0092B-C50C-407E-A947-70E740481C1C}">
+                <a14:useLocalDpi xmlns:a14="http://schemas.microsoft.com/office/drawing/2010/main" val="0"/>
+              </a:ext>
+            </a:extLst>
+          </a:blip>
+          <a:srcRect/>
+          <a:stretch>
+            <a:fillRect/>
+          </a:stretch>
+        </p:blipFill>
+        <p:spPr bwMode="auto">
+          <a:xfrm>
+            <a:off x="447973" y="773406"/>
+            <a:ext cx="7586504" cy="6069203"/>
+          </a:xfrm>
+          <a:prstGeom prst="rect">
+            <a:avLst/>
+          </a:prstGeom>
+          <a:noFill/>
+          <a:extLst>
+            <a:ext uri="{909E8E84-426E-40DD-AFC4-6F175D3DCCD1}">
+              <a14:hiddenFill xmlns:a14="http://schemas.microsoft.com/office/drawing/2010/main">
+                <a:solidFill>
+                  <a:srgbClr val="FFFFFF"/>
+                </a:solidFill>
+              </a14:hiddenFill>
+            </a:ext>
+          </a:extLst>
+        </p:spPr>
+      </p:pic>
       <p:sp>
         <p:nvSpPr>
           <p:cNvPr id="2" name="Title 1">
@@ -5181,8 +5548,59 @@
                   </a:schemeClr>
                 </a:solidFill>
               </a:rPr>
-              <a:t>What is the median ABV and IBU in each state?</a:t>
-            </a:r>
+              <a:t>How many craft breweries are in each state?</a:t>
+            </a:r>
+          </a:p>
+        </p:txBody>
+      </p:sp>
+      <p:sp>
+        <p:nvSpPr>
+          <p:cNvPr id="3" name="Content Placeholder 2">
+            <a:extLst>
+              <a:ext uri="{FF2B5EF4-FFF2-40B4-BE49-F238E27FC236}">
+                <a16:creationId xmlns:a16="http://schemas.microsoft.com/office/drawing/2014/main" id="{2DD55975-366F-4C51-B7D6-EEAFD411A8C3}"/>
+              </a:ext>
+            </a:extLst>
+          </p:cNvPr>
+          <p:cNvSpPr>
+            <a:spLocks noGrp="1"/>
+          </p:cNvSpPr>
+          <p:nvPr>
+            <p:ph idx="1"/>
+          </p:nvPr>
+        </p:nvSpPr>
+        <p:spPr>
+          <a:xfrm>
+            <a:off x="574876" y="1162010"/>
+            <a:ext cx="7886700" cy="4351338"/>
+          </a:xfrm>
+        </p:spPr>
+        <p:txBody>
+          <a:bodyPr/>
+          <a:lstStyle/>
+          <a:p>
+            <a:pPr marL="0" indent="0">
+              <a:spcAft>
+                <a:spcPts val="600"/>
+              </a:spcAft>
+              <a:buNone/>
+            </a:pPr>
+            <a:endParaRPr lang="en-US" sz="1600" dirty="0"/>
+          </a:p>
+          <a:p>
+            <a:pPr marL="0" indent="0">
+              <a:buNone/>
+            </a:pPr>
+            <a:endParaRPr lang="en-US" sz="1600" dirty="0"/>
+          </a:p>
+          <a:p>
+            <a:endParaRPr lang="en-US" sz="1600" dirty="0"/>
+          </a:p>
+          <a:p>
+            <a:pPr marL="0" indent="0">
+              <a:buNone/>
+            </a:pPr>
+            <a:endParaRPr lang="en-US" dirty="0"/>
           </a:p>
         </p:txBody>
       </p:sp>
@@ -5201,7 +5619,7 @@
           <p:nvPr/>
         </p:nvPicPr>
         <p:blipFill>
-          <a:blip r:embed="rId2">
+          <a:blip r:embed="rId3">
             <a:extLst>
               <a:ext uri="{28A0092B-C50C-407E-A947-70E740481C1C}">
                 <a14:useLocalDpi xmlns:a14="http://schemas.microsoft.com/office/drawing/2010/main" val="0"/>
@@ -5267,131 +5685,10 @@
           </a:fontRef>
         </p:style>
       </p:cxnSp>
-      <p:pic>
-        <p:nvPicPr>
-          <p:cNvPr id="9" name="Content Placeholder 8">
-            <a:extLst>
-              <a:ext uri="{FF2B5EF4-FFF2-40B4-BE49-F238E27FC236}">
-                <a16:creationId xmlns:a16="http://schemas.microsoft.com/office/drawing/2014/main" id="{794B8CDC-AE8C-4BC6-948A-BECA47456308}"/>
-              </a:ext>
-            </a:extLst>
-          </p:cNvPr>
-          <p:cNvPicPr>
-            <a:picLocks noGrp="1" noChangeAspect="1"/>
-          </p:cNvPicPr>
-          <p:nvPr>
-            <p:ph idx="1"/>
-          </p:nvPr>
-        </p:nvPicPr>
-        <p:blipFill>
-          <a:blip r:embed="rId3">
-            <a:extLst>
-              <a:ext uri="{28A0092B-C50C-407E-A947-70E740481C1C}">
-                <a14:useLocalDpi xmlns:a14="http://schemas.microsoft.com/office/drawing/2010/main" val="0"/>
-              </a:ext>
-            </a:extLst>
-          </a:blip>
-          <a:stretch>
-            <a:fillRect/>
-          </a:stretch>
-        </p:blipFill>
-        <p:spPr>
-          <a:xfrm>
-            <a:off x="1" y="1076629"/>
-            <a:ext cx="9144000" cy="4933646"/>
-          </a:xfrm>
-        </p:spPr>
-      </p:pic>
-      <p:sp>
-        <p:nvSpPr>
-          <p:cNvPr id="6" name="TextBox 5">
-            <a:extLst>
-              <a:ext uri="{FF2B5EF4-FFF2-40B4-BE49-F238E27FC236}">
-                <a16:creationId xmlns:a16="http://schemas.microsoft.com/office/drawing/2014/main" id="{A8067DA2-C7F8-448C-B049-E6571E083E41}"/>
-              </a:ext>
-            </a:extLst>
-          </p:cNvPr>
-          <p:cNvSpPr txBox="1"/>
-          <p:nvPr/>
-        </p:nvSpPr>
-        <p:spPr>
-          <a:xfrm>
-            <a:off x="1492118" y="4768809"/>
-            <a:ext cx="4694429" cy="738664"/>
-          </a:xfrm>
-          <a:prstGeom prst="rect">
-            <a:avLst/>
-          </a:prstGeom>
-          <a:solidFill>
-            <a:schemeClr val="bg1">
-              <a:alpha val="83000"/>
-            </a:schemeClr>
-          </a:solidFill>
-        </p:spPr>
-        <p:txBody>
-          <a:bodyPr wrap="square" rtlCol="0">
-            <a:spAutoFit/>
-          </a:bodyPr>
-          <a:lstStyle/>
-          <a:p>
-            <a:pPr algn="ctr"/>
-            <a:r>
-              <a:rPr lang="en-US" sz="1400" dirty="0"/>
-              <a:t>Maine has the highest median ABV and IBU of all the states. Arkansas and Utah have the lowest median ADV, while Wisconsin has the lowest median IBU.</a:t>
-            </a:r>
-          </a:p>
-        </p:txBody>
-      </p:sp>
-      <p:sp>
-        <p:nvSpPr>
-          <p:cNvPr id="10" name="Arrow: Down 9">
-            <a:extLst>
-              <a:ext uri="{FF2B5EF4-FFF2-40B4-BE49-F238E27FC236}">
-                <a16:creationId xmlns:a16="http://schemas.microsoft.com/office/drawing/2014/main" id="{73D07171-F01C-45EF-9182-BF1FD5A11288}"/>
-              </a:ext>
-            </a:extLst>
-          </p:cNvPr>
-          <p:cNvSpPr/>
-          <p:nvPr/>
-        </p:nvSpPr>
-        <p:spPr>
-          <a:xfrm rot="10800000">
-            <a:off x="3295650" y="5848060"/>
-            <a:ext cx="114300" cy="258451"/>
-          </a:xfrm>
-          <a:prstGeom prst="downArrow">
-            <a:avLst/>
-          </a:prstGeom>
-        </p:spPr>
-        <p:style>
-          <a:lnRef idx="2">
-            <a:schemeClr val="accent1">
-              <a:shade val="50000"/>
-            </a:schemeClr>
-          </a:lnRef>
-          <a:fillRef idx="1">
-            <a:schemeClr val="accent1"/>
-          </a:fillRef>
-          <a:effectRef idx="0">
-            <a:schemeClr val="accent1"/>
-          </a:effectRef>
-          <a:fontRef idx="minor">
-            <a:schemeClr val="lt1"/>
-          </a:fontRef>
-        </p:style>
-        <p:txBody>
-          <a:bodyPr rtlCol="0" anchor="ctr"/>
-          <a:lstStyle/>
-          <a:p>
-            <a:pPr algn="ctr"/>
-            <a:endParaRPr lang="en-US"/>
-          </a:p>
-        </p:txBody>
-      </p:sp>
     </p:spTree>
     <p:extLst>
       <p:ext uri="{BB962C8B-B14F-4D97-AF65-F5344CB8AC3E}">
-        <p14:creationId xmlns:p14="http://schemas.microsoft.com/office/powerpoint/2010/main" val="3272948218"/>
+        <p14:creationId xmlns:p14="http://schemas.microsoft.com/office/powerpoint/2010/main" val="70452358"/>
       </p:ext>
     </p:extLst>
   </p:cSld>
@@ -5436,8 +5733,8 @@
         </p:nvSpPr>
         <p:spPr>
           <a:xfrm>
-            <a:off x="552450" y="336771"/>
-            <a:ext cx="7777222" cy="780398"/>
+            <a:off x="497711" y="336771"/>
+            <a:ext cx="7886700" cy="780398"/>
           </a:xfrm>
         </p:spPr>
         <p:txBody>
@@ -5455,7 +5752,7 @@
                   </a:schemeClr>
                 </a:solidFill>
               </a:rPr>
-              <a:t>What states have the maximum ABV and IBU?</a:t>
+              <a:t>What is the median ABV and IBU in each state?</a:t>
             </a:r>
           </a:p>
         </p:txBody>
@@ -5541,125 +5838,94 @@
           </a:fontRef>
         </p:style>
       </p:cxnSp>
-      <p:sp>
-        <p:nvSpPr>
-          <p:cNvPr id="6" name="TextBox 5">
-            <a:extLst>
-              <a:ext uri="{FF2B5EF4-FFF2-40B4-BE49-F238E27FC236}">
-                <a16:creationId xmlns:a16="http://schemas.microsoft.com/office/drawing/2014/main" id="{49B21544-ABD2-4231-B32F-C12E8438152C}"/>
-              </a:ext>
-            </a:extLst>
-          </p:cNvPr>
-          <p:cNvSpPr txBox="1"/>
-          <p:nvPr/>
-        </p:nvSpPr>
-        <p:spPr>
-          <a:xfrm>
-            <a:off x="493878" y="1173007"/>
-            <a:ext cx="8262997" cy="1477328"/>
-          </a:xfrm>
-          <a:prstGeom prst="rect">
-            <a:avLst/>
-          </a:prstGeom>
-          <a:noFill/>
-        </p:spPr>
-        <p:txBody>
-          <a:bodyPr wrap="square" rtlCol="0">
-            <a:spAutoFit/>
-          </a:bodyPr>
-          <a:lstStyle/>
-          <a:p>
-            <a:r>
-              <a:rPr lang="en-US" dirty="0"/>
-              <a:t>Kentucky has the highest ABV beer at 12.5%, which is called ‘London Balling’,  made by Against the Grain Brewery, located in Louisville, KY.</a:t>
-            </a:r>
-          </a:p>
-          <a:p>
-            <a:endParaRPr lang="en-US" dirty="0"/>
-          </a:p>
-          <a:p>
-            <a:r>
-              <a:rPr lang="en-US" dirty="0"/>
-              <a:t>Oregon has the highest IBU beer at 138, which is called ‘Bitter Bitch Imperial IPA’, made by Astoria Brewing Company, located in Astoria, OR.</a:t>
-            </a:r>
-          </a:p>
-        </p:txBody>
-      </p:sp>
-      <p:sp>
-        <p:nvSpPr>
-          <p:cNvPr id="13" name="Rectangle 12">
-            <a:extLst>
-              <a:ext uri="{FF2B5EF4-FFF2-40B4-BE49-F238E27FC236}">
-                <a16:creationId xmlns:a16="http://schemas.microsoft.com/office/drawing/2014/main" id="{1E5777CD-2E57-41FD-A85C-A1A8403F60F8}"/>
-              </a:ext>
-            </a:extLst>
-          </p:cNvPr>
-          <p:cNvSpPr/>
-          <p:nvPr/>
-        </p:nvSpPr>
-        <p:spPr>
-          <a:xfrm>
-            <a:off x="0" y="5599111"/>
-            <a:ext cx="8503414" cy="369332"/>
-          </a:xfrm>
-          <a:prstGeom prst="rect">
-            <a:avLst/>
-          </a:prstGeom>
-        </p:spPr>
-        <p:txBody>
-          <a:bodyPr wrap="square">
-            <a:spAutoFit/>
-          </a:bodyPr>
-          <a:lstStyle/>
-          <a:p>
-            <a:pPr algn="ctr"/>
-            <a:r>
-              <a:rPr lang="en-US" dirty="0">
-                <a:solidFill>
-                  <a:srgbClr val="C00000"/>
-                </a:solidFill>
-              </a:rPr>
-              <a:t>[ insert max plot]</a:t>
-            </a:r>
-          </a:p>
-        </p:txBody>
-      </p:sp>
       <p:pic>
         <p:nvPicPr>
-          <p:cNvPr id="8" name="Picture 7">
-            <a:extLst>
-              <a:ext uri="{FF2B5EF4-FFF2-40B4-BE49-F238E27FC236}">
-                <a16:creationId xmlns:a16="http://schemas.microsoft.com/office/drawing/2014/main" id="{4625F598-EB35-4FD1-B194-C6C9F2E4B1A4}"/>
+          <p:cNvPr id="9" name="Content Placeholder 8">
+            <a:extLst>
+              <a:ext uri="{FF2B5EF4-FFF2-40B4-BE49-F238E27FC236}">
+                <a16:creationId xmlns:a16="http://schemas.microsoft.com/office/drawing/2014/main" id="{794B8CDC-AE8C-4BC6-948A-BECA47456308}"/>
               </a:ext>
             </a:extLst>
           </p:cNvPr>
           <p:cNvPicPr>
-            <a:picLocks noChangeAspect="1"/>
+            <a:picLocks noGrp="1" noChangeAspect="1"/>
           </p:cNvPicPr>
-          <p:nvPr/>
+          <p:nvPr>
+            <p:ph idx="1"/>
+          </p:nvPr>
         </p:nvPicPr>
         <p:blipFill>
-          <a:blip r:embed="rId3"/>
+          <a:blip r:embed="rId3">
+            <a:extLst>
+              <a:ext uri="{28A0092B-C50C-407E-A947-70E740481C1C}">
+                <a14:useLocalDpi xmlns:a14="http://schemas.microsoft.com/office/drawing/2010/main" val="0"/>
+              </a:ext>
+            </a:extLst>
+          </a:blip>
           <a:stretch>
             <a:fillRect/>
           </a:stretch>
         </p:blipFill>
         <p:spPr>
           <a:xfrm>
-            <a:off x="0" y="2620808"/>
-            <a:ext cx="9144000" cy="3799041"/>
+            <a:off x="300649" y="1177786"/>
+            <a:ext cx="8655867" cy="4670274"/>
+          </a:xfrm>
+          <a:ln>
+            <a:solidFill>
+              <a:schemeClr val="bg1">
+                <a:lumMod val="75000"/>
+              </a:schemeClr>
+            </a:solidFill>
+          </a:ln>
+        </p:spPr>
+      </p:pic>
+      <p:sp>
+        <p:nvSpPr>
+          <p:cNvPr id="6" name="TextBox 5">
+            <a:extLst>
+              <a:ext uri="{FF2B5EF4-FFF2-40B4-BE49-F238E27FC236}">
+                <a16:creationId xmlns:a16="http://schemas.microsoft.com/office/drawing/2014/main" id="{A8067DA2-C7F8-448C-B049-E6571E083E41}"/>
+              </a:ext>
+            </a:extLst>
+          </p:cNvPr>
+          <p:cNvSpPr txBox="1"/>
+          <p:nvPr/>
+        </p:nvSpPr>
+        <p:spPr>
+          <a:xfrm>
+            <a:off x="1943580" y="4428300"/>
+            <a:ext cx="4694429" cy="738664"/>
           </a:xfrm>
           <a:prstGeom prst="rect">
             <a:avLst/>
           </a:prstGeom>
-        </p:spPr>
-      </p:pic>
+          <a:solidFill>
+            <a:schemeClr val="bg1">
+              <a:alpha val="83000"/>
+            </a:schemeClr>
+          </a:solidFill>
+        </p:spPr>
+        <p:txBody>
+          <a:bodyPr wrap="square" rtlCol="0">
+            <a:spAutoFit/>
+          </a:bodyPr>
+          <a:lstStyle/>
+          <a:p>
+            <a:pPr algn="ctr"/>
+            <a:r>
+              <a:rPr lang="en-US" sz="1400" dirty="0"/>
+              <a:t>Maine has the highest median ABV and IBU of all the states. Arkansas and Utah have the lowest median ADV, while Wisconsin has the lowest median IBU.</a:t>
+            </a:r>
+          </a:p>
+        </p:txBody>
+      </p:sp>
       <p:sp>
         <p:nvSpPr>
           <p:cNvPr id="10" name="Arrow: Down 9">
             <a:extLst>
               <a:ext uri="{FF2B5EF4-FFF2-40B4-BE49-F238E27FC236}">
-                <a16:creationId xmlns:a16="http://schemas.microsoft.com/office/drawing/2014/main" id="{E77DAADB-29EE-4C62-96F6-649B18319293}"/>
+                <a16:creationId xmlns:a16="http://schemas.microsoft.com/office/drawing/2014/main" id="{73D07171-F01C-45EF-9182-BF1FD5A11288}"/>
               </a:ext>
             </a:extLst>
           </p:cNvPr>
@@ -5667,9 +5933,9 @@
           <p:nvPr/>
         </p:nvSpPr>
         <p:spPr>
-          <a:xfrm>
-            <a:off x="2692716" y="2971800"/>
-            <a:ext cx="97156" cy="152400"/>
+          <a:xfrm rot="10800000">
+            <a:off x="3311192" y="5718834"/>
+            <a:ext cx="114300" cy="258451"/>
           </a:xfrm>
           <a:prstGeom prst="downArrow">
             <a:avLst/>
@@ -5702,10 +5968,10 @@
       </p:sp>
       <p:sp>
         <p:nvSpPr>
-          <p:cNvPr id="11" name="Arrow: Down 10">
-            <a:extLst>
-              <a:ext uri="{FF2B5EF4-FFF2-40B4-BE49-F238E27FC236}">
-                <a16:creationId xmlns:a16="http://schemas.microsoft.com/office/drawing/2014/main" id="{BC974B24-0D4C-42D4-A8BF-824D7D751CA5}"/>
+          <p:cNvPr id="12" name="Arrow: Down 11">
+            <a:extLst>
+              <a:ext uri="{FF2B5EF4-FFF2-40B4-BE49-F238E27FC236}">
+                <a16:creationId xmlns:a16="http://schemas.microsoft.com/office/drawing/2014/main" id="{8A1B6696-B49B-4C88-A22F-5FA7BDA1EF34}"/>
               </a:ext>
             </a:extLst>
           </p:cNvPr>
@@ -5713,9 +5979,9 @@
           <p:nvPr/>
         </p:nvSpPr>
         <p:spPr>
-          <a:xfrm>
-            <a:off x="5421626" y="2706173"/>
-            <a:ext cx="97156" cy="265627"/>
+          <a:xfrm rot="3444909">
+            <a:off x="3508005" y="1444062"/>
+            <a:ext cx="114300" cy="258451"/>
           </a:xfrm>
           <a:prstGeom prst="downArrow">
             <a:avLst/>
@@ -5749,7 +6015,7 @@
     </p:spTree>
     <p:extLst>
       <p:ext uri="{BB962C8B-B14F-4D97-AF65-F5344CB8AC3E}">
-        <p14:creationId xmlns:p14="http://schemas.microsoft.com/office/powerpoint/2010/main" val="4080758490"/>
+        <p14:creationId xmlns:p14="http://schemas.microsoft.com/office/powerpoint/2010/main" val="3272948218"/>
       </p:ext>
     </p:extLst>
   </p:cSld>
@@ -5794,13 +6060,13 @@
         </p:nvSpPr>
         <p:spPr>
           <a:xfrm>
-            <a:off x="497711" y="336771"/>
-            <a:ext cx="7886700" cy="780398"/>
+            <a:off x="552450" y="336771"/>
+            <a:ext cx="7777222" cy="780398"/>
           </a:xfrm>
         </p:spPr>
         <p:txBody>
           <a:bodyPr>
-            <a:normAutofit fontScale="90000"/>
+            <a:normAutofit/>
           </a:bodyPr>
           <a:lstStyle/>
           <a:p>
@@ -5813,7 +6079,7 @@
                   </a:schemeClr>
                 </a:solidFill>
               </a:rPr>
-              <a:t>What are the summary statistics and distribution of ABV?</a:t>
+              <a:t>What states have the maximum ABV and IBU?</a:t>
             </a:r>
           </a:p>
         </p:txBody>
@@ -5899,12 +6165,95 @@
           </a:fontRef>
         </p:style>
       </p:cxnSp>
+      <p:sp>
+        <p:nvSpPr>
+          <p:cNvPr id="6" name="TextBox 5">
+            <a:extLst>
+              <a:ext uri="{FF2B5EF4-FFF2-40B4-BE49-F238E27FC236}">
+                <a16:creationId xmlns:a16="http://schemas.microsoft.com/office/drawing/2014/main" id="{49B21544-ABD2-4231-B32F-C12E8438152C}"/>
+              </a:ext>
+            </a:extLst>
+          </p:cNvPr>
+          <p:cNvSpPr txBox="1"/>
+          <p:nvPr/>
+        </p:nvSpPr>
+        <p:spPr>
+          <a:xfrm>
+            <a:off x="479083" y="973242"/>
+            <a:ext cx="8262997" cy="1323439"/>
+          </a:xfrm>
+          <a:prstGeom prst="rect">
+            <a:avLst/>
+          </a:prstGeom>
+          <a:noFill/>
+        </p:spPr>
+        <p:txBody>
+          <a:bodyPr wrap="square" rtlCol="0">
+            <a:spAutoFit/>
+          </a:bodyPr>
+          <a:lstStyle/>
+          <a:p>
+            <a:r>
+              <a:rPr lang="en-US" sz="1600" dirty="0"/>
+              <a:t>Kentucky has the highest ABV beer at 12.5%, which is called ‘London Balling’,  made by Against the Grain Brewery, located in Louisville, KY.</a:t>
+            </a:r>
+          </a:p>
+          <a:p>
+            <a:endParaRPr lang="en-US" sz="1600" dirty="0"/>
+          </a:p>
+          <a:p>
+            <a:r>
+              <a:rPr lang="en-US" sz="1600" dirty="0"/>
+              <a:t>Oregon has the highest IBU beer at 138, which is called ‘Bitter Bitch Imperial IPA’, made by Astoria Brewing Company, located in Astoria, OR.</a:t>
+            </a:r>
+          </a:p>
+        </p:txBody>
+      </p:sp>
+      <p:sp>
+        <p:nvSpPr>
+          <p:cNvPr id="13" name="Rectangle 12">
+            <a:extLst>
+              <a:ext uri="{FF2B5EF4-FFF2-40B4-BE49-F238E27FC236}">
+                <a16:creationId xmlns:a16="http://schemas.microsoft.com/office/drawing/2014/main" id="{1E5777CD-2E57-41FD-A85C-A1A8403F60F8}"/>
+              </a:ext>
+            </a:extLst>
+          </p:cNvPr>
+          <p:cNvSpPr/>
+          <p:nvPr/>
+        </p:nvSpPr>
+        <p:spPr>
+          <a:xfrm>
+            <a:off x="0" y="5599111"/>
+            <a:ext cx="8503414" cy="369332"/>
+          </a:xfrm>
+          <a:prstGeom prst="rect">
+            <a:avLst/>
+          </a:prstGeom>
+        </p:spPr>
+        <p:txBody>
+          <a:bodyPr wrap="square">
+            <a:spAutoFit/>
+          </a:bodyPr>
+          <a:lstStyle/>
+          <a:p>
+            <a:pPr algn="ctr"/>
+            <a:r>
+              <a:rPr lang="en-US" dirty="0">
+                <a:solidFill>
+                  <a:srgbClr val="C00000"/>
+                </a:solidFill>
+              </a:rPr>
+              <a:t>[ insert max plot]</a:t>
+            </a:r>
+          </a:p>
+        </p:txBody>
+      </p:sp>
       <p:pic>
         <p:nvPicPr>
-          <p:cNvPr id="9" name="Picture 8">
-            <a:extLst>
-              <a:ext uri="{FF2B5EF4-FFF2-40B4-BE49-F238E27FC236}">
-                <a16:creationId xmlns:a16="http://schemas.microsoft.com/office/drawing/2014/main" id="{1D855B2C-13BC-44FF-8E12-8CAC142FA867}"/>
+          <p:cNvPr id="8" name="Picture 7">
+            <a:extLst>
+              <a:ext uri="{FF2B5EF4-FFF2-40B4-BE49-F238E27FC236}">
+                <a16:creationId xmlns:a16="http://schemas.microsoft.com/office/drawing/2014/main" id="{4625F598-EB35-4FD1-B194-C6C9F2E4B1A4}"/>
               </a:ext>
             </a:extLst>
           </p:cNvPr>
@@ -5913,108 +6262,125 @@
           </p:cNvPicPr>
           <p:nvPr/>
         </p:nvPicPr>
-        <p:blipFill rotWithShape="1">
+        <p:blipFill>
           <a:blip r:embed="rId3"/>
-          <a:srcRect t="4905"/>
-          <a:stretch/>
+          <a:stretch>
+            <a:fillRect/>
+          </a:stretch>
         </p:blipFill>
         <p:spPr>
           <a:xfrm>
-            <a:off x="493878" y="2326172"/>
-            <a:ext cx="5543550" cy="516299"/>
+            <a:off x="574876" y="2504579"/>
+            <a:ext cx="8400783" cy="3490258"/>
           </a:xfrm>
           <a:prstGeom prst="rect">
             <a:avLst/>
           </a:prstGeom>
+          <a:ln>
+            <a:solidFill>
+              <a:schemeClr val="bg1">
+                <a:lumMod val="75000"/>
+              </a:schemeClr>
+            </a:solidFill>
+          </a:ln>
         </p:spPr>
       </p:pic>
-      <p:pic>
-        <p:nvPicPr>
-          <p:cNvPr id="3" name="Picture 2">
-            <a:extLst>
-              <a:ext uri="{FF2B5EF4-FFF2-40B4-BE49-F238E27FC236}">
-                <a16:creationId xmlns:a16="http://schemas.microsoft.com/office/drawing/2014/main" id="{22D563AF-E802-4FF9-98FA-DF1045AEE9CA}"/>
-              </a:ext>
-            </a:extLst>
-          </p:cNvPr>
-          <p:cNvPicPr>
-            <a:picLocks noChangeAspect="1"/>
-          </p:cNvPicPr>
+      <p:sp>
+        <p:nvSpPr>
+          <p:cNvPr id="10" name="Arrow: Down 9">
+            <a:extLst>
+              <a:ext uri="{FF2B5EF4-FFF2-40B4-BE49-F238E27FC236}">
+                <a16:creationId xmlns:a16="http://schemas.microsoft.com/office/drawing/2014/main" id="{E77DAADB-29EE-4C62-96F6-649B18319293}"/>
+              </a:ext>
+            </a:extLst>
+          </p:cNvPr>
+          <p:cNvSpPr/>
           <p:nvPr/>
-        </p:nvPicPr>
-        <p:blipFill rotWithShape="1">
-          <a:blip r:embed="rId4"/>
-          <a:srcRect t="1517" b="1"/>
-          <a:stretch/>
-        </p:blipFill>
-        <p:spPr>
-          <a:xfrm>
-            <a:off x="493878" y="3114317"/>
-            <a:ext cx="5743043" cy="2917818"/>
-          </a:xfrm>
-          <a:prstGeom prst="rect">
+        </p:nvSpPr>
+        <p:spPr>
+          <a:xfrm>
+            <a:off x="3113570" y="2856952"/>
+            <a:ext cx="97156" cy="152400"/>
+          </a:xfrm>
+          <a:prstGeom prst="downArrow">
             <a:avLst/>
           </a:prstGeom>
         </p:spPr>
-      </p:pic>
-      <p:sp>
-        <p:nvSpPr>
-          <p:cNvPr id="10" name="TextBox 9">
-            <a:extLst>
-              <a:ext uri="{FF2B5EF4-FFF2-40B4-BE49-F238E27FC236}">
-                <a16:creationId xmlns:a16="http://schemas.microsoft.com/office/drawing/2014/main" id="{0555177E-5254-4035-BECD-12641885622F}"/>
-              </a:ext>
-            </a:extLst>
-          </p:cNvPr>
-          <p:cNvSpPr txBox="1"/>
+        <p:style>
+          <a:lnRef idx="2">
+            <a:schemeClr val="accent1">
+              <a:shade val="50000"/>
+            </a:schemeClr>
+          </a:lnRef>
+          <a:fillRef idx="1">
+            <a:schemeClr val="accent1"/>
+          </a:fillRef>
+          <a:effectRef idx="0">
+            <a:schemeClr val="accent1"/>
+          </a:effectRef>
+          <a:fontRef idx="minor">
+            <a:schemeClr val="lt1"/>
+          </a:fontRef>
+        </p:style>
+        <p:txBody>
+          <a:bodyPr rtlCol="0" anchor="ctr"/>
+          <a:lstStyle/>
+          <a:p>
+            <a:pPr algn="ctr"/>
+            <a:endParaRPr lang="en-US"/>
+          </a:p>
+        </p:txBody>
+      </p:sp>
+      <p:sp>
+        <p:nvSpPr>
+          <p:cNvPr id="11" name="Arrow: Down 10">
+            <a:extLst>
+              <a:ext uri="{FF2B5EF4-FFF2-40B4-BE49-F238E27FC236}">
+                <a16:creationId xmlns:a16="http://schemas.microsoft.com/office/drawing/2014/main" id="{BC974B24-0D4C-42D4-A8BF-824D7D751CA5}"/>
+              </a:ext>
+            </a:extLst>
+          </p:cNvPr>
+          <p:cNvSpPr/>
           <p:nvPr/>
         </p:nvSpPr>
         <p:spPr>
           <a:xfrm>
-            <a:off x="493878" y="1173007"/>
-            <a:ext cx="8262997" cy="1200329"/>
-          </a:xfrm>
-          <a:prstGeom prst="rect">
+            <a:off x="5555535" y="2591325"/>
+            <a:ext cx="97156" cy="265627"/>
+          </a:xfrm>
+          <a:prstGeom prst="downArrow">
             <a:avLst/>
           </a:prstGeom>
-          <a:noFill/>
-        </p:spPr>
-        <p:txBody>
-          <a:bodyPr wrap="square" rtlCol="0">
-            <a:spAutoFit/>
-          </a:bodyPr>
-          <a:lstStyle/>
-          <a:p>
-            <a:r>
-              <a:rPr lang="en-US" dirty="0"/>
-              <a:t>Below are the summary statistics of ABV for craft beers.  This shows the minimum, maximum, median, and 1</a:t>
-            </a:r>
-            <a:r>
-              <a:rPr lang="en-US" baseline="30000" dirty="0"/>
-              <a:t>st</a:t>
-            </a:r>
-            <a:r>
-              <a:rPr lang="en-US" dirty="0"/>
-              <a:t> &amp; 3</a:t>
-            </a:r>
-            <a:r>
-              <a:rPr lang="en-US" baseline="30000" dirty="0"/>
-              <a:t>rd</a:t>
-            </a:r>
-            <a:r>
-              <a:rPr lang="en-US" dirty="0"/>
-              <a:t> quartiles of the data set.  The outliers have a higher ABV than the rest of the dataset.  </a:t>
-            </a:r>
-          </a:p>
-          <a:p>
-            <a:endParaRPr lang="en-US" dirty="0"/>
+        </p:spPr>
+        <p:style>
+          <a:lnRef idx="2">
+            <a:schemeClr val="accent1">
+              <a:shade val="50000"/>
+            </a:schemeClr>
+          </a:lnRef>
+          <a:fillRef idx="1">
+            <a:schemeClr val="accent1"/>
+          </a:fillRef>
+          <a:effectRef idx="0">
+            <a:schemeClr val="accent1"/>
+          </a:effectRef>
+          <a:fontRef idx="minor">
+            <a:schemeClr val="lt1"/>
+          </a:fontRef>
+        </p:style>
+        <p:txBody>
+          <a:bodyPr rtlCol="0" anchor="ctr"/>
+          <a:lstStyle/>
+          <a:p>
+            <a:pPr algn="ctr"/>
+            <a:endParaRPr lang="en-US"/>
           </a:p>
         </p:txBody>
       </p:sp>
     </p:spTree>
     <p:extLst>
       <p:ext uri="{BB962C8B-B14F-4D97-AF65-F5344CB8AC3E}">
-        <p14:creationId xmlns:p14="http://schemas.microsoft.com/office/powerpoint/2010/main" val="3493497212"/>
+        <p14:creationId xmlns:p14="http://schemas.microsoft.com/office/powerpoint/2010/main" val="4080758490"/>
       </p:ext>
     </p:extLst>
   </p:cSld>
@@ -6059,8 +6425,8 @@
         </p:nvSpPr>
         <p:spPr>
           <a:xfrm>
-            <a:off x="552450" y="336771"/>
-            <a:ext cx="7777222" cy="780398"/>
+            <a:off x="497711" y="336771"/>
+            <a:ext cx="7886700" cy="780398"/>
           </a:xfrm>
         </p:spPr>
         <p:txBody>
@@ -6166,10 +6532,10 @@
       </p:cxnSp>
       <p:pic>
         <p:nvPicPr>
-          <p:cNvPr id="13" name="Picture 12">
-            <a:extLst>
-              <a:ext uri="{FF2B5EF4-FFF2-40B4-BE49-F238E27FC236}">
-                <a16:creationId xmlns:a16="http://schemas.microsoft.com/office/drawing/2014/main" id="{69A86DBA-562E-4E48-B1FB-0A759464DA36}"/>
+          <p:cNvPr id="9" name="Picture 8">
+            <a:extLst>
+              <a:ext uri="{FF2B5EF4-FFF2-40B4-BE49-F238E27FC236}">
+                <a16:creationId xmlns:a16="http://schemas.microsoft.com/office/drawing/2014/main" id="{1D855B2C-13BC-44FF-8E12-8CAC142FA867}"/>
               </a:ext>
             </a:extLst>
           </p:cNvPr>
@@ -6180,13 +6546,13 @@
         </p:nvPicPr>
         <p:blipFill rotWithShape="1">
           <a:blip r:embed="rId3"/>
-          <a:srcRect t="1453"/>
+          <a:srcRect t="4905" b="7276"/>
           <a:stretch/>
         </p:blipFill>
         <p:spPr>
           <a:xfrm>
-            <a:off x="388271" y="2479239"/>
-            <a:ext cx="8134274" cy="3262901"/>
+            <a:off x="574876" y="2335061"/>
+            <a:ext cx="5543550" cy="476793"/>
           </a:xfrm>
           <a:prstGeom prst="rect">
             <a:avLst/>
@@ -6195,10 +6561,10 @@
       </p:pic>
       <p:sp>
         <p:nvSpPr>
-          <p:cNvPr id="15" name="TextBox 14">
-            <a:extLst>
-              <a:ext uri="{FF2B5EF4-FFF2-40B4-BE49-F238E27FC236}">
-                <a16:creationId xmlns:a16="http://schemas.microsoft.com/office/drawing/2014/main" id="{303B690A-98D9-4FB5-8EA2-7534E462A6AF}"/>
+          <p:cNvPr id="10" name="TextBox 9">
+            <a:extLst>
+              <a:ext uri="{FF2B5EF4-FFF2-40B4-BE49-F238E27FC236}">
+                <a16:creationId xmlns:a16="http://schemas.microsoft.com/office/drawing/2014/main" id="{0555177E-5254-4035-BECD-12641885622F}"/>
               </a:ext>
             </a:extLst>
           </p:cNvPr>
@@ -6207,8 +6573,8 @@
         </p:nvSpPr>
         <p:spPr>
           <a:xfrm>
-            <a:off x="520527" y="1115860"/>
-            <a:ext cx="7869763" cy="1754326"/>
+            <a:off x="493878" y="1073532"/>
+            <a:ext cx="8262997" cy="1200329"/>
           </a:xfrm>
           <a:prstGeom prst="rect">
             <a:avLst/>
@@ -6223,100 +6589,81 @@
           <a:p>
             <a:r>
               <a:rPr lang="en-US" dirty="0"/>
-              <a:t>The distribution of ABV is slightly right-skewed.  The data is concentrated at 0.050.  There are 31 outliers of 0.096 and above.  According to Central Limit Theorem (n =1405 &gt; 30), the population of the ABV is normally distributed.  The 95 percent confidence interval:  0.05920729 0.06063020</a:t>
+              <a:t>Below are the summary statistics of ABV for craft beers.  This shows the minimum, maximum, median, and 1</a:t>
+            </a:r>
+            <a:r>
+              <a:rPr lang="en-US" baseline="30000" dirty="0"/>
+              <a:t>st</a:t>
+            </a:r>
+            <a:r>
+              <a:rPr lang="en-US" dirty="0"/>
+              <a:t> &amp; 3</a:t>
+            </a:r>
+            <a:r>
+              <a:rPr lang="en-US" baseline="30000" dirty="0"/>
+              <a:t>rd</a:t>
+            </a:r>
+            <a:r>
+              <a:rPr lang="en-US" dirty="0"/>
+              <a:t> quartiles of the data set.  The outliers have a higher ABV than the rest of the dataset.  </a:t>
             </a:r>
           </a:p>
           <a:p>
             <a:endParaRPr lang="en-US" dirty="0"/>
           </a:p>
-          <a:p>
-            <a:endParaRPr lang="en-US" dirty="0"/>
-          </a:p>
-        </p:txBody>
-      </p:sp>
-      <p:sp>
-        <p:nvSpPr>
-          <p:cNvPr id="3" name="Right Brace 2">
-            <a:extLst>
-              <a:ext uri="{FF2B5EF4-FFF2-40B4-BE49-F238E27FC236}">
-                <a16:creationId xmlns:a16="http://schemas.microsoft.com/office/drawing/2014/main" id="{72221DB8-07CA-4ACA-9576-E4BF40499387}"/>
-              </a:ext>
-            </a:extLst>
-          </p:cNvPr>
-          <p:cNvSpPr/>
+        </p:txBody>
+      </p:sp>
+      <p:pic>
+        <p:nvPicPr>
+          <p:cNvPr id="2050" name="Picture 2">
+            <a:extLst>
+              <a:ext uri="{FF2B5EF4-FFF2-40B4-BE49-F238E27FC236}">
+                <a16:creationId xmlns:a16="http://schemas.microsoft.com/office/drawing/2014/main" id="{0F428284-41EC-46CF-BD07-ADFE5DADDC67}"/>
+              </a:ext>
+            </a:extLst>
+          </p:cNvPr>
+          <p:cNvPicPr>
+            <a:picLocks noChangeAspect="1" noChangeArrowheads="1"/>
+          </p:cNvPicPr>
           <p:nvPr/>
-        </p:nvSpPr>
-        <p:spPr>
-          <a:xfrm rot="5400000">
-            <a:off x="5826918" y="5230172"/>
-            <a:ext cx="176214" cy="847725"/>
-          </a:xfrm>
-          <a:prstGeom prst="rightBrace">
-            <a:avLst/>
-          </a:prstGeom>
-        </p:spPr>
-        <p:style>
-          <a:lnRef idx="1">
-            <a:schemeClr val="accent1"/>
-          </a:lnRef>
-          <a:fillRef idx="0">
-            <a:schemeClr val="accent1"/>
-          </a:fillRef>
-          <a:effectRef idx="0">
-            <a:schemeClr val="accent1"/>
-          </a:effectRef>
-          <a:fontRef idx="minor">
-            <a:schemeClr val="tx1"/>
-          </a:fontRef>
-        </p:style>
-        <p:txBody>
-          <a:bodyPr rtlCol="0" anchor="ctr"/>
-          <a:lstStyle/>
-          <a:p>
-            <a:pPr algn="ctr"/>
-            <a:endParaRPr lang="en-US"/>
-          </a:p>
-        </p:txBody>
-      </p:sp>
-      <p:sp>
-        <p:nvSpPr>
-          <p:cNvPr id="4" name="TextBox 3">
-            <a:extLst>
-              <a:ext uri="{FF2B5EF4-FFF2-40B4-BE49-F238E27FC236}">
-                <a16:creationId xmlns:a16="http://schemas.microsoft.com/office/drawing/2014/main" id="{A7BD6F0B-2C9D-4FFC-9E37-322455463167}"/>
-              </a:ext>
-            </a:extLst>
-          </p:cNvPr>
-          <p:cNvSpPr txBox="1"/>
-          <p:nvPr/>
-        </p:nvSpPr>
-        <p:spPr>
-          <a:xfrm>
-            <a:off x="5491162" y="5739660"/>
-            <a:ext cx="1009651" cy="369332"/>
+        </p:nvPicPr>
+        <p:blipFill>
+          <a:blip r:embed="rId4">
+            <a:extLst>
+              <a:ext uri="{28A0092B-C50C-407E-A947-70E740481C1C}">
+                <a14:useLocalDpi xmlns:a14="http://schemas.microsoft.com/office/drawing/2010/main" val="0"/>
+              </a:ext>
+            </a:extLst>
+          </a:blip>
+          <a:srcRect/>
+          <a:stretch>
+            <a:fillRect/>
+          </a:stretch>
+        </p:blipFill>
+        <p:spPr bwMode="auto">
+          <a:xfrm>
+            <a:off x="493878" y="3000195"/>
+            <a:ext cx="4989028" cy="3563344"/>
           </a:xfrm>
           <a:prstGeom prst="rect">
             <a:avLst/>
           </a:prstGeom>
           <a:noFill/>
-        </p:spPr>
-        <p:txBody>
-          <a:bodyPr wrap="square" rtlCol="0">
-            <a:spAutoFit/>
-          </a:bodyPr>
-          <a:lstStyle/>
-          <a:p>
-            <a:r>
-              <a:rPr lang="en-US" dirty="0"/>
-              <a:t>outliers</a:t>
-            </a:r>
-          </a:p>
-        </p:txBody>
-      </p:sp>
+          <a:extLst>
+            <a:ext uri="{909E8E84-426E-40DD-AFC4-6F175D3DCCD1}">
+              <a14:hiddenFill xmlns:a14="http://schemas.microsoft.com/office/drawing/2010/main">
+                <a:solidFill>
+                  <a:srgbClr val="FFFFFF"/>
+                </a:solidFill>
+              </a14:hiddenFill>
+            </a:ext>
+          </a:extLst>
+        </p:spPr>
+      </p:pic>
     </p:spTree>
     <p:extLst>
       <p:ext uri="{BB962C8B-B14F-4D97-AF65-F5344CB8AC3E}">
-        <p14:creationId xmlns:p14="http://schemas.microsoft.com/office/powerpoint/2010/main" val="2944746457"/>
+        <p14:creationId xmlns:p14="http://schemas.microsoft.com/office/powerpoint/2010/main" val="3493497212"/>
       </p:ext>
     </p:extLst>
   </p:cSld>
@@ -6343,6 +6690,53 @@
           <a:chExt cx="0" cy="0"/>
         </a:xfrm>
       </p:grpSpPr>
+      <p:pic>
+        <p:nvPicPr>
+          <p:cNvPr id="3076" name="Picture 4">
+            <a:extLst>
+              <a:ext uri="{FF2B5EF4-FFF2-40B4-BE49-F238E27FC236}">
+                <a16:creationId xmlns:a16="http://schemas.microsoft.com/office/drawing/2014/main" id="{FB3D9696-BDF3-41E3-9CD5-EB7CF8C87445}"/>
+              </a:ext>
+            </a:extLst>
+          </p:cNvPr>
+          <p:cNvPicPr>
+            <a:picLocks noChangeAspect="1" noChangeArrowheads="1"/>
+          </p:cNvPicPr>
+          <p:nvPr/>
+        </p:nvPicPr>
+        <p:blipFill>
+          <a:blip r:embed="rId2">
+            <a:extLst>
+              <a:ext uri="{28A0092B-C50C-407E-A947-70E740481C1C}">
+                <a14:useLocalDpi xmlns:a14="http://schemas.microsoft.com/office/drawing/2010/main" val="0"/>
+              </a:ext>
+            </a:extLst>
+          </a:blip>
+          <a:srcRect/>
+          <a:stretch>
+            <a:fillRect/>
+          </a:stretch>
+        </p:blipFill>
+        <p:spPr bwMode="auto">
+          <a:xfrm>
+            <a:off x="574876" y="2375435"/>
+            <a:ext cx="7288418" cy="3644209"/>
+          </a:xfrm>
+          <a:prstGeom prst="rect">
+            <a:avLst/>
+          </a:prstGeom>
+          <a:noFill/>
+          <a:extLst>
+            <a:ext uri="{909E8E84-426E-40DD-AFC4-6F175D3DCCD1}">
+              <a14:hiddenFill xmlns:a14="http://schemas.microsoft.com/office/drawing/2010/main">
+                <a:solidFill>
+                  <a:srgbClr val="FFFFFF"/>
+                </a:solidFill>
+              </a14:hiddenFill>
+            </a:ext>
+          </a:extLst>
+        </p:spPr>
+      </p:pic>
       <p:sp>
         <p:nvSpPr>
           <p:cNvPr id="2" name="Title 1">
@@ -6361,18 +6755,18 @@
         </p:nvSpPr>
         <p:spPr>
           <a:xfrm>
-            <a:off x="497711" y="336771"/>
-            <a:ext cx="7886700" cy="780398"/>
+            <a:off x="552450" y="336771"/>
+            <a:ext cx="7777222" cy="780398"/>
           </a:xfrm>
         </p:spPr>
         <p:txBody>
           <a:bodyPr>
-            <a:normAutofit/>
+            <a:normAutofit fontScale="90000"/>
           </a:bodyPr>
           <a:lstStyle/>
           <a:p>
             <a:r>
-              <a:rPr lang="en-US" sz="2200" dirty="0">
+              <a:rPr lang="en-US" sz="2800" dirty="0">
                 <a:solidFill>
                   <a:schemeClr val="tx1">
                     <a:lumMod val="65000"/>
@@ -6380,7 +6774,7 @@
                   </a:schemeClr>
                 </a:solidFill>
               </a:rPr>
-              <a:t>Is there a relationship between bitterness and alcohol content?</a:t>
+              <a:t>What are the summary statistics and distribution of ABV?</a:t>
             </a:r>
           </a:p>
         </p:txBody>
@@ -6400,7 +6794,7 @@
           <p:nvPr/>
         </p:nvPicPr>
         <p:blipFill>
-          <a:blip r:embed="rId2">
+          <a:blip r:embed="rId3">
             <a:extLst>
               <a:ext uri="{28A0092B-C50C-407E-A947-70E740481C1C}">
                 <a14:useLocalDpi xmlns:a14="http://schemas.microsoft.com/office/drawing/2010/main" val="0"/>
@@ -6466,41 +6860,53 @@
           </a:fontRef>
         </p:style>
       </p:cxnSp>
-      <p:pic>
-        <p:nvPicPr>
-          <p:cNvPr id="8" name="Picture 7">
-            <a:extLst>
-              <a:ext uri="{FF2B5EF4-FFF2-40B4-BE49-F238E27FC236}">
-                <a16:creationId xmlns:a16="http://schemas.microsoft.com/office/drawing/2014/main" id="{673CDEBA-5C19-4505-8A95-2D4A308EC684}"/>
-              </a:ext>
-            </a:extLst>
-          </p:cNvPr>
-          <p:cNvPicPr>
-            <a:picLocks noChangeAspect="1"/>
-          </p:cNvPicPr>
+      <p:sp>
+        <p:nvSpPr>
+          <p:cNvPr id="15" name="TextBox 14">
+            <a:extLst>
+              <a:ext uri="{FF2B5EF4-FFF2-40B4-BE49-F238E27FC236}">
+                <a16:creationId xmlns:a16="http://schemas.microsoft.com/office/drawing/2014/main" id="{303B690A-98D9-4FB5-8EA2-7534E462A6AF}"/>
+              </a:ext>
+            </a:extLst>
+          </p:cNvPr>
+          <p:cNvSpPr txBox="1"/>
           <p:nvPr/>
-        </p:nvPicPr>
-        <p:blipFill rotWithShape="1">
-          <a:blip r:embed="rId3"/>
-          <a:srcRect t="1563"/>
-          <a:stretch/>
-        </p:blipFill>
-        <p:spPr>
-          <a:xfrm>
-            <a:off x="497711" y="2475384"/>
-            <a:ext cx="7832025" cy="3371005"/>
+        </p:nvSpPr>
+        <p:spPr>
+          <a:xfrm>
+            <a:off x="520526" y="1066302"/>
+            <a:ext cx="7869763" cy="1754326"/>
           </a:xfrm>
           <a:prstGeom prst="rect">
             <a:avLst/>
           </a:prstGeom>
-        </p:spPr>
-      </p:pic>
-      <p:sp>
-        <p:nvSpPr>
-          <p:cNvPr id="11" name="Rectangle 10">
-            <a:extLst>
-              <a:ext uri="{FF2B5EF4-FFF2-40B4-BE49-F238E27FC236}">
-                <a16:creationId xmlns:a16="http://schemas.microsoft.com/office/drawing/2014/main" id="{2AE95AC1-8A01-4FA3-B041-99AA7191AB8F}"/>
+          <a:noFill/>
+        </p:spPr>
+        <p:txBody>
+          <a:bodyPr wrap="square" rtlCol="0">
+            <a:spAutoFit/>
+          </a:bodyPr>
+          <a:lstStyle/>
+          <a:p>
+            <a:r>
+              <a:rPr lang="en-US" dirty="0"/>
+              <a:t>The distribution of ABV is slightly right-skewed.  The data is concentrated at 0.050.  There are 31 outliers of 0.096 and above.  According to Central Limit Theorem (n =1405 &gt; 30), the population of the ABV is normally distributed.  The 95 percent confidence interval:  0.05920729 0.06063020</a:t>
+            </a:r>
+          </a:p>
+          <a:p>
+            <a:endParaRPr lang="en-US" dirty="0"/>
+          </a:p>
+          <a:p>
+            <a:endParaRPr lang="en-US" dirty="0"/>
+          </a:p>
+        </p:txBody>
+      </p:sp>
+      <p:sp>
+        <p:nvSpPr>
+          <p:cNvPr id="3" name="Right Brace 2">
+            <a:extLst>
+              <a:ext uri="{FF2B5EF4-FFF2-40B4-BE49-F238E27FC236}">
+                <a16:creationId xmlns:a16="http://schemas.microsoft.com/office/drawing/2014/main" id="{72221DB8-07CA-4ACA-9576-E4BF40499387}"/>
               </a:ext>
             </a:extLst>
           </p:cNvPr>
@@ -6508,23 +6914,68 @@
           <p:nvPr/>
         </p:nvSpPr>
         <p:spPr>
-          <a:xfrm>
-            <a:off x="415649" y="1011611"/>
-            <a:ext cx="8273064" cy="1200329"/>
+          <a:xfrm rot="5400000">
+            <a:off x="5413716" y="5642410"/>
+            <a:ext cx="176214" cy="847725"/>
+          </a:xfrm>
+          <a:prstGeom prst="rightBrace">
+            <a:avLst/>
+          </a:prstGeom>
+        </p:spPr>
+        <p:style>
+          <a:lnRef idx="1">
+            <a:schemeClr val="accent1"/>
+          </a:lnRef>
+          <a:fillRef idx="0">
+            <a:schemeClr val="accent1"/>
+          </a:fillRef>
+          <a:effectRef idx="0">
+            <a:schemeClr val="accent1"/>
+          </a:effectRef>
+          <a:fontRef idx="minor">
+            <a:schemeClr val="tx1"/>
+          </a:fontRef>
+        </p:style>
+        <p:txBody>
+          <a:bodyPr rtlCol="0" anchor="ctr"/>
+          <a:lstStyle/>
+          <a:p>
+            <a:pPr algn="ctr"/>
+            <a:endParaRPr lang="en-US"/>
+          </a:p>
+        </p:txBody>
+      </p:sp>
+      <p:sp>
+        <p:nvSpPr>
+          <p:cNvPr id="4" name="TextBox 3">
+            <a:extLst>
+              <a:ext uri="{FF2B5EF4-FFF2-40B4-BE49-F238E27FC236}">
+                <a16:creationId xmlns:a16="http://schemas.microsoft.com/office/drawing/2014/main" id="{A7BD6F0B-2C9D-4FFC-9E37-322455463167}"/>
+              </a:ext>
+            </a:extLst>
+          </p:cNvPr>
+          <p:cNvSpPr txBox="1"/>
+          <p:nvPr/>
+        </p:nvSpPr>
+        <p:spPr>
+          <a:xfrm>
+            <a:off x="5077960" y="6151898"/>
+            <a:ext cx="1009651" cy="369332"/>
           </a:xfrm>
           <a:prstGeom prst="rect">
             <a:avLst/>
           </a:prstGeom>
-        </p:spPr>
-        <p:txBody>
-          <a:bodyPr wrap="square">
+          <a:noFill/>
+        </p:spPr>
+        <p:txBody>
+          <a:bodyPr wrap="square" rtlCol="0">
             <a:spAutoFit/>
           </a:bodyPr>
           <a:lstStyle/>
           <a:p>
             <a:r>
               <a:rPr lang="en-US" dirty="0"/>
-              <a:t>Higher ABV values are associated with higher IBUs and vice versa.  With p-value &lt; 2.2e-16, there is sufficient evidence at alpha = .05 level of significance to suggest that the data is linearly correlated. Correlation estimate = 0.67 suggests that the relationship between IBU and ABV is positive and strong.</a:t>
+              <a:t>outliers</a:t>
             </a:r>
           </a:p>
         </p:txBody>
@@ -6532,7 +6983,7 @@
     </p:spTree>
     <p:extLst>
       <p:ext uri="{BB962C8B-B14F-4D97-AF65-F5344CB8AC3E}">
-        <p14:creationId xmlns:p14="http://schemas.microsoft.com/office/powerpoint/2010/main" val="2887043045"/>
+        <p14:creationId xmlns:p14="http://schemas.microsoft.com/office/powerpoint/2010/main" val="2944746457"/>
       </p:ext>
     </p:extLst>
   </p:cSld>
@@ -6596,7 +7047,7 @@
                   </a:schemeClr>
                 </a:solidFill>
               </a:rPr>
-              <a:t>What is the difference in ABV and IBU between IPAs and other Ales?</a:t>
+              <a:t>Is there a relationship between bitterness and alcohol content?</a:t>
             </a:r>
           </a:p>
         </p:txBody>
@@ -6682,73 +7133,91 @@
           </a:fontRef>
         </p:style>
       </p:cxnSp>
+      <p:sp>
+        <p:nvSpPr>
+          <p:cNvPr id="11" name="Rectangle 10">
+            <a:extLst>
+              <a:ext uri="{FF2B5EF4-FFF2-40B4-BE49-F238E27FC236}">
+                <a16:creationId xmlns:a16="http://schemas.microsoft.com/office/drawing/2014/main" id="{2AE95AC1-8A01-4FA3-B041-99AA7191AB8F}"/>
+              </a:ext>
+            </a:extLst>
+          </p:cNvPr>
+          <p:cNvSpPr/>
+          <p:nvPr/>
+        </p:nvSpPr>
+        <p:spPr>
+          <a:xfrm>
+            <a:off x="474050" y="1023088"/>
+            <a:ext cx="8273064" cy="1200329"/>
+          </a:xfrm>
+          <a:prstGeom prst="rect">
+            <a:avLst/>
+          </a:prstGeom>
+        </p:spPr>
+        <p:txBody>
+          <a:bodyPr wrap="square">
+            <a:spAutoFit/>
+          </a:bodyPr>
+          <a:lstStyle/>
+          <a:p>
+            <a:r>
+              <a:rPr lang="en-US" dirty="0"/>
+              <a:t>Higher ABV values are associated with higher IBUs and vice versa.  With p-value &lt; 2.2e-16, there is sufficient evidence at alpha = .05 level of significance to suggest that the data is linearly correlated. Correlation estimate = 0.67 suggests that the relationship between IBU and ABV is positive and strong.</a:t>
+            </a:r>
+          </a:p>
+        </p:txBody>
+      </p:sp>
       <p:pic>
         <p:nvPicPr>
-          <p:cNvPr id="8" name="Picture 7">
-            <a:extLst>
-              <a:ext uri="{FF2B5EF4-FFF2-40B4-BE49-F238E27FC236}">
-                <a16:creationId xmlns:a16="http://schemas.microsoft.com/office/drawing/2014/main" id="{8AFEC242-D8E1-4DDA-9C6E-F881769C6F33}"/>
+          <p:cNvPr id="4098" name="Picture 2">
+            <a:extLst>
+              <a:ext uri="{FF2B5EF4-FFF2-40B4-BE49-F238E27FC236}">
+                <a16:creationId xmlns:a16="http://schemas.microsoft.com/office/drawing/2014/main" id="{2BEA4880-864C-4FED-8310-876D2593498C}"/>
               </a:ext>
             </a:extLst>
           </p:cNvPr>
           <p:cNvPicPr>
-            <a:picLocks noChangeAspect="1"/>
+            <a:picLocks noChangeAspect="1" noChangeArrowheads="1"/>
           </p:cNvPicPr>
           <p:nvPr/>
         </p:nvPicPr>
-        <p:blipFill rotWithShape="1">
-          <a:blip r:embed="rId3"/>
-          <a:srcRect t="1687"/>
-          <a:stretch/>
+        <p:blipFill>
+          <a:blip r:embed="rId3">
+            <a:extLst>
+              <a:ext uri="{28A0092B-C50C-407E-A947-70E740481C1C}">
+                <a14:useLocalDpi xmlns:a14="http://schemas.microsoft.com/office/drawing/2010/main" val="0"/>
+              </a:ext>
+            </a:extLst>
+          </a:blip>
+          <a:srcRect/>
+          <a:stretch>
+            <a:fillRect/>
+          </a:stretch>
         </p:blipFill>
-        <p:spPr>
-          <a:xfrm>
-            <a:off x="497711" y="2033251"/>
-            <a:ext cx="8267759" cy="3329079"/>
+        <p:spPr bwMode="auto">
+          <a:xfrm>
+            <a:off x="544269" y="2301238"/>
+            <a:ext cx="7661448" cy="3830724"/>
           </a:xfrm>
           <a:prstGeom prst="rect">
             <a:avLst/>
           </a:prstGeom>
+          <a:noFill/>
+          <a:extLst>
+            <a:ext uri="{909E8E84-426E-40DD-AFC4-6F175D3DCCD1}">
+              <a14:hiddenFill xmlns:a14="http://schemas.microsoft.com/office/drawing/2010/main">
+                <a:solidFill>
+                  <a:srgbClr val="FFFFFF"/>
+                </a:solidFill>
+              </a14:hiddenFill>
+            </a:ext>
+          </a:extLst>
         </p:spPr>
       </p:pic>
-      <p:sp>
-        <p:nvSpPr>
-          <p:cNvPr id="9" name="Rectangle 8">
-            <a:extLst>
-              <a:ext uri="{FF2B5EF4-FFF2-40B4-BE49-F238E27FC236}">
-                <a16:creationId xmlns:a16="http://schemas.microsoft.com/office/drawing/2014/main" id="{D3662D42-9512-446C-BE69-C03097B0858E}"/>
-              </a:ext>
-            </a:extLst>
-          </p:cNvPr>
-          <p:cNvSpPr/>
-          <p:nvPr/>
-        </p:nvSpPr>
-        <p:spPr>
-          <a:xfrm>
-            <a:off x="497711" y="1018454"/>
-            <a:ext cx="8273064" cy="369332"/>
-          </a:xfrm>
-          <a:prstGeom prst="rect">
-            <a:avLst/>
-          </a:prstGeom>
-        </p:spPr>
-        <p:txBody>
-          <a:bodyPr wrap="square">
-            <a:spAutoFit/>
-          </a:bodyPr>
-          <a:lstStyle/>
-          <a:p>
-            <a:r>
-              <a:rPr lang="en-US" dirty="0"/>
-              <a:t>IPAs have higher average ABV and IBU than other ales.</a:t>
-            </a:r>
-          </a:p>
-        </p:txBody>
-      </p:sp>
     </p:spTree>
     <p:extLst>
       <p:ext uri="{BB962C8B-B14F-4D97-AF65-F5344CB8AC3E}">
-        <p14:creationId xmlns:p14="http://schemas.microsoft.com/office/powerpoint/2010/main" val="2445654958"/>
+        <p14:creationId xmlns:p14="http://schemas.microsoft.com/office/powerpoint/2010/main" val="2887043045"/>
       </p:ext>
     </p:extLst>
   </p:cSld>

</xml_diff>

<commit_message>
Updated ppt, RMD, and HTML files
</commit_message>
<xml_diff>
--- a/case_study_1_budweiser.pptx
+++ b/case_study_1_budweiser.pptx
@@ -270,7 +270,7 @@
           <a:p>
             <a:fld id="{31CA373E-4619-4AD9-9A1C-1502F6556AAC}" type="datetimeFigureOut">
               <a:rPr lang="en-US" smtClean="0"/>
-              <a:t>1/16/2020</a:t>
+              <a:t>1/17/2020</a:t>
             </a:fld>
             <a:endParaRPr lang="en-US"/>
           </a:p>
@@ -440,7 +440,7 @@
           <a:p>
             <a:fld id="{31CA373E-4619-4AD9-9A1C-1502F6556AAC}" type="datetimeFigureOut">
               <a:rPr lang="en-US" smtClean="0"/>
-              <a:t>1/16/2020</a:t>
+              <a:t>1/17/2020</a:t>
             </a:fld>
             <a:endParaRPr lang="en-US"/>
           </a:p>
@@ -620,7 +620,7 @@
           <a:p>
             <a:fld id="{31CA373E-4619-4AD9-9A1C-1502F6556AAC}" type="datetimeFigureOut">
               <a:rPr lang="en-US" smtClean="0"/>
-              <a:t>1/16/2020</a:t>
+              <a:t>1/17/2020</a:t>
             </a:fld>
             <a:endParaRPr lang="en-US"/>
           </a:p>
@@ -790,7 +790,7 @@
           <a:p>
             <a:fld id="{31CA373E-4619-4AD9-9A1C-1502F6556AAC}" type="datetimeFigureOut">
               <a:rPr lang="en-US" smtClean="0"/>
-              <a:t>1/16/2020</a:t>
+              <a:t>1/17/2020</a:t>
             </a:fld>
             <a:endParaRPr lang="en-US"/>
           </a:p>
@@ -1034,7 +1034,7 @@
           <a:p>
             <a:fld id="{31CA373E-4619-4AD9-9A1C-1502F6556AAC}" type="datetimeFigureOut">
               <a:rPr lang="en-US" smtClean="0"/>
-              <a:t>1/16/2020</a:t>
+              <a:t>1/17/2020</a:t>
             </a:fld>
             <a:endParaRPr lang="en-US"/>
           </a:p>
@@ -1266,7 +1266,7 @@
           <a:p>
             <a:fld id="{31CA373E-4619-4AD9-9A1C-1502F6556AAC}" type="datetimeFigureOut">
               <a:rPr lang="en-US" smtClean="0"/>
-              <a:t>1/16/2020</a:t>
+              <a:t>1/17/2020</a:t>
             </a:fld>
             <a:endParaRPr lang="en-US"/>
           </a:p>
@@ -1633,7 +1633,7 @@
           <a:p>
             <a:fld id="{31CA373E-4619-4AD9-9A1C-1502F6556AAC}" type="datetimeFigureOut">
               <a:rPr lang="en-US" smtClean="0"/>
-              <a:t>1/16/2020</a:t>
+              <a:t>1/17/2020</a:t>
             </a:fld>
             <a:endParaRPr lang="en-US"/>
           </a:p>
@@ -1751,7 +1751,7 @@
           <a:p>
             <a:fld id="{31CA373E-4619-4AD9-9A1C-1502F6556AAC}" type="datetimeFigureOut">
               <a:rPr lang="en-US" smtClean="0"/>
-              <a:t>1/16/2020</a:t>
+              <a:t>1/17/2020</a:t>
             </a:fld>
             <a:endParaRPr lang="en-US"/>
           </a:p>
@@ -1846,7 +1846,7 @@
           <a:p>
             <a:fld id="{31CA373E-4619-4AD9-9A1C-1502F6556AAC}" type="datetimeFigureOut">
               <a:rPr lang="en-US" smtClean="0"/>
-              <a:t>1/16/2020</a:t>
+              <a:t>1/17/2020</a:t>
             </a:fld>
             <a:endParaRPr lang="en-US"/>
           </a:p>
@@ -2123,7 +2123,7 @@
           <a:p>
             <a:fld id="{31CA373E-4619-4AD9-9A1C-1502F6556AAC}" type="datetimeFigureOut">
               <a:rPr lang="en-US" smtClean="0"/>
-              <a:t>1/16/2020</a:t>
+              <a:t>1/17/2020</a:t>
             </a:fld>
             <a:endParaRPr lang="en-US"/>
           </a:p>
@@ -2380,7 +2380,7 @@
           <a:p>
             <a:fld id="{31CA373E-4619-4AD9-9A1C-1502F6556AAC}" type="datetimeFigureOut">
               <a:rPr lang="en-US" smtClean="0"/>
-              <a:t>1/16/2020</a:t>
+              <a:t>1/17/2020</a:t>
             </a:fld>
             <a:endParaRPr lang="en-US"/>
           </a:p>
@@ -2593,7 +2593,7 @@
           <a:p>
             <a:fld id="{31CA373E-4619-4AD9-9A1C-1502F6556AAC}" type="datetimeFigureOut">
               <a:rPr lang="en-US" smtClean="0"/>
-              <a:t>1/16/2020</a:t>
+              <a:t>1/17/2020</a:t>
             </a:fld>
             <a:endParaRPr lang="en-US"/>
           </a:p>
@@ -4460,41 +4460,142 @@
           </a:p>
         </p:txBody>
       </p:sp>
-      <p:sp>
-        <p:nvSpPr>
-          <p:cNvPr id="8" name="Rectangle 7">
-            <a:extLst>
-              <a:ext uri="{FF2B5EF4-FFF2-40B4-BE49-F238E27FC236}">
-                <a16:creationId xmlns:a16="http://schemas.microsoft.com/office/drawing/2014/main" id="{A119875C-4A68-49E9-909A-36DDE19C73F4}"/>
-              </a:ext>
-            </a:extLst>
-          </p:cNvPr>
-          <p:cNvSpPr/>
+      <p:pic>
+        <p:nvPicPr>
+          <p:cNvPr id="2050" name="Picture 2">
+            <a:extLst>
+              <a:ext uri="{FF2B5EF4-FFF2-40B4-BE49-F238E27FC236}">
+                <a16:creationId xmlns:a16="http://schemas.microsoft.com/office/drawing/2014/main" id="{A3E551EA-D569-48CB-BC74-45133F1F1FC2}"/>
+              </a:ext>
+            </a:extLst>
+          </p:cNvPr>
+          <p:cNvPicPr>
+            <a:picLocks noChangeAspect="1" noChangeArrowheads="1"/>
+          </p:cNvPicPr>
           <p:nvPr/>
-        </p:nvSpPr>
-        <p:spPr>
-          <a:xfrm>
-            <a:off x="574876" y="2691396"/>
-            <a:ext cx="8503414" cy="369332"/>
+        </p:nvPicPr>
+        <p:blipFill>
+          <a:blip r:embed="rId3">
+            <a:extLst>
+              <a:ext uri="{28A0092B-C50C-407E-A947-70E740481C1C}">
+                <a14:useLocalDpi xmlns:a14="http://schemas.microsoft.com/office/drawing/2010/main" val="0"/>
+              </a:ext>
+            </a:extLst>
+          </a:blip>
+          <a:srcRect/>
+          <a:stretch>
+            <a:fillRect/>
+          </a:stretch>
+        </p:blipFill>
+        <p:spPr bwMode="auto">
+          <a:xfrm>
+            <a:off x="574876" y="1830944"/>
+            <a:ext cx="5565760" cy="4638133"/>
           </a:xfrm>
           <a:prstGeom prst="rect">
             <a:avLst/>
           </a:prstGeom>
-        </p:spPr>
-        <p:txBody>
-          <a:bodyPr wrap="square">
+          <a:noFill/>
+          <a:extLst>
+            <a:ext uri="{909E8E84-426E-40DD-AFC4-6F175D3DCCD1}">
+              <a14:hiddenFill xmlns:a14="http://schemas.microsoft.com/office/drawing/2010/main">
+                <a:solidFill>
+                  <a:srgbClr val="FFFFFF"/>
+                </a:solidFill>
+              </a14:hiddenFill>
+            </a:ext>
+          </a:extLst>
+        </p:spPr>
+      </p:pic>
+      <p:sp>
+        <p:nvSpPr>
+          <p:cNvPr id="4" name="Star: 5 Points 3">
+            <a:extLst>
+              <a:ext uri="{FF2B5EF4-FFF2-40B4-BE49-F238E27FC236}">
+                <a16:creationId xmlns:a16="http://schemas.microsoft.com/office/drawing/2014/main" id="{3D2AE267-81E4-410A-9F96-28AA3A451A20}"/>
+              </a:ext>
+            </a:extLst>
+          </p:cNvPr>
+          <p:cNvSpPr/>
+          <p:nvPr/>
+        </p:nvSpPr>
+        <p:spPr>
+          <a:xfrm>
+            <a:off x="2111920" y="5579651"/>
+            <a:ext cx="191297" cy="187471"/>
+          </a:xfrm>
+          <a:prstGeom prst="star5">
+            <a:avLst/>
+          </a:prstGeom>
+          <a:solidFill>
+            <a:srgbClr val="FF0000"/>
+          </a:solidFill>
+        </p:spPr>
+        <p:style>
+          <a:lnRef idx="2">
+            <a:schemeClr val="accent1">
+              <a:shade val="50000"/>
+            </a:schemeClr>
+          </a:lnRef>
+          <a:fillRef idx="1">
+            <a:schemeClr val="accent1"/>
+          </a:fillRef>
+          <a:effectRef idx="0">
+            <a:schemeClr val="accent1"/>
+          </a:effectRef>
+          <a:fontRef idx="minor">
+            <a:schemeClr val="lt1"/>
+          </a:fontRef>
+        </p:style>
+        <p:txBody>
+          <a:bodyPr rtlCol="0" anchor="ctr"/>
+          <a:lstStyle/>
+          <a:p>
+            <a:pPr algn="ctr"/>
+            <a:endParaRPr lang="en-US"/>
+          </a:p>
+        </p:txBody>
+      </p:sp>
+      <p:sp>
+        <p:nvSpPr>
+          <p:cNvPr id="10" name="TextBox 9">
+            <a:extLst>
+              <a:ext uri="{FF2B5EF4-FFF2-40B4-BE49-F238E27FC236}">
+                <a16:creationId xmlns:a16="http://schemas.microsoft.com/office/drawing/2014/main" id="{708DC3C6-7AF0-4322-9C36-23DD0A9D0E10}"/>
+              </a:ext>
+            </a:extLst>
+          </p:cNvPr>
+          <p:cNvSpPr txBox="1"/>
+          <p:nvPr/>
+        </p:nvSpPr>
+        <p:spPr>
+          <a:xfrm>
+            <a:off x="1552350" y="6213452"/>
+            <a:ext cx="1400293" cy="307777"/>
+          </a:xfrm>
+          <a:prstGeom prst="rect">
+            <a:avLst/>
+          </a:prstGeom>
+          <a:solidFill>
+            <a:schemeClr val="bg1">
+              <a:alpha val="83000"/>
+            </a:schemeClr>
+          </a:solidFill>
+        </p:spPr>
+        <p:txBody>
+          <a:bodyPr wrap="square" rtlCol="0">
             <a:spAutoFit/>
           </a:bodyPr>
           <a:lstStyle/>
           <a:p>
             <a:pPr algn="ctr"/>
             <a:r>
-              <a:rPr lang="en-US" dirty="0">
+              <a:rPr lang="en-US" sz="1400" dirty="0">
                 <a:solidFill>
-                  <a:srgbClr val="C00000"/>
+                  <a:srgbClr val="FF0000"/>
                 </a:solidFill>
               </a:rPr>
-              <a:t>[insert decision boundary chart]</a:t>
+              <a:t>Budweiser</a:t>
             </a:r>
           </a:p>
         </p:txBody>
@@ -4605,7 +4706,7 @@
             </a:pPr>
             <a:r>
               <a:rPr lang="en-US" sz="1600" dirty="0"/>
-              <a:t>Budweiser might consider opening new breweries in X, Y, Z states based on ABV and IBU within those states.</a:t>
+              <a:t>Budweiser might explore new craft brewery locations in X, Y, Z states based on ABV and IBU within those states.</a:t>
             </a:r>
           </a:p>
           <a:p>
@@ -5464,53 +5565,6 @@
           <a:chExt cx="0" cy="0"/>
         </a:xfrm>
       </p:grpSpPr>
-      <p:pic>
-        <p:nvPicPr>
-          <p:cNvPr id="8" name="Picture 4">
-            <a:extLst>
-              <a:ext uri="{FF2B5EF4-FFF2-40B4-BE49-F238E27FC236}">
-                <a16:creationId xmlns:a16="http://schemas.microsoft.com/office/drawing/2014/main" id="{EAD5C34A-0B11-4369-875B-947BE70AF61D}"/>
-              </a:ext>
-            </a:extLst>
-          </p:cNvPr>
-          <p:cNvPicPr>
-            <a:picLocks noChangeAspect="1" noChangeArrowheads="1"/>
-          </p:cNvPicPr>
-          <p:nvPr/>
-        </p:nvPicPr>
-        <p:blipFill>
-          <a:blip r:embed="rId2">
-            <a:extLst>
-              <a:ext uri="{28A0092B-C50C-407E-A947-70E740481C1C}">
-                <a14:useLocalDpi xmlns:a14="http://schemas.microsoft.com/office/drawing/2010/main" val="0"/>
-              </a:ext>
-            </a:extLst>
-          </a:blip>
-          <a:srcRect/>
-          <a:stretch>
-            <a:fillRect/>
-          </a:stretch>
-        </p:blipFill>
-        <p:spPr bwMode="auto">
-          <a:xfrm>
-            <a:off x="447973" y="773406"/>
-            <a:ext cx="7586504" cy="6069203"/>
-          </a:xfrm>
-          <a:prstGeom prst="rect">
-            <a:avLst/>
-          </a:prstGeom>
-          <a:noFill/>
-          <a:extLst>
-            <a:ext uri="{909E8E84-426E-40DD-AFC4-6F175D3DCCD1}">
-              <a14:hiddenFill xmlns:a14="http://schemas.microsoft.com/office/drawing/2010/main">
-                <a:solidFill>
-                  <a:srgbClr val="FFFFFF"/>
-                </a:solidFill>
-              </a14:hiddenFill>
-            </a:ext>
-          </a:extLst>
-        </p:spPr>
-      </p:pic>
       <p:sp>
         <p:nvSpPr>
           <p:cNvPr id="2" name="Title 1">
@@ -5619,7 +5673,7 @@
           <p:nvPr/>
         </p:nvPicPr>
         <p:blipFill>
-          <a:blip r:embed="rId3">
+          <a:blip r:embed="rId2">
             <a:extLst>
               <a:ext uri="{28A0092B-C50C-407E-A947-70E740481C1C}">
                 <a14:useLocalDpi xmlns:a14="http://schemas.microsoft.com/office/drawing/2010/main" val="0"/>
@@ -5685,6 +5739,53 @@
           </a:fontRef>
         </p:style>
       </p:cxnSp>
+      <p:pic>
+        <p:nvPicPr>
+          <p:cNvPr id="1026" name="Picture 2">
+            <a:extLst>
+              <a:ext uri="{FF2B5EF4-FFF2-40B4-BE49-F238E27FC236}">
+                <a16:creationId xmlns:a16="http://schemas.microsoft.com/office/drawing/2014/main" id="{6A87F8BF-19DF-4F67-A6F5-ADD74CB51708}"/>
+              </a:ext>
+            </a:extLst>
+          </p:cNvPr>
+          <p:cNvPicPr>
+            <a:picLocks noChangeAspect="1" noChangeArrowheads="1"/>
+          </p:cNvPicPr>
+          <p:nvPr/>
+        </p:nvPicPr>
+        <p:blipFill>
+          <a:blip r:embed="rId3">
+            <a:extLst>
+              <a:ext uri="{28A0092B-C50C-407E-A947-70E740481C1C}">
+                <a14:useLocalDpi xmlns:a14="http://schemas.microsoft.com/office/drawing/2010/main" val="0"/>
+              </a:ext>
+            </a:extLst>
+          </a:blip>
+          <a:srcRect/>
+          <a:stretch>
+            <a:fillRect/>
+          </a:stretch>
+        </p:blipFill>
+        <p:spPr bwMode="auto">
+          <a:xfrm>
+            <a:off x="547110" y="1002395"/>
+            <a:ext cx="6848431" cy="5478745"/>
+          </a:xfrm>
+          <a:prstGeom prst="rect">
+            <a:avLst/>
+          </a:prstGeom>
+          <a:noFill/>
+          <a:extLst>
+            <a:ext uri="{909E8E84-426E-40DD-AFC4-6F175D3DCCD1}">
+              <a14:hiddenFill xmlns:a14="http://schemas.microsoft.com/office/drawing/2010/main">
+                <a:solidFill>
+                  <a:srgbClr val="FFFFFF"/>
+                </a:solidFill>
+              </a14:hiddenFill>
+            </a:ext>
+          </a:extLst>
+        </p:spPr>
+      </p:pic>
     </p:spTree>
     <p:extLst>
       <p:ext uri="{BB962C8B-B14F-4D97-AF65-F5344CB8AC3E}">

</xml_diff>

<commit_message>
Minor updates to US map with breweries
</commit_message>
<xml_diff>
--- a/case_study_1_budweiser.pptx
+++ b/case_study_1_budweiser.pptx
@@ -270,7 +270,7 @@
           <a:p>
             <a:fld id="{31CA373E-4619-4AD9-9A1C-1502F6556AAC}" type="datetimeFigureOut">
               <a:rPr lang="en-US" smtClean="0"/>
-              <a:t>1/17/2020</a:t>
+              <a:t>1/18/2020</a:t>
             </a:fld>
             <a:endParaRPr lang="en-US"/>
           </a:p>
@@ -440,7 +440,7 @@
           <a:p>
             <a:fld id="{31CA373E-4619-4AD9-9A1C-1502F6556AAC}" type="datetimeFigureOut">
               <a:rPr lang="en-US" smtClean="0"/>
-              <a:t>1/17/2020</a:t>
+              <a:t>1/18/2020</a:t>
             </a:fld>
             <a:endParaRPr lang="en-US"/>
           </a:p>
@@ -620,7 +620,7 @@
           <a:p>
             <a:fld id="{31CA373E-4619-4AD9-9A1C-1502F6556AAC}" type="datetimeFigureOut">
               <a:rPr lang="en-US" smtClean="0"/>
-              <a:t>1/17/2020</a:t>
+              <a:t>1/18/2020</a:t>
             </a:fld>
             <a:endParaRPr lang="en-US"/>
           </a:p>
@@ -790,7 +790,7 @@
           <a:p>
             <a:fld id="{31CA373E-4619-4AD9-9A1C-1502F6556AAC}" type="datetimeFigureOut">
               <a:rPr lang="en-US" smtClean="0"/>
-              <a:t>1/17/2020</a:t>
+              <a:t>1/18/2020</a:t>
             </a:fld>
             <a:endParaRPr lang="en-US"/>
           </a:p>
@@ -1034,7 +1034,7 @@
           <a:p>
             <a:fld id="{31CA373E-4619-4AD9-9A1C-1502F6556AAC}" type="datetimeFigureOut">
               <a:rPr lang="en-US" smtClean="0"/>
-              <a:t>1/17/2020</a:t>
+              <a:t>1/18/2020</a:t>
             </a:fld>
             <a:endParaRPr lang="en-US"/>
           </a:p>
@@ -1266,7 +1266,7 @@
           <a:p>
             <a:fld id="{31CA373E-4619-4AD9-9A1C-1502F6556AAC}" type="datetimeFigureOut">
               <a:rPr lang="en-US" smtClean="0"/>
-              <a:t>1/17/2020</a:t>
+              <a:t>1/18/2020</a:t>
             </a:fld>
             <a:endParaRPr lang="en-US"/>
           </a:p>
@@ -1633,7 +1633,7 @@
           <a:p>
             <a:fld id="{31CA373E-4619-4AD9-9A1C-1502F6556AAC}" type="datetimeFigureOut">
               <a:rPr lang="en-US" smtClean="0"/>
-              <a:t>1/17/2020</a:t>
+              <a:t>1/18/2020</a:t>
             </a:fld>
             <a:endParaRPr lang="en-US"/>
           </a:p>
@@ -1751,7 +1751,7 @@
           <a:p>
             <a:fld id="{31CA373E-4619-4AD9-9A1C-1502F6556AAC}" type="datetimeFigureOut">
               <a:rPr lang="en-US" smtClean="0"/>
-              <a:t>1/17/2020</a:t>
+              <a:t>1/18/2020</a:t>
             </a:fld>
             <a:endParaRPr lang="en-US"/>
           </a:p>
@@ -1846,7 +1846,7 @@
           <a:p>
             <a:fld id="{31CA373E-4619-4AD9-9A1C-1502F6556AAC}" type="datetimeFigureOut">
               <a:rPr lang="en-US" smtClean="0"/>
-              <a:t>1/17/2020</a:t>
+              <a:t>1/18/2020</a:t>
             </a:fld>
             <a:endParaRPr lang="en-US"/>
           </a:p>
@@ -2123,7 +2123,7 @@
           <a:p>
             <a:fld id="{31CA373E-4619-4AD9-9A1C-1502F6556AAC}" type="datetimeFigureOut">
               <a:rPr lang="en-US" smtClean="0"/>
-              <a:t>1/17/2020</a:t>
+              <a:t>1/18/2020</a:t>
             </a:fld>
             <a:endParaRPr lang="en-US"/>
           </a:p>
@@ -2380,7 +2380,7 @@
           <a:p>
             <a:fld id="{31CA373E-4619-4AD9-9A1C-1502F6556AAC}" type="datetimeFigureOut">
               <a:rPr lang="en-US" smtClean="0"/>
-              <a:t>1/17/2020</a:t>
+              <a:t>1/18/2020</a:t>
             </a:fld>
             <a:endParaRPr lang="en-US"/>
           </a:p>
@@ -2593,7 +2593,7 @@
           <a:p>
             <a:fld id="{31CA373E-4619-4AD9-9A1C-1502F6556AAC}" type="datetimeFigureOut">
               <a:rPr lang="en-US" smtClean="0"/>
-              <a:t>1/17/2020</a:t>
+              <a:t>1/18/2020</a:t>
             </a:fld>
             <a:endParaRPr lang="en-US"/>
           </a:p>
@@ -5741,10 +5741,10 @@
       </p:cxnSp>
       <p:pic>
         <p:nvPicPr>
-          <p:cNvPr id="1026" name="Picture 2">
-            <a:extLst>
-              <a:ext uri="{FF2B5EF4-FFF2-40B4-BE49-F238E27FC236}">
-                <a16:creationId xmlns:a16="http://schemas.microsoft.com/office/drawing/2014/main" id="{6A87F8BF-19DF-4F67-A6F5-ADD74CB51708}"/>
+          <p:cNvPr id="4" name="Picture 2">
+            <a:extLst>
+              <a:ext uri="{FF2B5EF4-FFF2-40B4-BE49-F238E27FC236}">
+                <a16:creationId xmlns:a16="http://schemas.microsoft.com/office/drawing/2014/main" id="{07470C0E-E377-406E-8F63-B5267F5F5B3A}"/>
               </a:ext>
             </a:extLst>
           </p:cNvPr>
@@ -5768,8 +5768,8 @@
         </p:blipFill>
         <p:spPr bwMode="auto">
           <a:xfrm>
-            <a:off x="547110" y="1002395"/>
-            <a:ext cx="6848431" cy="5478745"/>
+            <a:off x="470590" y="1010306"/>
+            <a:ext cx="6814633" cy="5451707"/>
           </a:xfrm>
           <a:prstGeom prst="rect">
             <a:avLst/>

</xml_diff>

<commit_message>
Latest + File Restructure
</commit_message>
<xml_diff>
--- a/case_study_1_budweiser.pptx
+++ b/case_study_1_budweiser.pptx
@@ -19,8 +19,10 @@
     <p:sldId id="279" r:id="rId13"/>
     <p:sldId id="282" r:id="rId14"/>
     <p:sldId id="281" r:id="rId15"/>
-    <p:sldId id="266" r:id="rId16"/>
-    <p:sldId id="267" r:id="rId17"/>
+    <p:sldId id="286" r:id="rId16"/>
+    <p:sldId id="266" r:id="rId17"/>
+    <p:sldId id="285" r:id="rId18"/>
+    <p:sldId id="267" r:id="rId19"/>
   </p:sldIdLst>
   <p:sldSz cx="9144000" cy="6858000" type="screen4x3"/>
   <p:notesSz cx="6858000" cy="9144000"/>
@@ -4648,8 +4650,8 @@
         </p:nvSpPr>
         <p:spPr>
           <a:xfrm>
-            <a:off x="497711" y="336771"/>
-            <a:ext cx="7886700" cy="780398"/>
+            <a:off x="497710" y="336771"/>
+            <a:ext cx="8580580" cy="780398"/>
           </a:xfrm>
         </p:spPr>
         <p:txBody>
@@ -4667,7 +4669,7 @@
                   </a:schemeClr>
                 </a:solidFill>
               </a:rPr>
-              <a:t>Possible States for Budweiser to open a new brewery</a:t>
+              <a:t>Possible new brewery locations based on population</a:t>
             </a:r>
           </a:p>
         </p:txBody>
@@ -4706,11 +4708,8 @@
             </a:pPr>
             <a:r>
               <a:rPr lang="en-US" sz="1600" dirty="0"/>
-              <a:t>Budweiser might explore new craft brewery locations in X, Y, Z states based on ABV and IBU within those states.</a:t>
-            </a:r>
-          </a:p>
-          <a:p>
-            <a:endParaRPr lang="en-US" sz="1600" dirty="0"/>
+              <a:t>Budweiser might explore new craft brewery locations in these states based on the low number of breweries for the population:  New Jersey, Tennessee, and West Virginia.  </a:t>
+            </a:r>
           </a:p>
           <a:p>
             <a:pPr marL="0" indent="0">
@@ -4801,6 +4800,243 @@
           </a:fontRef>
         </p:style>
       </p:cxnSp>
+      <p:pic>
+        <p:nvPicPr>
+          <p:cNvPr id="4" name="Picture 3">
+            <a:extLst>
+              <a:ext uri="{FF2B5EF4-FFF2-40B4-BE49-F238E27FC236}">
+                <a16:creationId xmlns:a16="http://schemas.microsoft.com/office/drawing/2014/main" id="{9A6E684D-A62E-45E8-A03B-F7E383518B79}"/>
+              </a:ext>
+            </a:extLst>
+          </p:cNvPr>
+          <p:cNvPicPr>
+            <a:picLocks noChangeAspect="1"/>
+          </p:cNvPicPr>
+          <p:nvPr/>
+        </p:nvPicPr>
+        <p:blipFill rotWithShape="1">
+          <a:blip r:embed="rId3"/>
+          <a:srcRect t="1696" b="3772"/>
+          <a:stretch/>
+        </p:blipFill>
+        <p:spPr>
+          <a:xfrm>
+            <a:off x="627453" y="2138701"/>
+            <a:ext cx="7640405" cy="1198978"/>
+          </a:xfrm>
+          <a:prstGeom prst="rect">
+            <a:avLst/>
+          </a:prstGeom>
+          <a:ln>
+            <a:solidFill>
+              <a:schemeClr val="bg1">
+                <a:lumMod val="85000"/>
+              </a:schemeClr>
+            </a:solidFill>
+          </a:ln>
+        </p:spPr>
+      </p:pic>
+    </p:spTree>
+    <p:extLst>
+      <p:ext uri="{BB962C8B-B14F-4D97-AF65-F5344CB8AC3E}">
+        <p14:creationId xmlns:p14="http://schemas.microsoft.com/office/powerpoint/2010/main" val="116731223"/>
+      </p:ext>
+    </p:extLst>
+  </p:cSld>
+  <p:clrMapOvr>
+    <a:masterClrMapping/>
+  </p:clrMapOvr>
+</p:sld>
+</file>
+
+<file path=ppt/slides/slide16.xml><?xml version="1.0" encoding="utf-8"?>
+<p:sld xmlns:a="http://schemas.openxmlformats.org/drawingml/2006/main" xmlns:r="http://schemas.openxmlformats.org/officeDocument/2006/relationships" xmlns:p="http://schemas.openxmlformats.org/presentationml/2006/main">
+  <p:cSld>
+    <p:spTree>
+      <p:nvGrpSpPr>
+        <p:cNvPr id="1" name=""/>
+        <p:cNvGrpSpPr/>
+        <p:nvPr/>
+      </p:nvGrpSpPr>
+      <p:grpSpPr>
+        <a:xfrm>
+          <a:off x="0" y="0"/>
+          <a:ext cx="0" cy="0"/>
+          <a:chOff x="0" y="0"/>
+          <a:chExt cx="0" cy="0"/>
+        </a:xfrm>
+      </p:grpSpPr>
+      <p:sp>
+        <p:nvSpPr>
+          <p:cNvPr id="2" name="Title 1">
+            <a:extLst>
+              <a:ext uri="{FF2B5EF4-FFF2-40B4-BE49-F238E27FC236}">
+                <a16:creationId xmlns:a16="http://schemas.microsoft.com/office/drawing/2014/main" id="{ED95135E-4283-4599-B850-F011CF9B7C74}"/>
+              </a:ext>
+            </a:extLst>
+          </p:cNvPr>
+          <p:cNvSpPr>
+            <a:spLocks noGrp="1"/>
+          </p:cNvSpPr>
+          <p:nvPr>
+            <p:ph type="title"/>
+          </p:nvPr>
+        </p:nvSpPr>
+        <p:spPr>
+          <a:xfrm>
+            <a:off x="497710" y="336771"/>
+            <a:ext cx="8248391" cy="780398"/>
+          </a:xfrm>
+        </p:spPr>
+        <p:txBody>
+          <a:bodyPr>
+            <a:normAutofit/>
+          </a:bodyPr>
+          <a:lstStyle/>
+          <a:p>
+            <a:r>
+              <a:rPr lang="en-US" sz="2200" dirty="0">
+                <a:solidFill>
+                  <a:schemeClr val="tx1">
+                    <a:lumMod val="65000"/>
+                    <a:lumOff val="35000"/>
+                  </a:schemeClr>
+                </a:solidFill>
+              </a:rPr>
+              <a:t>Possible new brewery locations based on ABV/IBU</a:t>
+            </a:r>
+          </a:p>
+        </p:txBody>
+      </p:sp>
+      <p:sp>
+        <p:nvSpPr>
+          <p:cNvPr id="3" name="Content Placeholder 2">
+            <a:extLst>
+              <a:ext uri="{FF2B5EF4-FFF2-40B4-BE49-F238E27FC236}">
+                <a16:creationId xmlns:a16="http://schemas.microsoft.com/office/drawing/2014/main" id="{2DD55975-366F-4C51-B7D6-EEAFD411A8C3}"/>
+              </a:ext>
+            </a:extLst>
+          </p:cNvPr>
+          <p:cNvSpPr>
+            <a:spLocks noGrp="1"/>
+          </p:cNvSpPr>
+          <p:nvPr>
+            <p:ph idx="1"/>
+          </p:nvPr>
+        </p:nvSpPr>
+        <p:spPr>
+          <a:xfrm>
+            <a:off x="574876" y="1162010"/>
+            <a:ext cx="7886700" cy="4351338"/>
+          </a:xfrm>
+        </p:spPr>
+        <p:txBody>
+          <a:bodyPr/>
+          <a:lstStyle/>
+          <a:p>
+            <a:pPr marL="0" indent="0">
+              <a:spcAft>
+                <a:spcPts val="600"/>
+              </a:spcAft>
+              <a:buNone/>
+            </a:pPr>
+            <a:r>
+              <a:rPr lang="en-US" sz="1600" dirty="0"/>
+              <a:t>Budweiser might explore new craft brewery locations in X, Y, Z states based on ABV and IBU within those states.</a:t>
+            </a:r>
+          </a:p>
+          <a:p>
+            <a:endParaRPr lang="en-US" sz="1600" dirty="0"/>
+          </a:p>
+          <a:p>
+            <a:pPr marL="0" indent="0">
+              <a:buNone/>
+            </a:pPr>
+            <a:endParaRPr lang="en-US" dirty="0"/>
+          </a:p>
+        </p:txBody>
+      </p:sp>
+      <p:pic>
+        <p:nvPicPr>
+          <p:cNvPr id="5" name="Picture 4" descr="A close up of a sign&#10;&#10;Description automatically generated">
+            <a:extLst>
+              <a:ext uri="{FF2B5EF4-FFF2-40B4-BE49-F238E27FC236}">
+                <a16:creationId xmlns:a16="http://schemas.microsoft.com/office/drawing/2014/main" id="{F9271491-99A6-4D00-B738-0E34E6686EFF}"/>
+              </a:ext>
+            </a:extLst>
+          </p:cNvPr>
+          <p:cNvPicPr>
+            <a:picLocks noChangeAspect="1"/>
+          </p:cNvPicPr>
+          <p:nvPr/>
+        </p:nvPicPr>
+        <p:blipFill>
+          <a:blip r:embed="rId2">
+            <a:extLst>
+              <a:ext uri="{28A0092B-C50C-407E-A947-70E740481C1C}">
+                <a14:useLocalDpi xmlns:a14="http://schemas.microsoft.com/office/drawing/2010/main" val="0"/>
+              </a:ext>
+            </a:extLst>
+          </a:blip>
+          <a:stretch>
+            <a:fillRect/>
+          </a:stretch>
+        </p:blipFill>
+        <p:spPr>
+          <a:xfrm>
+            <a:off x="7492438" y="6106511"/>
+            <a:ext cx="1153851" cy="414718"/>
+          </a:xfrm>
+          <a:prstGeom prst="rect">
+            <a:avLst/>
+          </a:prstGeom>
+        </p:spPr>
+      </p:pic>
+      <p:cxnSp>
+        <p:nvCxnSpPr>
+          <p:cNvPr id="7" name="Straight Connector 6">
+            <a:extLst>
+              <a:ext uri="{FF2B5EF4-FFF2-40B4-BE49-F238E27FC236}">
+                <a16:creationId xmlns:a16="http://schemas.microsoft.com/office/drawing/2014/main" id="{754C5E05-D462-4273-82D1-C656D562E12C}"/>
+              </a:ext>
+            </a:extLst>
+          </p:cNvPr>
+          <p:cNvCxnSpPr>
+            <a:cxnSpLocks/>
+          </p:cNvCxnSpPr>
+          <p:nvPr/>
+        </p:nvCxnSpPr>
+        <p:spPr>
+          <a:xfrm>
+            <a:off x="574876" y="945266"/>
+            <a:ext cx="8071413" cy="0"/>
+          </a:xfrm>
+          <a:prstGeom prst="line">
+            <a:avLst/>
+          </a:prstGeom>
+          <a:ln>
+            <a:solidFill>
+              <a:schemeClr val="bg2">
+                <a:lumMod val="75000"/>
+              </a:schemeClr>
+            </a:solidFill>
+          </a:ln>
+        </p:spPr>
+        <p:style>
+          <a:lnRef idx="1">
+            <a:schemeClr val="accent6"/>
+          </a:lnRef>
+          <a:fillRef idx="0">
+            <a:schemeClr val="accent6"/>
+          </a:fillRef>
+          <a:effectRef idx="0">
+            <a:schemeClr val="accent6"/>
+          </a:effectRef>
+          <a:fontRef idx="minor">
+            <a:schemeClr val="tx1"/>
+          </a:fontRef>
+        </p:style>
+      </p:cxnSp>
       <p:sp>
         <p:nvSpPr>
           <p:cNvPr id="6" name="Rectangle 5">
@@ -4835,7 +5071,7 @@
                   <a:srgbClr val="C00000"/>
                 </a:solidFill>
               </a:rPr>
-              <a:t>[insert Naïve Bayes output]</a:t>
+              <a:t>[insert KNN analysis]</a:t>
             </a:r>
           </a:p>
         </p:txBody>
@@ -4853,7 +5089,298 @@
 </p:sld>
 </file>
 
-<file path=ppt/slides/slide16.xml><?xml version="1.0" encoding="utf-8"?>
+<file path=ppt/slides/slide17.xml><?xml version="1.0" encoding="utf-8"?>
+<p:sld xmlns:a="http://schemas.openxmlformats.org/drawingml/2006/main" xmlns:r="http://schemas.openxmlformats.org/officeDocument/2006/relationships" xmlns:p="http://schemas.openxmlformats.org/presentationml/2006/main">
+  <p:cSld>
+    <p:spTree>
+      <p:nvGrpSpPr>
+        <p:cNvPr id="1" name=""/>
+        <p:cNvGrpSpPr/>
+        <p:nvPr/>
+      </p:nvGrpSpPr>
+      <p:grpSpPr>
+        <a:xfrm>
+          <a:off x="0" y="0"/>
+          <a:ext cx="0" cy="0"/>
+          <a:chOff x="0" y="0"/>
+          <a:chExt cx="0" cy="0"/>
+        </a:xfrm>
+      </p:grpSpPr>
+      <p:sp>
+        <p:nvSpPr>
+          <p:cNvPr id="2" name="Title 1">
+            <a:extLst>
+              <a:ext uri="{FF2B5EF4-FFF2-40B4-BE49-F238E27FC236}">
+                <a16:creationId xmlns:a16="http://schemas.microsoft.com/office/drawing/2014/main" id="{ED95135E-4283-4599-B850-F011CF9B7C74}"/>
+              </a:ext>
+            </a:extLst>
+          </p:cNvPr>
+          <p:cNvSpPr>
+            <a:spLocks noGrp="1"/>
+          </p:cNvSpPr>
+          <p:nvPr>
+            <p:ph type="title"/>
+          </p:nvPr>
+        </p:nvSpPr>
+        <p:spPr>
+          <a:xfrm>
+            <a:off x="497711" y="336771"/>
+            <a:ext cx="7886700" cy="780398"/>
+          </a:xfrm>
+        </p:spPr>
+        <p:txBody>
+          <a:bodyPr>
+            <a:normAutofit/>
+          </a:bodyPr>
+          <a:lstStyle/>
+          <a:p>
+            <a:r>
+              <a:rPr lang="en-US" sz="2200" dirty="0">
+                <a:solidFill>
+                  <a:schemeClr val="tx1">
+                    <a:lumMod val="65000"/>
+                    <a:lumOff val="35000"/>
+                  </a:schemeClr>
+                </a:solidFill>
+              </a:rPr>
+              <a:t>Conclusions</a:t>
+            </a:r>
+          </a:p>
+        </p:txBody>
+      </p:sp>
+      <p:pic>
+        <p:nvPicPr>
+          <p:cNvPr id="5" name="Picture 4" descr="A close up of a sign&#10;&#10;Description automatically generated">
+            <a:extLst>
+              <a:ext uri="{FF2B5EF4-FFF2-40B4-BE49-F238E27FC236}">
+                <a16:creationId xmlns:a16="http://schemas.microsoft.com/office/drawing/2014/main" id="{F9271491-99A6-4D00-B738-0E34E6686EFF}"/>
+              </a:ext>
+            </a:extLst>
+          </p:cNvPr>
+          <p:cNvPicPr>
+            <a:picLocks noChangeAspect="1"/>
+          </p:cNvPicPr>
+          <p:nvPr/>
+        </p:nvPicPr>
+        <p:blipFill>
+          <a:blip r:embed="rId2">
+            <a:extLst>
+              <a:ext uri="{28A0092B-C50C-407E-A947-70E740481C1C}">
+                <a14:useLocalDpi xmlns:a14="http://schemas.microsoft.com/office/drawing/2010/main" val="0"/>
+              </a:ext>
+            </a:extLst>
+          </a:blip>
+          <a:stretch>
+            <a:fillRect/>
+          </a:stretch>
+        </p:blipFill>
+        <p:spPr>
+          <a:xfrm>
+            <a:off x="7492438" y="6106511"/>
+            <a:ext cx="1153851" cy="414718"/>
+          </a:xfrm>
+          <a:prstGeom prst="rect">
+            <a:avLst/>
+          </a:prstGeom>
+        </p:spPr>
+      </p:pic>
+      <p:cxnSp>
+        <p:nvCxnSpPr>
+          <p:cNvPr id="7" name="Straight Connector 6">
+            <a:extLst>
+              <a:ext uri="{FF2B5EF4-FFF2-40B4-BE49-F238E27FC236}">
+                <a16:creationId xmlns:a16="http://schemas.microsoft.com/office/drawing/2014/main" id="{754C5E05-D462-4273-82D1-C656D562E12C}"/>
+              </a:ext>
+            </a:extLst>
+          </p:cNvPr>
+          <p:cNvCxnSpPr>
+            <a:cxnSpLocks/>
+          </p:cNvCxnSpPr>
+          <p:nvPr/>
+        </p:nvCxnSpPr>
+        <p:spPr>
+          <a:xfrm>
+            <a:off x="574876" y="945266"/>
+            <a:ext cx="8071413" cy="0"/>
+          </a:xfrm>
+          <a:prstGeom prst="line">
+            <a:avLst/>
+          </a:prstGeom>
+          <a:ln>
+            <a:solidFill>
+              <a:schemeClr val="bg2">
+                <a:lumMod val="75000"/>
+              </a:schemeClr>
+            </a:solidFill>
+          </a:ln>
+        </p:spPr>
+        <p:style>
+          <a:lnRef idx="1">
+            <a:schemeClr val="accent6"/>
+          </a:lnRef>
+          <a:fillRef idx="0">
+            <a:schemeClr val="accent6"/>
+          </a:fillRef>
+          <a:effectRef idx="0">
+            <a:schemeClr val="accent6"/>
+          </a:effectRef>
+          <a:fontRef idx="minor">
+            <a:schemeClr val="tx1"/>
+          </a:fontRef>
+        </p:style>
+      </p:cxnSp>
+      <p:sp>
+        <p:nvSpPr>
+          <p:cNvPr id="3" name="Rectangle 2">
+            <a:extLst>
+              <a:ext uri="{FF2B5EF4-FFF2-40B4-BE49-F238E27FC236}">
+                <a16:creationId xmlns:a16="http://schemas.microsoft.com/office/drawing/2014/main" id="{6337412A-3C1B-4CB0-9026-C0FA00BC1378}"/>
+              </a:ext>
+            </a:extLst>
+          </p:cNvPr>
+          <p:cNvSpPr/>
+          <p:nvPr/>
+        </p:nvSpPr>
+        <p:spPr>
+          <a:xfrm>
+            <a:off x="497711" y="1184613"/>
+            <a:ext cx="8503414" cy="5078313"/>
+          </a:xfrm>
+          <a:prstGeom prst="rect">
+            <a:avLst/>
+          </a:prstGeom>
+        </p:spPr>
+        <p:txBody>
+          <a:bodyPr wrap="square">
+            <a:spAutoFit/>
+          </a:bodyPr>
+          <a:lstStyle/>
+          <a:p>
+            <a:pPr marL="285750" indent="-285750">
+              <a:buFont typeface="Arial" panose="020B0604020202020204" pitchFamily="34" charset="0"/>
+              <a:buChar char="•"/>
+            </a:pPr>
+            <a:r>
+              <a:rPr lang="en-US" dirty="0"/>
+              <a:t>Possible states for new breweries based on a low number of craft breweries for the population of the state: New Jersey, Tennessee, and West Virginia</a:t>
+            </a:r>
+            <a:endParaRPr lang="en-US" dirty="0">
+              <a:solidFill>
+                <a:srgbClr val="FF0000"/>
+              </a:solidFill>
+            </a:endParaRPr>
+          </a:p>
+          <a:p>
+            <a:endParaRPr lang="en-US" dirty="0"/>
+          </a:p>
+          <a:p>
+            <a:pPr marL="285750" indent="-285750">
+              <a:buFont typeface="Arial" panose="020B0604020202020204" pitchFamily="34" charset="0"/>
+              <a:buChar char="•"/>
+            </a:pPr>
+            <a:r>
+              <a:rPr lang="en-US" dirty="0"/>
+              <a:t>Possible states for new breweries based on similar ABV and IBUs of the Budweiser brews:  </a:t>
+            </a:r>
+            <a:r>
+              <a:rPr lang="en-US" dirty="0">
+                <a:solidFill>
+                  <a:srgbClr val="FF0000"/>
+                </a:solidFill>
+              </a:rPr>
+              <a:t>[insert states]</a:t>
+            </a:r>
+          </a:p>
+          <a:p>
+            <a:endParaRPr lang="en-US" dirty="0"/>
+          </a:p>
+          <a:p>
+            <a:pPr marL="285750" indent="-285750">
+              <a:buFont typeface="Arial" panose="020B0604020202020204" pitchFamily="34" charset="0"/>
+              <a:buChar char="•"/>
+            </a:pPr>
+            <a:r>
+              <a:rPr lang="en-US" dirty="0"/>
+              <a:t>The median ABV in the dataset is .057.  The median IBU is 35.</a:t>
+            </a:r>
+          </a:p>
+          <a:p>
+            <a:endParaRPr lang="en-US" dirty="0"/>
+          </a:p>
+          <a:p>
+            <a:pPr marL="285750" indent="-285750">
+              <a:buFont typeface="Arial" panose="020B0604020202020204" pitchFamily="34" charset="0"/>
+              <a:buChar char="•"/>
+            </a:pPr>
+            <a:r>
+              <a:rPr lang="en-US" dirty="0"/>
+              <a:t>ABV and IBU have a strong positive linear correlation overall</a:t>
+            </a:r>
+          </a:p>
+          <a:p>
+            <a:endParaRPr lang="en-US" dirty="0"/>
+          </a:p>
+          <a:p>
+            <a:pPr marL="285750" indent="-285750">
+              <a:buFont typeface="Arial" panose="020B0604020202020204" pitchFamily="34" charset="0"/>
+              <a:buChar char="•"/>
+            </a:pPr>
+            <a:r>
+              <a:rPr lang="en-US" dirty="0"/>
+              <a:t>TBD</a:t>
+            </a:r>
+          </a:p>
+          <a:p>
+            <a:endParaRPr lang="en-US" dirty="0"/>
+          </a:p>
+          <a:p>
+            <a:pPr marL="285750" indent="-285750">
+              <a:buFont typeface="Arial" panose="020B0604020202020204" pitchFamily="34" charset="0"/>
+              <a:buChar char="•"/>
+            </a:pPr>
+            <a:r>
+              <a:rPr lang="en-US" dirty="0"/>
+              <a:t>TBD</a:t>
+            </a:r>
+          </a:p>
+          <a:p>
+            <a:endParaRPr lang="en-US" dirty="0"/>
+          </a:p>
+          <a:p>
+            <a:pPr marL="285750" indent="-285750">
+              <a:buFont typeface="Arial" panose="020B0604020202020204" pitchFamily="34" charset="0"/>
+              <a:buChar char="•"/>
+            </a:pPr>
+            <a:r>
+              <a:rPr lang="en-US" dirty="0"/>
+              <a:t>TBD</a:t>
+            </a:r>
+          </a:p>
+          <a:p>
+            <a:endParaRPr lang="en-US" dirty="0"/>
+          </a:p>
+          <a:p>
+            <a:endParaRPr lang="en-US" dirty="0"/>
+          </a:p>
+          <a:p>
+            <a:endParaRPr lang="en-US" dirty="0"/>
+          </a:p>
+        </p:txBody>
+      </p:sp>
+    </p:spTree>
+    <p:extLst>
+      <p:ext uri="{BB962C8B-B14F-4D97-AF65-F5344CB8AC3E}">
+        <p14:creationId xmlns:p14="http://schemas.microsoft.com/office/powerpoint/2010/main" val="1284481498"/>
+      </p:ext>
+    </p:extLst>
+  </p:cSld>
+  <p:clrMapOvr>
+    <a:masterClrMapping/>
+  </p:clrMapOvr>
+</p:sld>
+</file>
+
+<file path=ppt/slides/slide18.xml><?xml version="1.0" encoding="utf-8"?>
 <p:sld xmlns:a="http://schemas.openxmlformats.org/drawingml/2006/main" xmlns:r="http://schemas.openxmlformats.org/officeDocument/2006/relationships" xmlns:p="http://schemas.openxmlformats.org/presentationml/2006/main">
   <p:cSld>
     <p:bg>
@@ -5816,6 +6343,48 @@
           <a:chExt cx="0" cy="0"/>
         </a:xfrm>
       </p:grpSpPr>
+      <p:pic>
+        <p:nvPicPr>
+          <p:cNvPr id="9" name="Content Placeholder 8">
+            <a:extLst>
+              <a:ext uri="{FF2B5EF4-FFF2-40B4-BE49-F238E27FC236}">
+                <a16:creationId xmlns:a16="http://schemas.microsoft.com/office/drawing/2014/main" id="{794B8CDC-AE8C-4BC6-948A-BECA47456308}"/>
+              </a:ext>
+            </a:extLst>
+          </p:cNvPr>
+          <p:cNvPicPr>
+            <a:picLocks noGrp="1" noChangeAspect="1"/>
+          </p:cNvPicPr>
+          <p:nvPr>
+            <p:ph idx="1"/>
+          </p:nvPr>
+        </p:nvPicPr>
+        <p:blipFill>
+          <a:blip r:embed="rId2">
+            <a:extLst>
+              <a:ext uri="{28A0092B-C50C-407E-A947-70E740481C1C}">
+                <a14:useLocalDpi xmlns:a14="http://schemas.microsoft.com/office/drawing/2010/main" val="0"/>
+              </a:ext>
+            </a:extLst>
+          </a:blip>
+          <a:stretch>
+            <a:fillRect/>
+          </a:stretch>
+        </p:blipFill>
+        <p:spPr>
+          <a:xfrm>
+            <a:off x="574876" y="1691036"/>
+            <a:ext cx="8473475" cy="4571864"/>
+          </a:xfrm>
+          <a:ln>
+            <a:solidFill>
+              <a:schemeClr val="bg1">
+                <a:lumMod val="75000"/>
+              </a:schemeClr>
+            </a:solidFill>
+          </a:ln>
+        </p:spPr>
+      </p:pic>
       <p:sp>
         <p:nvSpPr>
           <p:cNvPr id="2" name="Title 1">
@@ -5873,7 +6442,7 @@
           <p:nvPr/>
         </p:nvPicPr>
         <p:blipFill>
-          <a:blip r:embed="rId2">
+          <a:blip r:embed="rId3">
             <a:extLst>
               <a:ext uri="{28A0092B-C50C-407E-A947-70E740481C1C}">
                 <a14:useLocalDpi xmlns:a14="http://schemas.microsoft.com/office/drawing/2010/main" val="0"/>
@@ -5939,48 +6508,6 @@
           </a:fontRef>
         </p:style>
       </p:cxnSp>
-      <p:pic>
-        <p:nvPicPr>
-          <p:cNvPr id="9" name="Content Placeholder 8">
-            <a:extLst>
-              <a:ext uri="{FF2B5EF4-FFF2-40B4-BE49-F238E27FC236}">
-                <a16:creationId xmlns:a16="http://schemas.microsoft.com/office/drawing/2014/main" id="{794B8CDC-AE8C-4BC6-948A-BECA47456308}"/>
-              </a:ext>
-            </a:extLst>
-          </p:cNvPr>
-          <p:cNvPicPr>
-            <a:picLocks noGrp="1" noChangeAspect="1"/>
-          </p:cNvPicPr>
-          <p:nvPr>
-            <p:ph idx="1"/>
-          </p:nvPr>
-        </p:nvPicPr>
-        <p:blipFill>
-          <a:blip r:embed="rId3">
-            <a:extLst>
-              <a:ext uri="{28A0092B-C50C-407E-A947-70E740481C1C}">
-                <a14:useLocalDpi xmlns:a14="http://schemas.microsoft.com/office/drawing/2010/main" val="0"/>
-              </a:ext>
-            </a:extLst>
-          </a:blip>
-          <a:stretch>
-            <a:fillRect/>
-          </a:stretch>
-        </p:blipFill>
-        <p:spPr>
-          <a:xfrm>
-            <a:off x="300649" y="1177786"/>
-            <a:ext cx="8655867" cy="4670274"/>
-          </a:xfrm>
-          <a:ln>
-            <a:solidFill>
-              <a:schemeClr val="bg1">
-                <a:lumMod val="75000"/>
-              </a:schemeClr>
-            </a:solidFill>
-          </a:ln>
-        </p:spPr>
-      </p:pic>
       <p:sp>
         <p:nvSpPr>
           <p:cNvPr id="6" name="TextBox 5">
@@ -5995,15 +6522,15 @@
         </p:nvSpPr>
         <p:spPr>
           <a:xfrm>
-            <a:off x="1943580" y="4428300"/>
-            <a:ext cx="4694429" cy="738664"/>
+            <a:off x="497711" y="1030542"/>
+            <a:ext cx="8290476" cy="523220"/>
           </a:xfrm>
           <a:prstGeom prst="rect">
             <a:avLst/>
           </a:prstGeom>
           <a:solidFill>
             <a:schemeClr val="bg1">
-              <a:alpha val="83000"/>
+              <a:alpha val="93000"/>
             </a:schemeClr>
           </a:solidFill>
         </p:spPr>
@@ -6013,10 +6540,9 @@
           </a:bodyPr>
           <a:lstStyle/>
           <a:p>
-            <a:pPr algn="ctr"/>
             <a:r>
               <a:rPr lang="en-US" sz="1400" dirty="0"/>
-              <a:t>Maine has the highest median ABV and IBU of all the states. Arkansas and Utah have the lowest median ADV, while Wisconsin has the lowest median IBU.</a:t>
+              <a:t>Maine has the highest median ABV and IBU of all the states. Arkansas and Utah have the lowest median ABV, while Wisconsin has the lowest median IBU.</a:t>
             </a:r>
           </a:p>
         </p:txBody>
@@ -6034,8 +6560,8 @@
           <p:nvPr/>
         </p:nvSpPr>
         <p:spPr>
-          <a:xfrm rot="10800000">
-            <a:off x="3311192" y="5718834"/>
+          <a:xfrm rot="2981259">
+            <a:off x="1329354" y="3194969"/>
             <a:ext cx="114300" cy="258451"/>
           </a:xfrm>
           <a:prstGeom prst="downArrow">
@@ -6081,7 +6607,99 @@
         </p:nvSpPr>
         <p:spPr>
           <a:xfrm rot="3444909">
-            <a:off x="3508005" y="1444062"/>
+            <a:off x="3710780" y="1838134"/>
+            <a:ext cx="114300" cy="258451"/>
+          </a:xfrm>
+          <a:prstGeom prst="downArrow">
+            <a:avLst/>
+          </a:prstGeom>
+        </p:spPr>
+        <p:style>
+          <a:lnRef idx="2">
+            <a:schemeClr val="accent1">
+              <a:shade val="50000"/>
+            </a:schemeClr>
+          </a:lnRef>
+          <a:fillRef idx="1">
+            <a:schemeClr val="accent1"/>
+          </a:fillRef>
+          <a:effectRef idx="0">
+            <a:schemeClr val="accent1"/>
+          </a:effectRef>
+          <a:fontRef idx="minor">
+            <a:schemeClr val="lt1"/>
+          </a:fontRef>
+        </p:style>
+        <p:txBody>
+          <a:bodyPr rtlCol="0" anchor="ctr"/>
+          <a:lstStyle/>
+          <a:p>
+            <a:pPr algn="ctr"/>
+            <a:endParaRPr lang="en-US"/>
+          </a:p>
+        </p:txBody>
+      </p:sp>
+      <p:sp>
+        <p:nvSpPr>
+          <p:cNvPr id="11" name="Arrow: Down 10">
+            <a:extLst>
+              <a:ext uri="{FF2B5EF4-FFF2-40B4-BE49-F238E27FC236}">
+                <a16:creationId xmlns:a16="http://schemas.microsoft.com/office/drawing/2014/main" id="{BD06F93B-00AB-41F2-8FCD-A85F72387F5D}"/>
+              </a:ext>
+            </a:extLst>
+          </p:cNvPr>
+          <p:cNvSpPr/>
+          <p:nvPr/>
+        </p:nvSpPr>
+        <p:spPr>
+          <a:xfrm rot="18582522">
+            <a:off x="6026971" y="3271048"/>
+            <a:ext cx="114300" cy="258451"/>
+          </a:xfrm>
+          <a:prstGeom prst="downArrow">
+            <a:avLst/>
+          </a:prstGeom>
+        </p:spPr>
+        <p:style>
+          <a:lnRef idx="2">
+            <a:schemeClr val="accent1">
+              <a:shade val="50000"/>
+            </a:schemeClr>
+          </a:lnRef>
+          <a:fillRef idx="1">
+            <a:schemeClr val="accent1"/>
+          </a:fillRef>
+          <a:effectRef idx="0">
+            <a:schemeClr val="accent1"/>
+          </a:effectRef>
+          <a:fontRef idx="minor">
+            <a:schemeClr val="lt1"/>
+          </a:fontRef>
+        </p:style>
+        <p:txBody>
+          <a:bodyPr rtlCol="0" anchor="ctr"/>
+          <a:lstStyle/>
+          <a:p>
+            <a:pPr algn="ctr"/>
+            <a:endParaRPr lang="en-US"/>
+          </a:p>
+        </p:txBody>
+      </p:sp>
+      <p:sp>
+        <p:nvSpPr>
+          <p:cNvPr id="13" name="Arrow: Down 12">
+            <a:extLst>
+              <a:ext uri="{FF2B5EF4-FFF2-40B4-BE49-F238E27FC236}">
+                <a16:creationId xmlns:a16="http://schemas.microsoft.com/office/drawing/2014/main" id="{ECB1CC6F-DF53-433A-90C7-626F3658CB0F}"/>
+              </a:ext>
+            </a:extLst>
+          </p:cNvPr>
+          <p:cNvSpPr/>
+          <p:nvPr/>
+        </p:nvSpPr>
+        <p:spPr>
+          <a:xfrm rot="10800000">
+            <a:off x="6741786" y="6106511"/>
             <a:ext cx="114300" cy="258451"/>
           </a:xfrm>
           <a:prstGeom prst="downArrow">
@@ -6143,6 +6761,43 @@
           <a:chExt cx="0" cy="0"/>
         </a:xfrm>
       </p:grpSpPr>
+      <p:pic>
+        <p:nvPicPr>
+          <p:cNvPr id="3" name="Picture 2">
+            <a:extLst>
+              <a:ext uri="{FF2B5EF4-FFF2-40B4-BE49-F238E27FC236}">
+                <a16:creationId xmlns:a16="http://schemas.microsoft.com/office/drawing/2014/main" id="{803DEE8E-E5E5-4A87-8423-6DA5A1134B0C}"/>
+              </a:ext>
+            </a:extLst>
+          </p:cNvPr>
+          <p:cNvPicPr>
+            <a:picLocks noChangeAspect="1"/>
+          </p:cNvPicPr>
+          <p:nvPr/>
+        </p:nvPicPr>
+        <p:blipFill>
+          <a:blip r:embed="rId2"/>
+          <a:stretch>
+            <a:fillRect/>
+          </a:stretch>
+        </p:blipFill>
+        <p:spPr>
+          <a:xfrm>
+            <a:off x="574876" y="2457705"/>
+            <a:ext cx="7903937" cy="4001621"/>
+          </a:xfrm>
+          <a:prstGeom prst="rect">
+            <a:avLst/>
+          </a:prstGeom>
+          <a:ln>
+            <a:solidFill>
+              <a:schemeClr val="bg1">
+                <a:lumMod val="85000"/>
+              </a:schemeClr>
+            </a:solidFill>
+          </a:ln>
+        </p:spPr>
+      </p:pic>
       <p:sp>
         <p:nvSpPr>
           <p:cNvPr id="2" name="Title 1">
@@ -6200,7 +6855,7 @@
           <p:nvPr/>
         </p:nvPicPr>
         <p:blipFill>
-          <a:blip r:embed="rId2">
+          <a:blip r:embed="rId3">
             <a:extLst>
               <a:ext uri="{28A0092B-C50C-407E-A947-70E740481C1C}">
                 <a14:useLocalDpi xmlns:a14="http://schemas.microsoft.com/office/drawing/2010/main" val="0"/>
@@ -6296,7 +6951,7 @@
           <a:p>
             <a:r>
               <a:rPr lang="en-US" sz="1600" dirty="0"/>
-              <a:t>Kentucky has the highest ABV beer at 12.5%, which is called ‘London Balling’,  made by Against the Grain Brewery, located in Louisville, KY.</a:t>
+              <a:t>Kentucky has the highest ABV beer at 0.125, which is called ‘London Balling’,  made by Against the Grain Brewery, located in Louisville, KY.</a:t>
             </a:r>
           </a:p>
           <a:p>
@@ -6312,10 +6967,10 @@
       </p:sp>
       <p:sp>
         <p:nvSpPr>
-          <p:cNvPr id="13" name="Rectangle 12">
-            <a:extLst>
-              <a:ext uri="{FF2B5EF4-FFF2-40B4-BE49-F238E27FC236}">
-                <a16:creationId xmlns:a16="http://schemas.microsoft.com/office/drawing/2014/main" id="{1E5777CD-2E57-41FD-A85C-A1A8403F60F8}"/>
+          <p:cNvPr id="10" name="Arrow: Down 9">
+            <a:extLst>
+              <a:ext uri="{FF2B5EF4-FFF2-40B4-BE49-F238E27FC236}">
+                <a16:creationId xmlns:a16="http://schemas.microsoft.com/office/drawing/2014/main" id="{E77DAADB-29EE-4C62-96F6-649B18319293}"/>
               </a:ext>
             </a:extLst>
           </p:cNvPr>
@@ -6324,83 +6979,7 @@
         </p:nvSpPr>
         <p:spPr>
           <a:xfrm>
-            <a:off x="0" y="5599111"/>
-            <a:ext cx="8503414" cy="369332"/>
-          </a:xfrm>
-          <a:prstGeom prst="rect">
-            <a:avLst/>
-          </a:prstGeom>
-        </p:spPr>
-        <p:txBody>
-          <a:bodyPr wrap="square">
-            <a:spAutoFit/>
-          </a:bodyPr>
-          <a:lstStyle/>
-          <a:p>
-            <a:pPr algn="ctr"/>
-            <a:r>
-              <a:rPr lang="en-US" dirty="0">
-                <a:solidFill>
-                  <a:srgbClr val="C00000"/>
-                </a:solidFill>
-              </a:rPr>
-              <a:t>[ insert max plot]</a:t>
-            </a:r>
-          </a:p>
-        </p:txBody>
-      </p:sp>
-      <p:pic>
-        <p:nvPicPr>
-          <p:cNvPr id="8" name="Picture 7">
-            <a:extLst>
-              <a:ext uri="{FF2B5EF4-FFF2-40B4-BE49-F238E27FC236}">
-                <a16:creationId xmlns:a16="http://schemas.microsoft.com/office/drawing/2014/main" id="{4625F598-EB35-4FD1-B194-C6C9F2E4B1A4}"/>
-              </a:ext>
-            </a:extLst>
-          </p:cNvPr>
-          <p:cNvPicPr>
-            <a:picLocks noChangeAspect="1"/>
-          </p:cNvPicPr>
-          <p:nvPr/>
-        </p:nvPicPr>
-        <p:blipFill>
-          <a:blip r:embed="rId3"/>
-          <a:stretch>
-            <a:fillRect/>
-          </a:stretch>
-        </p:blipFill>
-        <p:spPr>
-          <a:xfrm>
-            <a:off x="574876" y="2504579"/>
-            <a:ext cx="8400783" cy="3490258"/>
-          </a:xfrm>
-          <a:prstGeom prst="rect">
-            <a:avLst/>
-          </a:prstGeom>
-          <a:ln>
-            <a:solidFill>
-              <a:schemeClr val="bg1">
-                <a:lumMod val="75000"/>
-              </a:schemeClr>
-            </a:solidFill>
-          </a:ln>
-        </p:spPr>
-      </p:pic>
-      <p:sp>
-        <p:nvSpPr>
-          <p:cNvPr id="10" name="Arrow: Down 9">
-            <a:extLst>
-              <a:ext uri="{FF2B5EF4-FFF2-40B4-BE49-F238E27FC236}">
-                <a16:creationId xmlns:a16="http://schemas.microsoft.com/office/drawing/2014/main" id="{E77DAADB-29EE-4C62-96F6-649B18319293}"/>
-              </a:ext>
-            </a:extLst>
-          </p:cNvPr>
-          <p:cNvSpPr/>
-          <p:nvPr/>
-        </p:nvSpPr>
-        <p:spPr>
-          <a:xfrm>
-            <a:off x="3113570" y="2856952"/>
+            <a:off x="3105918" y="2515125"/>
             <a:ext cx="97156" cy="152400"/>
           </a:xfrm>
           <a:prstGeom prst="downArrow">
@@ -6446,7 +7025,7 @@
         </p:nvSpPr>
         <p:spPr>
           <a:xfrm>
-            <a:off x="5555535" y="2591325"/>
+            <a:off x="5746832" y="3203476"/>
             <a:ext cx="97156" cy="265627"/>
           </a:xfrm>
           <a:prstGeom prst="downArrow">
@@ -6991,7 +7570,7 @@
           <a:p>
             <a:r>
               <a:rPr lang="en-US" dirty="0"/>
-              <a:t>The distribution of ABV is slightly right-skewed.  The data is concentrated at 0.050.  There are 31 outliers of 0.096 and above.  According to Central Limit Theorem (n =1405 &gt; 30), the population of the ABV is normally distributed.  The 95 percent confidence interval:  0.05920729 0.06063020</a:t>
+              <a:t>The distribution of ABV is slightly right-skewed.  The data is concentrated at 0.050.  There are 31 outliers of 0.096 and above.  According to Central Limit Theorem (n =1405 &gt; 30), the population of the ABV is normally distributed.  The 95 percent confidence interval:  0.05920729  	0.06063020</a:t>
             </a:r>
           </a:p>
           <a:p>
@@ -7016,8 +7595,8 @@
         </p:nvSpPr>
         <p:spPr>
           <a:xfrm rot="5400000">
-            <a:off x="5413716" y="5642410"/>
-            <a:ext cx="176214" cy="847725"/>
+            <a:off x="6153916" y="4925574"/>
+            <a:ext cx="176214" cy="2276435"/>
           </a:xfrm>
           <a:prstGeom prst="rightBrace">
             <a:avLst/>
@@ -7060,7 +7639,7 @@
         </p:nvSpPr>
         <p:spPr>
           <a:xfrm>
-            <a:off x="5077960" y="6151898"/>
+            <a:off x="5801063" y="6151899"/>
             <a:ext cx="1009651" cy="369332"/>
           </a:xfrm>
           <a:prstGeom prst="rect">
@@ -7270,10 +7849,10 @@
       </p:sp>
       <p:pic>
         <p:nvPicPr>
-          <p:cNvPr id="4098" name="Picture 2">
-            <a:extLst>
-              <a:ext uri="{FF2B5EF4-FFF2-40B4-BE49-F238E27FC236}">
-                <a16:creationId xmlns:a16="http://schemas.microsoft.com/office/drawing/2014/main" id="{2BEA4880-864C-4FED-8310-876D2593498C}"/>
+          <p:cNvPr id="1030" name="Picture 6">
+            <a:extLst>
+              <a:ext uri="{FF2B5EF4-FFF2-40B4-BE49-F238E27FC236}">
+                <a16:creationId xmlns:a16="http://schemas.microsoft.com/office/drawing/2014/main" id="{09DA59E7-3E7F-4F8B-A3D5-9260C6A4833F}"/>
               </a:ext>
             </a:extLst>
           </p:cNvPr>
@@ -7297,8 +7876,8 @@
         </p:blipFill>
         <p:spPr bwMode="auto">
           <a:xfrm>
-            <a:off x="544269" y="2301238"/>
-            <a:ext cx="7661448" cy="3830724"/>
+            <a:off x="667232" y="2409386"/>
+            <a:ext cx="7382550" cy="3691275"/>
           </a:xfrm>
           <a:prstGeom prst="rect">
             <a:avLst/>

</xml_diff>

<commit_message>
Updating ppt with KH's YouTube link
</commit_message>
<xml_diff>
--- a/case_study_1_budweiser.pptx
+++ b/case_study_1_budweiser.pptx
@@ -6,23 +6,25 @@
   </p:sldMasterIdLst>
   <p:sldIdLst>
     <p:sldId id="256" r:id="rId2"/>
-    <p:sldId id="257" r:id="rId3"/>
-    <p:sldId id="269" r:id="rId4"/>
-    <p:sldId id="284" r:id="rId5"/>
-    <p:sldId id="261" r:id="rId6"/>
-    <p:sldId id="274" r:id="rId7"/>
-    <p:sldId id="273" r:id="rId8"/>
-    <p:sldId id="263" r:id="rId9"/>
-    <p:sldId id="264" r:id="rId10"/>
-    <p:sldId id="280" r:id="rId11"/>
-    <p:sldId id="276" r:id="rId12"/>
-    <p:sldId id="279" r:id="rId13"/>
-    <p:sldId id="282" r:id="rId14"/>
-    <p:sldId id="281" r:id="rId15"/>
-    <p:sldId id="266" r:id="rId16"/>
-    <p:sldId id="286" r:id="rId17"/>
-    <p:sldId id="285" r:id="rId18"/>
-    <p:sldId id="267" r:id="rId19"/>
+    <p:sldId id="287" r:id="rId3"/>
+    <p:sldId id="257" r:id="rId4"/>
+    <p:sldId id="269" r:id="rId5"/>
+    <p:sldId id="284" r:id="rId6"/>
+    <p:sldId id="261" r:id="rId7"/>
+    <p:sldId id="274" r:id="rId8"/>
+    <p:sldId id="273" r:id="rId9"/>
+    <p:sldId id="263" r:id="rId10"/>
+    <p:sldId id="264" r:id="rId11"/>
+    <p:sldId id="280" r:id="rId12"/>
+    <p:sldId id="276" r:id="rId13"/>
+    <p:sldId id="279" r:id="rId14"/>
+    <p:sldId id="282" r:id="rId15"/>
+    <p:sldId id="281" r:id="rId16"/>
+    <p:sldId id="266" r:id="rId17"/>
+    <p:sldId id="286" r:id="rId18"/>
+    <p:sldId id="285" r:id="rId19"/>
+    <p:sldId id="267" r:id="rId20"/>
+    <p:sldId id="288" r:id="rId21"/>
   </p:sldIdLst>
   <p:sldSz cx="9144000" cy="6858000" type="screen4x3"/>
   <p:notesSz cx="6858000" cy="9144000"/>
@@ -272,7 +274,7 @@
           <a:p>
             <a:fld id="{31CA373E-4619-4AD9-9A1C-1502F6556AAC}" type="datetimeFigureOut">
               <a:rPr lang="en-US" smtClean="0"/>
-              <a:t>1/20/2020</a:t>
+              <a:t>1/24/2020</a:t>
             </a:fld>
             <a:endParaRPr lang="en-US"/>
           </a:p>
@@ -442,7 +444,7 @@
           <a:p>
             <a:fld id="{31CA373E-4619-4AD9-9A1C-1502F6556AAC}" type="datetimeFigureOut">
               <a:rPr lang="en-US" smtClean="0"/>
-              <a:t>1/20/2020</a:t>
+              <a:t>1/24/2020</a:t>
             </a:fld>
             <a:endParaRPr lang="en-US"/>
           </a:p>
@@ -622,7 +624,7 @@
           <a:p>
             <a:fld id="{31CA373E-4619-4AD9-9A1C-1502F6556AAC}" type="datetimeFigureOut">
               <a:rPr lang="en-US" smtClean="0"/>
-              <a:t>1/20/2020</a:t>
+              <a:t>1/24/2020</a:t>
             </a:fld>
             <a:endParaRPr lang="en-US"/>
           </a:p>
@@ -792,7 +794,7 @@
           <a:p>
             <a:fld id="{31CA373E-4619-4AD9-9A1C-1502F6556AAC}" type="datetimeFigureOut">
               <a:rPr lang="en-US" smtClean="0"/>
-              <a:t>1/20/2020</a:t>
+              <a:t>1/24/2020</a:t>
             </a:fld>
             <a:endParaRPr lang="en-US"/>
           </a:p>
@@ -1036,7 +1038,7 @@
           <a:p>
             <a:fld id="{31CA373E-4619-4AD9-9A1C-1502F6556AAC}" type="datetimeFigureOut">
               <a:rPr lang="en-US" smtClean="0"/>
-              <a:t>1/20/2020</a:t>
+              <a:t>1/24/2020</a:t>
             </a:fld>
             <a:endParaRPr lang="en-US"/>
           </a:p>
@@ -1268,7 +1270,7 @@
           <a:p>
             <a:fld id="{31CA373E-4619-4AD9-9A1C-1502F6556AAC}" type="datetimeFigureOut">
               <a:rPr lang="en-US" smtClean="0"/>
-              <a:t>1/20/2020</a:t>
+              <a:t>1/24/2020</a:t>
             </a:fld>
             <a:endParaRPr lang="en-US"/>
           </a:p>
@@ -1635,7 +1637,7 @@
           <a:p>
             <a:fld id="{31CA373E-4619-4AD9-9A1C-1502F6556AAC}" type="datetimeFigureOut">
               <a:rPr lang="en-US" smtClean="0"/>
-              <a:t>1/20/2020</a:t>
+              <a:t>1/24/2020</a:t>
             </a:fld>
             <a:endParaRPr lang="en-US"/>
           </a:p>
@@ -1753,7 +1755,7 @@
           <a:p>
             <a:fld id="{31CA373E-4619-4AD9-9A1C-1502F6556AAC}" type="datetimeFigureOut">
               <a:rPr lang="en-US" smtClean="0"/>
-              <a:t>1/20/2020</a:t>
+              <a:t>1/24/2020</a:t>
             </a:fld>
             <a:endParaRPr lang="en-US"/>
           </a:p>
@@ -1848,7 +1850,7 @@
           <a:p>
             <a:fld id="{31CA373E-4619-4AD9-9A1C-1502F6556AAC}" type="datetimeFigureOut">
               <a:rPr lang="en-US" smtClean="0"/>
-              <a:t>1/20/2020</a:t>
+              <a:t>1/24/2020</a:t>
             </a:fld>
             <a:endParaRPr lang="en-US"/>
           </a:p>
@@ -2125,7 +2127,7 @@
           <a:p>
             <a:fld id="{31CA373E-4619-4AD9-9A1C-1502F6556AAC}" type="datetimeFigureOut">
               <a:rPr lang="en-US" smtClean="0"/>
-              <a:t>1/20/2020</a:t>
+              <a:t>1/24/2020</a:t>
             </a:fld>
             <a:endParaRPr lang="en-US"/>
           </a:p>
@@ -2382,7 +2384,7 @@
           <a:p>
             <a:fld id="{31CA373E-4619-4AD9-9A1C-1502F6556AAC}" type="datetimeFigureOut">
               <a:rPr lang="en-US" smtClean="0"/>
-              <a:t>1/20/2020</a:t>
+              <a:t>1/24/2020</a:t>
             </a:fld>
             <a:endParaRPr lang="en-US"/>
           </a:p>
@@ -2595,7 +2597,7 @@
           <a:p>
             <a:fld id="{31CA373E-4619-4AD9-9A1C-1502F6556AAC}" type="datetimeFigureOut">
               <a:rPr lang="en-US" smtClean="0"/>
-              <a:t>1/20/2020</a:t>
+              <a:t>1/24/2020</a:t>
             </a:fld>
             <a:endParaRPr lang="en-US"/>
           </a:p>
@@ -3197,7 +3199,7 @@
                   </a:schemeClr>
                 </a:solidFill>
               </a:rPr>
-              <a:t>What is the difference in ABV and IBU between IPAs and other Ales?</a:t>
+              <a:t>Is there a relationship between bitterness and alcohol content?</a:t>
             </a:r>
           </a:p>
         </p:txBody>
@@ -3285,6 +3287,240 @@
       </p:cxnSp>
       <p:sp>
         <p:nvSpPr>
+          <p:cNvPr id="11" name="Rectangle 10">
+            <a:extLst>
+              <a:ext uri="{FF2B5EF4-FFF2-40B4-BE49-F238E27FC236}">
+                <a16:creationId xmlns:a16="http://schemas.microsoft.com/office/drawing/2014/main" id="{2AE95AC1-8A01-4FA3-B041-99AA7191AB8F}"/>
+              </a:ext>
+            </a:extLst>
+          </p:cNvPr>
+          <p:cNvSpPr/>
+          <p:nvPr/>
+        </p:nvSpPr>
+        <p:spPr>
+          <a:xfrm>
+            <a:off x="474050" y="1023088"/>
+            <a:ext cx="8273064" cy="1200329"/>
+          </a:xfrm>
+          <a:prstGeom prst="rect">
+            <a:avLst/>
+          </a:prstGeom>
+        </p:spPr>
+        <p:txBody>
+          <a:bodyPr wrap="square">
+            <a:spAutoFit/>
+          </a:bodyPr>
+          <a:lstStyle/>
+          <a:p>
+            <a:r>
+              <a:rPr lang="en-US" dirty="0"/>
+              <a:t>Higher ABV values are associated with higher IBUs and vice versa.  With p-value &lt; 2.2e-16, there is sufficient evidence at alpha = .05 level of significance to suggest that the data is linearly correlated. Correlation estimate = 0.67 suggests that the relationship between IBU and ABV is positive and strong.</a:t>
+            </a:r>
+          </a:p>
+        </p:txBody>
+      </p:sp>
+      <p:pic>
+        <p:nvPicPr>
+          <p:cNvPr id="1030" name="Picture 6">
+            <a:extLst>
+              <a:ext uri="{FF2B5EF4-FFF2-40B4-BE49-F238E27FC236}">
+                <a16:creationId xmlns:a16="http://schemas.microsoft.com/office/drawing/2014/main" id="{09DA59E7-3E7F-4F8B-A3D5-9260C6A4833F}"/>
+              </a:ext>
+            </a:extLst>
+          </p:cNvPr>
+          <p:cNvPicPr>
+            <a:picLocks noChangeAspect="1" noChangeArrowheads="1"/>
+          </p:cNvPicPr>
+          <p:nvPr/>
+        </p:nvPicPr>
+        <p:blipFill>
+          <a:blip r:embed="rId3">
+            <a:extLst>
+              <a:ext uri="{28A0092B-C50C-407E-A947-70E740481C1C}">
+                <a14:useLocalDpi xmlns:a14="http://schemas.microsoft.com/office/drawing/2010/main" val="0"/>
+              </a:ext>
+            </a:extLst>
+          </a:blip>
+          <a:srcRect/>
+          <a:stretch>
+            <a:fillRect/>
+          </a:stretch>
+        </p:blipFill>
+        <p:spPr bwMode="auto">
+          <a:xfrm>
+            <a:off x="667232" y="2409386"/>
+            <a:ext cx="7382550" cy="3691275"/>
+          </a:xfrm>
+          <a:prstGeom prst="rect">
+            <a:avLst/>
+          </a:prstGeom>
+          <a:noFill/>
+          <a:extLst>
+            <a:ext uri="{909E8E84-426E-40DD-AFC4-6F175D3DCCD1}">
+              <a14:hiddenFill xmlns:a14="http://schemas.microsoft.com/office/drawing/2010/main">
+                <a:solidFill>
+                  <a:srgbClr val="FFFFFF"/>
+                </a:solidFill>
+              </a14:hiddenFill>
+            </a:ext>
+          </a:extLst>
+        </p:spPr>
+      </p:pic>
+    </p:spTree>
+    <p:extLst>
+      <p:ext uri="{BB962C8B-B14F-4D97-AF65-F5344CB8AC3E}">
+        <p14:creationId xmlns:p14="http://schemas.microsoft.com/office/powerpoint/2010/main" val="2887043045"/>
+      </p:ext>
+    </p:extLst>
+  </p:cSld>
+  <p:clrMapOvr>
+    <a:masterClrMapping/>
+  </p:clrMapOvr>
+</p:sld>
+</file>
+
+<file path=ppt/slides/slide11.xml><?xml version="1.0" encoding="utf-8"?>
+<p:sld xmlns:a="http://schemas.openxmlformats.org/drawingml/2006/main" xmlns:r="http://schemas.openxmlformats.org/officeDocument/2006/relationships" xmlns:p="http://schemas.openxmlformats.org/presentationml/2006/main">
+  <p:cSld>
+    <p:spTree>
+      <p:nvGrpSpPr>
+        <p:cNvPr id="1" name=""/>
+        <p:cNvGrpSpPr/>
+        <p:nvPr/>
+      </p:nvGrpSpPr>
+      <p:grpSpPr>
+        <a:xfrm>
+          <a:off x="0" y="0"/>
+          <a:ext cx="0" cy="0"/>
+          <a:chOff x="0" y="0"/>
+          <a:chExt cx="0" cy="0"/>
+        </a:xfrm>
+      </p:grpSpPr>
+      <p:sp>
+        <p:nvSpPr>
+          <p:cNvPr id="2" name="Title 1">
+            <a:extLst>
+              <a:ext uri="{FF2B5EF4-FFF2-40B4-BE49-F238E27FC236}">
+                <a16:creationId xmlns:a16="http://schemas.microsoft.com/office/drawing/2014/main" id="{ED95135E-4283-4599-B850-F011CF9B7C74}"/>
+              </a:ext>
+            </a:extLst>
+          </p:cNvPr>
+          <p:cNvSpPr>
+            <a:spLocks noGrp="1"/>
+          </p:cNvSpPr>
+          <p:nvPr>
+            <p:ph type="title"/>
+          </p:nvPr>
+        </p:nvSpPr>
+        <p:spPr>
+          <a:xfrm>
+            <a:off x="497711" y="336771"/>
+            <a:ext cx="7886700" cy="780398"/>
+          </a:xfrm>
+        </p:spPr>
+        <p:txBody>
+          <a:bodyPr>
+            <a:normAutofit/>
+          </a:bodyPr>
+          <a:lstStyle/>
+          <a:p>
+            <a:r>
+              <a:rPr lang="en-US" sz="2200" dirty="0">
+                <a:solidFill>
+                  <a:schemeClr val="tx1">
+                    <a:lumMod val="65000"/>
+                    <a:lumOff val="35000"/>
+                  </a:schemeClr>
+                </a:solidFill>
+              </a:rPr>
+              <a:t>What is the difference in ABV and IBU between IPAs and other Ales?</a:t>
+            </a:r>
+          </a:p>
+        </p:txBody>
+      </p:sp>
+      <p:pic>
+        <p:nvPicPr>
+          <p:cNvPr id="5" name="Picture 4" descr="A close up of a sign&#10;&#10;Description automatically generated">
+            <a:extLst>
+              <a:ext uri="{FF2B5EF4-FFF2-40B4-BE49-F238E27FC236}">
+                <a16:creationId xmlns:a16="http://schemas.microsoft.com/office/drawing/2014/main" id="{F9271491-99A6-4D00-B738-0E34E6686EFF}"/>
+              </a:ext>
+            </a:extLst>
+          </p:cNvPr>
+          <p:cNvPicPr>
+            <a:picLocks noChangeAspect="1"/>
+          </p:cNvPicPr>
+          <p:nvPr/>
+        </p:nvPicPr>
+        <p:blipFill>
+          <a:blip r:embed="rId2">
+            <a:extLst>
+              <a:ext uri="{28A0092B-C50C-407E-A947-70E740481C1C}">
+                <a14:useLocalDpi xmlns:a14="http://schemas.microsoft.com/office/drawing/2010/main" val="0"/>
+              </a:ext>
+            </a:extLst>
+          </a:blip>
+          <a:stretch>
+            <a:fillRect/>
+          </a:stretch>
+        </p:blipFill>
+        <p:spPr>
+          <a:xfrm>
+            <a:off x="7492438" y="6106511"/>
+            <a:ext cx="1153851" cy="414718"/>
+          </a:xfrm>
+          <a:prstGeom prst="rect">
+            <a:avLst/>
+          </a:prstGeom>
+        </p:spPr>
+      </p:pic>
+      <p:cxnSp>
+        <p:nvCxnSpPr>
+          <p:cNvPr id="7" name="Straight Connector 6">
+            <a:extLst>
+              <a:ext uri="{FF2B5EF4-FFF2-40B4-BE49-F238E27FC236}">
+                <a16:creationId xmlns:a16="http://schemas.microsoft.com/office/drawing/2014/main" id="{754C5E05-D462-4273-82D1-C656D562E12C}"/>
+              </a:ext>
+            </a:extLst>
+          </p:cNvPr>
+          <p:cNvCxnSpPr>
+            <a:cxnSpLocks/>
+          </p:cNvCxnSpPr>
+          <p:nvPr/>
+        </p:nvCxnSpPr>
+        <p:spPr>
+          <a:xfrm>
+            <a:off x="574876" y="945266"/>
+            <a:ext cx="8071413" cy="0"/>
+          </a:xfrm>
+          <a:prstGeom prst="line">
+            <a:avLst/>
+          </a:prstGeom>
+          <a:ln>
+            <a:solidFill>
+              <a:schemeClr val="bg2">
+                <a:lumMod val="75000"/>
+              </a:schemeClr>
+            </a:solidFill>
+          </a:ln>
+        </p:spPr>
+        <p:style>
+          <a:lnRef idx="1">
+            <a:schemeClr val="accent6"/>
+          </a:lnRef>
+          <a:fillRef idx="0">
+            <a:schemeClr val="accent6"/>
+          </a:fillRef>
+          <a:effectRef idx="0">
+            <a:schemeClr val="accent6"/>
+          </a:effectRef>
+          <a:fontRef idx="minor">
+            <a:schemeClr val="tx1"/>
+          </a:fontRef>
+        </p:style>
+      </p:cxnSp>
+      <p:sp>
+        <p:nvSpPr>
           <p:cNvPr id="9" name="Rectangle 8">
             <a:extLst>
               <a:ext uri="{FF2B5EF4-FFF2-40B4-BE49-F238E27FC236}">
@@ -3377,7 +3613,7 @@
 </p:sld>
 </file>
 
-<file path=ppt/slides/slide11.xml><?xml version="1.0" encoding="utf-8"?>
+<file path=ppt/slides/slide12.xml><?xml version="1.0" encoding="utf-8"?>
 <p:sld xmlns:a="http://schemas.openxmlformats.org/drawingml/2006/main" xmlns:r="http://schemas.openxmlformats.org/officeDocument/2006/relationships" xmlns:p="http://schemas.openxmlformats.org/presentationml/2006/main">
   <p:cSld>
     <p:spTree>
@@ -3874,205 +4110,6 @@
 </p:sld>
 </file>
 
-<file path=ppt/slides/slide12.xml><?xml version="1.0" encoding="utf-8"?>
-<p:sld xmlns:a="http://schemas.openxmlformats.org/drawingml/2006/main" xmlns:r="http://schemas.openxmlformats.org/officeDocument/2006/relationships" xmlns:p="http://schemas.openxmlformats.org/presentationml/2006/main">
-  <p:cSld>
-    <p:spTree>
-      <p:nvGrpSpPr>
-        <p:cNvPr id="1" name=""/>
-        <p:cNvGrpSpPr/>
-        <p:nvPr/>
-      </p:nvGrpSpPr>
-      <p:grpSpPr>
-        <a:xfrm>
-          <a:off x="0" y="0"/>
-          <a:ext cx="0" cy="0"/>
-          <a:chOff x="0" y="0"/>
-          <a:chExt cx="0" cy="0"/>
-        </a:xfrm>
-      </p:grpSpPr>
-      <p:sp>
-        <p:nvSpPr>
-          <p:cNvPr id="2" name="Title 1">
-            <a:extLst>
-              <a:ext uri="{FF2B5EF4-FFF2-40B4-BE49-F238E27FC236}">
-                <a16:creationId xmlns:a16="http://schemas.microsoft.com/office/drawing/2014/main" id="{ED95135E-4283-4599-B850-F011CF9B7C74}"/>
-              </a:ext>
-            </a:extLst>
-          </p:cNvPr>
-          <p:cNvSpPr>
-            <a:spLocks noGrp="1"/>
-          </p:cNvSpPr>
-          <p:nvPr>
-            <p:ph type="title"/>
-          </p:nvPr>
-        </p:nvSpPr>
-        <p:spPr>
-          <a:xfrm>
-            <a:off x="497711" y="336771"/>
-            <a:ext cx="7886700" cy="780398"/>
-          </a:xfrm>
-        </p:spPr>
-        <p:txBody>
-          <a:bodyPr>
-            <a:normAutofit/>
-          </a:bodyPr>
-          <a:lstStyle/>
-          <a:p>
-            <a:r>
-              <a:rPr lang="en-US" sz="2200" dirty="0">
-                <a:solidFill>
-                  <a:schemeClr val="tx1">
-                    <a:lumMod val="65000"/>
-                    <a:lumOff val="35000"/>
-                  </a:schemeClr>
-                </a:solidFill>
-              </a:rPr>
-              <a:t>What is the difference in ABV and IBU between IPAs and other Ales?</a:t>
-            </a:r>
-          </a:p>
-        </p:txBody>
-      </p:sp>
-      <p:pic>
-        <p:nvPicPr>
-          <p:cNvPr id="5" name="Picture 4" descr="A close up of a sign&#10;&#10;Description automatically generated">
-            <a:extLst>
-              <a:ext uri="{FF2B5EF4-FFF2-40B4-BE49-F238E27FC236}">
-                <a16:creationId xmlns:a16="http://schemas.microsoft.com/office/drawing/2014/main" id="{F9271491-99A6-4D00-B738-0E34E6686EFF}"/>
-              </a:ext>
-            </a:extLst>
-          </p:cNvPr>
-          <p:cNvPicPr>
-            <a:picLocks noChangeAspect="1"/>
-          </p:cNvPicPr>
-          <p:nvPr/>
-        </p:nvPicPr>
-        <p:blipFill>
-          <a:blip r:embed="rId2">
-            <a:extLst>
-              <a:ext uri="{28A0092B-C50C-407E-A947-70E740481C1C}">
-                <a14:useLocalDpi xmlns:a14="http://schemas.microsoft.com/office/drawing/2010/main" val="0"/>
-              </a:ext>
-            </a:extLst>
-          </a:blip>
-          <a:stretch>
-            <a:fillRect/>
-          </a:stretch>
-        </p:blipFill>
-        <p:spPr>
-          <a:xfrm>
-            <a:off x="7492438" y="6106511"/>
-            <a:ext cx="1153851" cy="414718"/>
-          </a:xfrm>
-          <a:prstGeom prst="rect">
-            <a:avLst/>
-          </a:prstGeom>
-        </p:spPr>
-      </p:pic>
-      <p:cxnSp>
-        <p:nvCxnSpPr>
-          <p:cNvPr id="7" name="Straight Connector 6">
-            <a:extLst>
-              <a:ext uri="{FF2B5EF4-FFF2-40B4-BE49-F238E27FC236}">
-                <a16:creationId xmlns:a16="http://schemas.microsoft.com/office/drawing/2014/main" id="{754C5E05-D462-4273-82D1-C656D562E12C}"/>
-              </a:ext>
-            </a:extLst>
-          </p:cNvPr>
-          <p:cNvCxnSpPr>
-            <a:cxnSpLocks/>
-          </p:cNvCxnSpPr>
-          <p:nvPr/>
-        </p:nvCxnSpPr>
-        <p:spPr>
-          <a:xfrm>
-            <a:off x="574876" y="945266"/>
-            <a:ext cx="8071413" cy="0"/>
-          </a:xfrm>
-          <a:prstGeom prst="line">
-            <a:avLst/>
-          </a:prstGeom>
-          <a:ln>
-            <a:solidFill>
-              <a:schemeClr val="bg2">
-                <a:lumMod val="75000"/>
-              </a:schemeClr>
-            </a:solidFill>
-          </a:ln>
-        </p:spPr>
-        <p:style>
-          <a:lnRef idx="1">
-            <a:schemeClr val="accent6"/>
-          </a:lnRef>
-          <a:fillRef idx="0">
-            <a:schemeClr val="accent6"/>
-          </a:fillRef>
-          <a:effectRef idx="0">
-            <a:schemeClr val="accent6"/>
-          </a:effectRef>
-          <a:fontRef idx="minor">
-            <a:schemeClr val="tx1"/>
-          </a:fontRef>
-        </p:style>
-      </p:cxnSp>
-      <p:sp>
-        <p:nvSpPr>
-          <p:cNvPr id="3" name="Rectangle 2">
-            <a:extLst>
-              <a:ext uri="{FF2B5EF4-FFF2-40B4-BE49-F238E27FC236}">
-                <a16:creationId xmlns:a16="http://schemas.microsoft.com/office/drawing/2014/main" id="{6337412A-3C1B-4CB0-9026-C0FA00BC1378}"/>
-              </a:ext>
-            </a:extLst>
-          </p:cNvPr>
-          <p:cNvSpPr/>
-          <p:nvPr/>
-        </p:nvSpPr>
-        <p:spPr>
-          <a:xfrm>
-            <a:off x="497711" y="1184613"/>
-            <a:ext cx="8503414" cy="2585323"/>
-          </a:xfrm>
-          <a:prstGeom prst="rect">
-            <a:avLst/>
-          </a:prstGeom>
-        </p:spPr>
-        <p:txBody>
-          <a:bodyPr wrap="square">
-            <a:spAutoFit/>
-          </a:bodyPr>
-          <a:lstStyle/>
-          <a:p>
-            <a:r>
-              <a:rPr lang="en-US" dirty="0"/>
-              <a:t>We used Welch two sample t-test to test for the mean differences of ABV/IBU between IPAs and Ales. At alpha=.05 level of significance, there is sufficient evidence to suggest that the mean ABV/IBU of IPAs is significantly different from the mean ABV/IBU of Ales (p-value &lt;2.2e-16).</a:t>
-            </a:r>
-          </a:p>
-          <a:p>
-            <a:endParaRPr lang="en-US" dirty="0"/>
-          </a:p>
-          <a:p>
-            <a:r>
-              <a:rPr lang="en-US" dirty="0"/>
-              <a:t>We are 95% confident that the mean differences in ABV stay within (0.011, 0.014) and the mean differences in IBU stay within (35.16, 40.07) between IPAs and other Ales groups.</a:t>
-            </a:r>
-          </a:p>
-          <a:p>
-            <a:endParaRPr lang="en-US" dirty="0"/>
-          </a:p>
-        </p:txBody>
-      </p:sp>
-    </p:spTree>
-    <p:extLst>
-      <p:ext uri="{BB962C8B-B14F-4D97-AF65-F5344CB8AC3E}">
-        <p14:creationId xmlns:p14="http://schemas.microsoft.com/office/powerpoint/2010/main" val="2794249314"/>
-      </p:ext>
-    </p:extLst>
-  </p:cSld>
-  <p:clrMapOvr>
-    <a:masterClrMapping/>
-  </p:clrMapOvr>
-</p:sld>
-</file>
-
 <file path=ppt/slides/slide13.xml><?xml version="1.0" encoding="utf-8"?>
 <p:sld xmlns:a="http://schemas.openxmlformats.org/drawingml/2006/main" xmlns:r="http://schemas.openxmlformats.org/officeDocument/2006/relationships" xmlns:p="http://schemas.openxmlformats.org/presentationml/2006/main">
   <p:cSld>
@@ -4213,98 +4250,56 @@
           </a:fontRef>
         </p:style>
       </p:cxnSp>
-      <p:pic>
-        <p:nvPicPr>
-          <p:cNvPr id="6146" name="Picture 2">
-            <a:extLst>
-              <a:ext uri="{FF2B5EF4-FFF2-40B4-BE49-F238E27FC236}">
-                <a16:creationId xmlns:a16="http://schemas.microsoft.com/office/drawing/2014/main" id="{3848A575-D9B8-41D6-971F-14F1BC85DA8D}"/>
-              </a:ext>
-            </a:extLst>
-          </p:cNvPr>
-          <p:cNvPicPr>
-            <a:picLocks noChangeAspect="1" noChangeArrowheads="1"/>
-          </p:cNvPicPr>
+      <p:sp>
+        <p:nvSpPr>
+          <p:cNvPr id="3" name="Rectangle 2">
+            <a:extLst>
+              <a:ext uri="{FF2B5EF4-FFF2-40B4-BE49-F238E27FC236}">
+                <a16:creationId xmlns:a16="http://schemas.microsoft.com/office/drawing/2014/main" id="{6337412A-3C1B-4CB0-9026-C0FA00BC1378}"/>
+              </a:ext>
+            </a:extLst>
+          </p:cNvPr>
+          <p:cNvSpPr/>
           <p:nvPr/>
-        </p:nvPicPr>
-        <p:blipFill>
-          <a:blip r:embed="rId3">
-            <a:extLst>
-              <a:ext uri="{28A0092B-C50C-407E-A947-70E740481C1C}">
-                <a14:useLocalDpi xmlns:a14="http://schemas.microsoft.com/office/drawing/2010/main" val="0"/>
-              </a:ext>
-            </a:extLst>
-          </a:blip>
-          <a:srcRect/>
-          <a:stretch>
-            <a:fillRect/>
-          </a:stretch>
-        </p:blipFill>
-        <p:spPr bwMode="auto">
-          <a:xfrm>
-            <a:off x="371455" y="1230999"/>
-            <a:ext cx="8508555" cy="4254278"/>
+        </p:nvSpPr>
+        <p:spPr>
+          <a:xfrm>
+            <a:off x="497711" y="1184613"/>
+            <a:ext cx="8503414" cy="2585323"/>
           </a:xfrm>
           <a:prstGeom prst="rect">
             <a:avLst/>
           </a:prstGeom>
-          <a:noFill/>
-          <a:extLst>
-            <a:ext uri="{909E8E84-426E-40DD-AFC4-6F175D3DCCD1}">
-              <a14:hiddenFill xmlns:a14="http://schemas.microsoft.com/office/drawing/2010/main">
-                <a:solidFill>
-                  <a:srgbClr val="FFFFFF"/>
-                </a:solidFill>
-              </a14:hiddenFill>
-            </a:ext>
-          </a:extLst>
-        </p:spPr>
-      </p:pic>
-      <p:sp>
-        <p:nvSpPr>
-          <p:cNvPr id="6" name="TextBox 5">
-            <a:extLst>
-              <a:ext uri="{FF2B5EF4-FFF2-40B4-BE49-F238E27FC236}">
-                <a16:creationId xmlns:a16="http://schemas.microsoft.com/office/drawing/2014/main" id="{3B826DFA-724B-41CB-A895-41F761BD822C}"/>
-              </a:ext>
-            </a:extLst>
-          </p:cNvPr>
-          <p:cNvSpPr txBox="1"/>
-          <p:nvPr/>
-        </p:nvSpPr>
-        <p:spPr>
-          <a:xfrm>
-            <a:off x="371455" y="5589568"/>
-            <a:ext cx="8274834" cy="646331"/>
-          </a:xfrm>
-          <a:prstGeom prst="rect">
-            <a:avLst/>
-          </a:prstGeom>
-          <a:noFill/>
-        </p:spPr>
-        <p:txBody>
-          <a:bodyPr wrap="square" rtlCol="0">
+        </p:spPr>
+        <p:txBody>
+          <a:bodyPr wrap="square">
             <a:spAutoFit/>
           </a:bodyPr>
           <a:lstStyle/>
           <a:p>
             <a:r>
               <a:rPr lang="en-US" dirty="0"/>
-              <a:t>The correlation of ABV and IBU is stronger in IPAs.</a:t>
-            </a:r>
+              <a:t>We used Welch two sample t-test to test for the mean differences of ABV/IBU between IPAs and Ales. At alpha=.05 level of significance, there is sufficient evidence to suggest that the mean ABV/IBU of IPAs is significantly different from the mean ABV/IBU of Ales (p-value &lt;2.2e-16).</a:t>
+            </a:r>
+          </a:p>
+          <a:p>
+            <a:endParaRPr lang="en-US" dirty="0"/>
           </a:p>
           <a:p>
             <a:r>
               <a:rPr lang="en-US" dirty="0"/>
-              <a:t>Ale has more outliers and larger variance.</a:t>
-            </a:r>
+              <a:t>We are 95% confident that the mean differences in ABV stay within (0.011, 0.014) and the mean differences in IBU stay within (35.16, 40.07) between IPAs and other Ales groups.</a:t>
+            </a:r>
+          </a:p>
+          <a:p>
+            <a:endParaRPr lang="en-US" dirty="0"/>
           </a:p>
         </p:txBody>
       </p:sp>
     </p:spTree>
     <p:extLst>
       <p:ext uri="{BB962C8B-B14F-4D97-AF65-F5344CB8AC3E}">
-        <p14:creationId xmlns:p14="http://schemas.microsoft.com/office/powerpoint/2010/main" val="343221352"/>
+        <p14:creationId xmlns:p14="http://schemas.microsoft.com/office/powerpoint/2010/main" val="2794249314"/>
       </p:ext>
     </p:extLst>
   </p:cSld>
@@ -4331,6 +4326,247 @@
           <a:chExt cx="0" cy="0"/>
         </a:xfrm>
       </p:grpSpPr>
+      <p:sp>
+        <p:nvSpPr>
+          <p:cNvPr id="2" name="Title 1">
+            <a:extLst>
+              <a:ext uri="{FF2B5EF4-FFF2-40B4-BE49-F238E27FC236}">
+                <a16:creationId xmlns:a16="http://schemas.microsoft.com/office/drawing/2014/main" id="{ED95135E-4283-4599-B850-F011CF9B7C74}"/>
+              </a:ext>
+            </a:extLst>
+          </p:cNvPr>
+          <p:cNvSpPr>
+            <a:spLocks noGrp="1"/>
+          </p:cNvSpPr>
+          <p:nvPr>
+            <p:ph type="title"/>
+          </p:nvPr>
+        </p:nvSpPr>
+        <p:spPr>
+          <a:xfrm>
+            <a:off x="497711" y="336771"/>
+            <a:ext cx="7886700" cy="780398"/>
+          </a:xfrm>
+        </p:spPr>
+        <p:txBody>
+          <a:bodyPr>
+            <a:normAutofit/>
+          </a:bodyPr>
+          <a:lstStyle/>
+          <a:p>
+            <a:r>
+              <a:rPr lang="en-US" sz="2200" dirty="0">
+                <a:solidFill>
+                  <a:schemeClr val="tx1">
+                    <a:lumMod val="65000"/>
+                    <a:lumOff val="35000"/>
+                  </a:schemeClr>
+                </a:solidFill>
+              </a:rPr>
+              <a:t>What is the difference in ABV and IBU between IPAs and other Ales?</a:t>
+            </a:r>
+          </a:p>
+        </p:txBody>
+      </p:sp>
+      <p:pic>
+        <p:nvPicPr>
+          <p:cNvPr id="5" name="Picture 4" descr="A close up of a sign&#10;&#10;Description automatically generated">
+            <a:extLst>
+              <a:ext uri="{FF2B5EF4-FFF2-40B4-BE49-F238E27FC236}">
+                <a16:creationId xmlns:a16="http://schemas.microsoft.com/office/drawing/2014/main" id="{F9271491-99A6-4D00-B738-0E34E6686EFF}"/>
+              </a:ext>
+            </a:extLst>
+          </p:cNvPr>
+          <p:cNvPicPr>
+            <a:picLocks noChangeAspect="1"/>
+          </p:cNvPicPr>
+          <p:nvPr/>
+        </p:nvPicPr>
+        <p:blipFill>
+          <a:blip r:embed="rId2">
+            <a:extLst>
+              <a:ext uri="{28A0092B-C50C-407E-A947-70E740481C1C}">
+                <a14:useLocalDpi xmlns:a14="http://schemas.microsoft.com/office/drawing/2010/main" val="0"/>
+              </a:ext>
+            </a:extLst>
+          </a:blip>
+          <a:stretch>
+            <a:fillRect/>
+          </a:stretch>
+        </p:blipFill>
+        <p:spPr>
+          <a:xfrm>
+            <a:off x="7492438" y="6106511"/>
+            <a:ext cx="1153851" cy="414718"/>
+          </a:xfrm>
+          <a:prstGeom prst="rect">
+            <a:avLst/>
+          </a:prstGeom>
+        </p:spPr>
+      </p:pic>
+      <p:cxnSp>
+        <p:nvCxnSpPr>
+          <p:cNvPr id="7" name="Straight Connector 6">
+            <a:extLst>
+              <a:ext uri="{FF2B5EF4-FFF2-40B4-BE49-F238E27FC236}">
+                <a16:creationId xmlns:a16="http://schemas.microsoft.com/office/drawing/2014/main" id="{754C5E05-D462-4273-82D1-C656D562E12C}"/>
+              </a:ext>
+            </a:extLst>
+          </p:cNvPr>
+          <p:cNvCxnSpPr>
+            <a:cxnSpLocks/>
+          </p:cNvCxnSpPr>
+          <p:nvPr/>
+        </p:nvCxnSpPr>
+        <p:spPr>
+          <a:xfrm>
+            <a:off x="574876" y="945266"/>
+            <a:ext cx="8071413" cy="0"/>
+          </a:xfrm>
+          <a:prstGeom prst="line">
+            <a:avLst/>
+          </a:prstGeom>
+          <a:ln>
+            <a:solidFill>
+              <a:schemeClr val="bg2">
+                <a:lumMod val="75000"/>
+              </a:schemeClr>
+            </a:solidFill>
+          </a:ln>
+        </p:spPr>
+        <p:style>
+          <a:lnRef idx="1">
+            <a:schemeClr val="accent6"/>
+          </a:lnRef>
+          <a:fillRef idx="0">
+            <a:schemeClr val="accent6"/>
+          </a:fillRef>
+          <a:effectRef idx="0">
+            <a:schemeClr val="accent6"/>
+          </a:effectRef>
+          <a:fontRef idx="minor">
+            <a:schemeClr val="tx1"/>
+          </a:fontRef>
+        </p:style>
+      </p:cxnSp>
+      <p:pic>
+        <p:nvPicPr>
+          <p:cNvPr id="6146" name="Picture 2">
+            <a:extLst>
+              <a:ext uri="{FF2B5EF4-FFF2-40B4-BE49-F238E27FC236}">
+                <a16:creationId xmlns:a16="http://schemas.microsoft.com/office/drawing/2014/main" id="{3848A575-D9B8-41D6-971F-14F1BC85DA8D}"/>
+              </a:ext>
+            </a:extLst>
+          </p:cNvPr>
+          <p:cNvPicPr>
+            <a:picLocks noChangeAspect="1" noChangeArrowheads="1"/>
+          </p:cNvPicPr>
+          <p:nvPr/>
+        </p:nvPicPr>
+        <p:blipFill>
+          <a:blip r:embed="rId3">
+            <a:extLst>
+              <a:ext uri="{28A0092B-C50C-407E-A947-70E740481C1C}">
+                <a14:useLocalDpi xmlns:a14="http://schemas.microsoft.com/office/drawing/2010/main" val="0"/>
+              </a:ext>
+            </a:extLst>
+          </a:blip>
+          <a:srcRect/>
+          <a:stretch>
+            <a:fillRect/>
+          </a:stretch>
+        </p:blipFill>
+        <p:spPr bwMode="auto">
+          <a:xfrm>
+            <a:off x="371455" y="1230999"/>
+            <a:ext cx="8508555" cy="4254278"/>
+          </a:xfrm>
+          <a:prstGeom prst="rect">
+            <a:avLst/>
+          </a:prstGeom>
+          <a:noFill/>
+          <a:extLst>
+            <a:ext uri="{909E8E84-426E-40DD-AFC4-6F175D3DCCD1}">
+              <a14:hiddenFill xmlns:a14="http://schemas.microsoft.com/office/drawing/2010/main">
+                <a:solidFill>
+                  <a:srgbClr val="FFFFFF"/>
+                </a:solidFill>
+              </a14:hiddenFill>
+            </a:ext>
+          </a:extLst>
+        </p:spPr>
+      </p:pic>
+      <p:sp>
+        <p:nvSpPr>
+          <p:cNvPr id="6" name="TextBox 5">
+            <a:extLst>
+              <a:ext uri="{FF2B5EF4-FFF2-40B4-BE49-F238E27FC236}">
+                <a16:creationId xmlns:a16="http://schemas.microsoft.com/office/drawing/2014/main" id="{3B826DFA-724B-41CB-A895-41F761BD822C}"/>
+              </a:ext>
+            </a:extLst>
+          </p:cNvPr>
+          <p:cNvSpPr txBox="1"/>
+          <p:nvPr/>
+        </p:nvSpPr>
+        <p:spPr>
+          <a:xfrm>
+            <a:off x="371455" y="5589568"/>
+            <a:ext cx="8274834" cy="646331"/>
+          </a:xfrm>
+          <a:prstGeom prst="rect">
+            <a:avLst/>
+          </a:prstGeom>
+          <a:noFill/>
+        </p:spPr>
+        <p:txBody>
+          <a:bodyPr wrap="square" rtlCol="0">
+            <a:spAutoFit/>
+          </a:bodyPr>
+          <a:lstStyle/>
+          <a:p>
+            <a:r>
+              <a:rPr lang="en-US" dirty="0"/>
+              <a:t>The correlation of ABV and IBU is stronger in IPAs.</a:t>
+            </a:r>
+          </a:p>
+          <a:p>
+            <a:r>
+              <a:rPr lang="en-US" dirty="0"/>
+              <a:t>Ale has more outliers and larger variance.</a:t>
+            </a:r>
+          </a:p>
+        </p:txBody>
+      </p:sp>
+    </p:spTree>
+    <p:extLst>
+      <p:ext uri="{BB962C8B-B14F-4D97-AF65-F5344CB8AC3E}">
+        <p14:creationId xmlns:p14="http://schemas.microsoft.com/office/powerpoint/2010/main" val="343221352"/>
+      </p:ext>
+    </p:extLst>
+  </p:cSld>
+  <p:clrMapOvr>
+    <a:masterClrMapping/>
+  </p:clrMapOvr>
+</p:sld>
+</file>
+
+<file path=ppt/slides/slide15.xml><?xml version="1.0" encoding="utf-8"?>
+<p:sld xmlns:a="http://schemas.openxmlformats.org/drawingml/2006/main" xmlns:r="http://schemas.openxmlformats.org/officeDocument/2006/relationships" xmlns:p="http://schemas.openxmlformats.org/presentationml/2006/main">
+  <p:cSld>
+    <p:spTree>
+      <p:nvGrpSpPr>
+        <p:cNvPr id="1" name=""/>
+        <p:cNvGrpSpPr/>
+        <p:nvPr/>
+      </p:nvGrpSpPr>
+      <p:grpSpPr>
+        <a:xfrm>
+          <a:off x="0" y="0"/>
+          <a:ext cx="0" cy="0"/>
+          <a:chOff x="0" y="0"/>
+          <a:chExt cx="0" cy="0"/>
+        </a:xfrm>
+      </p:grpSpPr>
       <p:pic>
         <p:nvPicPr>
           <p:cNvPr id="1028" name="Picture 4">
@@ -4641,7 +4877,7 @@
 </p:sld>
 </file>
 
-<file path=ppt/slides/slide15.xml><?xml version="1.0" encoding="utf-8"?>
+<file path=ppt/slides/slide16.xml><?xml version="1.0" encoding="utf-8"?>
 <p:sld xmlns:a="http://schemas.openxmlformats.org/drawingml/2006/main" xmlns:r="http://schemas.openxmlformats.org/officeDocument/2006/relationships" xmlns:p="http://schemas.openxmlformats.org/presentationml/2006/main">
   <p:cSld>
     <p:spTree>
@@ -5179,7 +5415,7 @@
 </p:sld>
 </file>
 
-<file path=ppt/slides/slide16.xml><?xml version="1.0" encoding="utf-8"?>
+<file path=ppt/slides/slide17.xml><?xml version="1.0" encoding="utf-8"?>
 <p:sld xmlns:a="http://schemas.openxmlformats.org/drawingml/2006/main" xmlns:r="http://schemas.openxmlformats.org/officeDocument/2006/relationships" xmlns:p="http://schemas.openxmlformats.org/presentationml/2006/main">
   <p:cSld>
     <p:spTree>
@@ -5413,7 +5649,7 @@
 </p:sld>
 </file>
 
-<file path=ppt/slides/slide17.xml><?xml version="1.0" encoding="utf-8"?>
+<file path=ppt/slides/slide18.xml><?xml version="1.0" encoding="utf-8"?>
 <p:sld xmlns:a="http://schemas.openxmlformats.org/drawingml/2006/main" xmlns:r="http://schemas.openxmlformats.org/officeDocument/2006/relationships" xmlns:p="http://schemas.openxmlformats.org/presentationml/2006/main">
   <p:cSld>
     <p:spTree>
@@ -5652,7 +5888,7 @@
 </p:sld>
 </file>
 
-<file path=ppt/slides/slide18.xml><?xml version="1.0" encoding="utf-8"?>
+<file path=ppt/slides/slide19.xml><?xml version="1.0" encoding="utf-8"?>
 <p:sld xmlns:a="http://schemas.openxmlformats.org/drawingml/2006/main" xmlns:r="http://schemas.openxmlformats.org/officeDocument/2006/relationships" xmlns:p="http://schemas.openxmlformats.org/presentationml/2006/main">
   <p:cSld>
     <p:bg>
@@ -5827,6 +6063,594 @@
                   </a:schemeClr>
                 </a:solidFill>
               </a:rPr>
+              <a:t>Links</a:t>
+            </a:r>
+          </a:p>
+        </p:txBody>
+      </p:sp>
+      <p:sp>
+        <p:nvSpPr>
+          <p:cNvPr id="3" name="Content Placeholder 2">
+            <a:extLst>
+              <a:ext uri="{FF2B5EF4-FFF2-40B4-BE49-F238E27FC236}">
+                <a16:creationId xmlns:a16="http://schemas.microsoft.com/office/drawing/2014/main" id="{2DD55975-366F-4C51-B7D6-EEAFD411A8C3}"/>
+              </a:ext>
+            </a:extLst>
+          </p:cNvPr>
+          <p:cNvSpPr>
+            <a:spLocks noGrp="1"/>
+          </p:cNvSpPr>
+          <p:nvPr>
+            <p:ph idx="1"/>
+          </p:nvPr>
+        </p:nvSpPr>
+        <p:spPr>
+          <a:xfrm>
+            <a:off x="574876" y="1162010"/>
+            <a:ext cx="7886700" cy="4351338"/>
+          </a:xfrm>
+        </p:spPr>
+        <p:txBody>
+          <a:bodyPr/>
+          <a:lstStyle/>
+          <a:p>
+            <a:pPr marL="0" indent="0">
+              <a:spcAft>
+                <a:spcPts val="600"/>
+              </a:spcAft>
+              <a:buNone/>
+            </a:pPr>
+            <a:r>
+              <a:rPr lang="en-US" sz="1600" dirty="0"/>
+              <a:t>GitHub Repo:</a:t>
+            </a:r>
+            <a:br>
+              <a:rPr lang="en-US" sz="1600" dirty="0"/>
+            </a:br>
+            <a:r>
+              <a:rPr lang="en-US" sz="1600" dirty="0">
+                <a:hlinkClick r:id="rId2"/>
+              </a:rPr>
+              <a:t>https://github.com/kristxh/6306-CaseStudy1-Beer</a:t>
+            </a:r>
+            <a:br>
+              <a:rPr lang="en-US" sz="1600" dirty="0"/>
+            </a:br>
+            <a:br>
+              <a:rPr lang="en-US" sz="1600" dirty="0"/>
+            </a:br>
+            <a:br>
+              <a:rPr lang="en-US" sz="1600" dirty="0"/>
+            </a:br>
+            <a:r>
+              <a:rPr lang="en-US" sz="1600" dirty="0" err="1"/>
+              <a:t>Phu</a:t>
+            </a:r>
+            <a:r>
+              <a:rPr lang="en-US" sz="1600" dirty="0"/>
+              <a:t> Truong YouTube Presentation:</a:t>
+            </a:r>
+            <a:br>
+              <a:rPr lang="en-US" sz="1600" dirty="0"/>
+            </a:br>
+            <a:r>
+              <a:rPr lang="en-US" sz="1600" dirty="0"/>
+              <a:t>&lt;link&gt;</a:t>
+            </a:r>
+            <a:br>
+              <a:rPr lang="en-US" sz="1600" dirty="0"/>
+            </a:br>
+            <a:br>
+              <a:rPr lang="en-US" sz="1600" dirty="0"/>
+            </a:br>
+            <a:br>
+              <a:rPr lang="en-US" sz="1600" dirty="0"/>
+            </a:br>
+            <a:r>
+              <a:rPr lang="en-US" sz="1600" dirty="0"/>
+              <a:t>Kristi Herman YouTube Presentation:</a:t>
+            </a:r>
+            <a:br>
+              <a:rPr lang="en-US" sz="1600" dirty="0"/>
+            </a:br>
+            <a:r>
+              <a:rPr lang="en-US" sz="1600" dirty="0">
+                <a:hlinkClick r:id="rId3"/>
+              </a:rPr>
+              <a:t>https://www.youtube.com/watch?v=OPZmAFZuCQE</a:t>
+            </a:r>
+            <a:endParaRPr lang="en-US" sz="1600" dirty="0"/>
+          </a:p>
+          <a:p>
+            <a:pPr marL="0" indent="0">
+              <a:spcAft>
+                <a:spcPts val="600"/>
+              </a:spcAft>
+              <a:buNone/>
+            </a:pPr>
+            <a:endParaRPr lang="en-US" sz="2000" dirty="0"/>
+          </a:p>
+          <a:p>
+            <a:endParaRPr lang="en-US" sz="1600" dirty="0"/>
+          </a:p>
+          <a:p>
+            <a:pPr marL="0" indent="0">
+              <a:buNone/>
+            </a:pPr>
+            <a:endParaRPr lang="en-US" dirty="0"/>
+          </a:p>
+        </p:txBody>
+      </p:sp>
+      <p:pic>
+        <p:nvPicPr>
+          <p:cNvPr id="5" name="Picture 4" descr="A close up of a sign&#10;&#10;Description automatically generated">
+            <a:extLst>
+              <a:ext uri="{FF2B5EF4-FFF2-40B4-BE49-F238E27FC236}">
+                <a16:creationId xmlns:a16="http://schemas.microsoft.com/office/drawing/2014/main" id="{F9271491-99A6-4D00-B738-0E34E6686EFF}"/>
+              </a:ext>
+            </a:extLst>
+          </p:cNvPr>
+          <p:cNvPicPr>
+            <a:picLocks noChangeAspect="1"/>
+          </p:cNvPicPr>
+          <p:nvPr/>
+        </p:nvPicPr>
+        <p:blipFill>
+          <a:blip r:embed="rId4">
+            <a:extLst>
+              <a:ext uri="{28A0092B-C50C-407E-A947-70E740481C1C}">
+                <a14:useLocalDpi xmlns:a14="http://schemas.microsoft.com/office/drawing/2010/main" val="0"/>
+              </a:ext>
+            </a:extLst>
+          </a:blip>
+          <a:stretch>
+            <a:fillRect/>
+          </a:stretch>
+        </p:blipFill>
+        <p:spPr>
+          <a:xfrm>
+            <a:off x="7492438" y="6106511"/>
+            <a:ext cx="1153851" cy="414718"/>
+          </a:xfrm>
+          <a:prstGeom prst="rect">
+            <a:avLst/>
+          </a:prstGeom>
+        </p:spPr>
+      </p:pic>
+      <p:cxnSp>
+        <p:nvCxnSpPr>
+          <p:cNvPr id="7" name="Straight Connector 6">
+            <a:extLst>
+              <a:ext uri="{FF2B5EF4-FFF2-40B4-BE49-F238E27FC236}">
+                <a16:creationId xmlns:a16="http://schemas.microsoft.com/office/drawing/2014/main" id="{754C5E05-D462-4273-82D1-C656D562E12C}"/>
+              </a:ext>
+            </a:extLst>
+          </p:cNvPr>
+          <p:cNvCxnSpPr>
+            <a:cxnSpLocks/>
+          </p:cNvCxnSpPr>
+          <p:nvPr/>
+        </p:nvCxnSpPr>
+        <p:spPr>
+          <a:xfrm>
+            <a:off x="574876" y="945266"/>
+            <a:ext cx="8071413" cy="0"/>
+          </a:xfrm>
+          <a:prstGeom prst="line">
+            <a:avLst/>
+          </a:prstGeom>
+          <a:ln>
+            <a:solidFill>
+              <a:schemeClr val="bg2">
+                <a:lumMod val="75000"/>
+              </a:schemeClr>
+            </a:solidFill>
+          </a:ln>
+        </p:spPr>
+        <p:style>
+          <a:lnRef idx="1">
+            <a:schemeClr val="accent6"/>
+          </a:lnRef>
+          <a:fillRef idx="0">
+            <a:schemeClr val="accent6"/>
+          </a:fillRef>
+          <a:effectRef idx="0">
+            <a:schemeClr val="accent6"/>
+          </a:effectRef>
+          <a:fontRef idx="minor">
+            <a:schemeClr val="tx1"/>
+          </a:fontRef>
+        </p:style>
+      </p:cxnSp>
+    </p:spTree>
+    <p:extLst>
+      <p:ext uri="{BB962C8B-B14F-4D97-AF65-F5344CB8AC3E}">
+        <p14:creationId xmlns:p14="http://schemas.microsoft.com/office/powerpoint/2010/main" val="3784152772"/>
+      </p:ext>
+    </p:extLst>
+  </p:cSld>
+  <p:clrMapOvr>
+    <a:masterClrMapping/>
+  </p:clrMapOvr>
+</p:sld>
+</file>
+
+<file path=ppt/slides/slide20.xml><?xml version="1.0" encoding="utf-8"?>
+<p:sld xmlns:a="http://schemas.openxmlformats.org/drawingml/2006/main" xmlns:r="http://schemas.openxmlformats.org/officeDocument/2006/relationships" xmlns:p="http://schemas.openxmlformats.org/presentationml/2006/main">
+  <p:cSld>
+    <p:spTree>
+      <p:nvGrpSpPr>
+        <p:cNvPr id="1" name=""/>
+        <p:cNvGrpSpPr/>
+        <p:nvPr/>
+      </p:nvGrpSpPr>
+      <p:grpSpPr>
+        <a:xfrm>
+          <a:off x="0" y="0"/>
+          <a:ext cx="0" cy="0"/>
+          <a:chOff x="0" y="0"/>
+          <a:chExt cx="0" cy="0"/>
+        </a:xfrm>
+      </p:grpSpPr>
+      <p:sp>
+        <p:nvSpPr>
+          <p:cNvPr id="2" name="Title 1">
+            <a:extLst>
+              <a:ext uri="{FF2B5EF4-FFF2-40B4-BE49-F238E27FC236}">
+                <a16:creationId xmlns:a16="http://schemas.microsoft.com/office/drawing/2014/main" id="{ED95135E-4283-4599-B850-F011CF9B7C74}"/>
+              </a:ext>
+            </a:extLst>
+          </p:cNvPr>
+          <p:cNvSpPr>
+            <a:spLocks noGrp="1"/>
+          </p:cNvSpPr>
+          <p:nvPr>
+            <p:ph type="title"/>
+          </p:nvPr>
+        </p:nvSpPr>
+        <p:spPr>
+          <a:xfrm>
+            <a:off x="497711" y="336771"/>
+            <a:ext cx="7886700" cy="780398"/>
+          </a:xfrm>
+        </p:spPr>
+        <p:txBody>
+          <a:bodyPr>
+            <a:normAutofit/>
+          </a:bodyPr>
+          <a:lstStyle/>
+          <a:p>
+            <a:r>
+              <a:rPr lang="en-US" sz="2200" dirty="0">
+                <a:solidFill>
+                  <a:schemeClr val="tx1">
+                    <a:lumMod val="65000"/>
+                    <a:lumOff val="35000"/>
+                  </a:schemeClr>
+                </a:solidFill>
+              </a:rPr>
+              <a:t>Appendix:  References</a:t>
+            </a:r>
+          </a:p>
+        </p:txBody>
+      </p:sp>
+      <p:pic>
+        <p:nvPicPr>
+          <p:cNvPr id="5" name="Picture 4" descr="A close up of a sign&#10;&#10;Description automatically generated">
+            <a:extLst>
+              <a:ext uri="{FF2B5EF4-FFF2-40B4-BE49-F238E27FC236}">
+                <a16:creationId xmlns:a16="http://schemas.microsoft.com/office/drawing/2014/main" id="{F9271491-99A6-4D00-B738-0E34E6686EFF}"/>
+              </a:ext>
+            </a:extLst>
+          </p:cNvPr>
+          <p:cNvPicPr>
+            <a:picLocks noChangeAspect="1"/>
+          </p:cNvPicPr>
+          <p:nvPr/>
+        </p:nvPicPr>
+        <p:blipFill>
+          <a:blip r:embed="rId2">
+            <a:extLst>
+              <a:ext uri="{28A0092B-C50C-407E-A947-70E740481C1C}">
+                <a14:useLocalDpi xmlns:a14="http://schemas.microsoft.com/office/drawing/2010/main" val="0"/>
+              </a:ext>
+            </a:extLst>
+          </a:blip>
+          <a:stretch>
+            <a:fillRect/>
+          </a:stretch>
+        </p:blipFill>
+        <p:spPr>
+          <a:xfrm>
+            <a:off x="7492438" y="6106511"/>
+            <a:ext cx="1153851" cy="414718"/>
+          </a:xfrm>
+          <a:prstGeom prst="rect">
+            <a:avLst/>
+          </a:prstGeom>
+        </p:spPr>
+      </p:pic>
+      <p:cxnSp>
+        <p:nvCxnSpPr>
+          <p:cNvPr id="7" name="Straight Connector 6">
+            <a:extLst>
+              <a:ext uri="{FF2B5EF4-FFF2-40B4-BE49-F238E27FC236}">
+                <a16:creationId xmlns:a16="http://schemas.microsoft.com/office/drawing/2014/main" id="{754C5E05-D462-4273-82D1-C656D562E12C}"/>
+              </a:ext>
+            </a:extLst>
+          </p:cNvPr>
+          <p:cNvCxnSpPr>
+            <a:cxnSpLocks/>
+          </p:cNvCxnSpPr>
+          <p:nvPr/>
+        </p:nvCxnSpPr>
+        <p:spPr>
+          <a:xfrm>
+            <a:off x="574876" y="945266"/>
+            <a:ext cx="8071413" cy="0"/>
+          </a:xfrm>
+          <a:prstGeom prst="line">
+            <a:avLst/>
+          </a:prstGeom>
+          <a:ln>
+            <a:solidFill>
+              <a:schemeClr val="bg2">
+                <a:lumMod val="75000"/>
+              </a:schemeClr>
+            </a:solidFill>
+          </a:ln>
+        </p:spPr>
+        <p:style>
+          <a:lnRef idx="1">
+            <a:schemeClr val="accent6"/>
+          </a:lnRef>
+          <a:fillRef idx="0">
+            <a:schemeClr val="accent6"/>
+          </a:fillRef>
+          <a:effectRef idx="0">
+            <a:schemeClr val="accent6"/>
+          </a:effectRef>
+          <a:fontRef idx="minor">
+            <a:schemeClr val="tx1"/>
+          </a:fontRef>
+        </p:style>
+      </p:cxnSp>
+      <p:sp>
+        <p:nvSpPr>
+          <p:cNvPr id="3" name="Rectangle 2">
+            <a:extLst>
+              <a:ext uri="{FF2B5EF4-FFF2-40B4-BE49-F238E27FC236}">
+                <a16:creationId xmlns:a16="http://schemas.microsoft.com/office/drawing/2014/main" id="{6337412A-3C1B-4CB0-9026-C0FA00BC1378}"/>
+              </a:ext>
+            </a:extLst>
+          </p:cNvPr>
+          <p:cNvSpPr/>
+          <p:nvPr/>
+        </p:nvSpPr>
+        <p:spPr>
+          <a:xfrm>
+            <a:off x="497711" y="1184613"/>
+            <a:ext cx="6212990" cy="6340197"/>
+          </a:xfrm>
+          <a:prstGeom prst="rect">
+            <a:avLst/>
+          </a:prstGeom>
+        </p:spPr>
+        <p:txBody>
+          <a:bodyPr wrap="square">
+            <a:spAutoFit/>
+          </a:bodyPr>
+          <a:lstStyle/>
+          <a:p>
+            <a:r>
+              <a:rPr lang="en-US" sz="1400" dirty="0"/>
+              <a:t>MarketWatch Article</a:t>
+            </a:r>
+            <a:br>
+              <a:rPr lang="en-US" sz="1400" dirty="0"/>
+            </a:br>
+            <a:r>
+              <a:rPr lang="en-US" sz="1400" dirty="0">
+                <a:hlinkClick r:id="rId3"/>
+              </a:rPr>
+              <a:t>https://www.marketwatch.com/story/anheuser-busch-plans-to-buy-out-craft-brew-alliance-for-large-premium-2019-11-11</a:t>
+            </a:r>
+            <a:endParaRPr lang="en-US" sz="1400" dirty="0"/>
+          </a:p>
+          <a:p>
+            <a:br>
+              <a:rPr lang="en-US" sz="1400" dirty="0"/>
+            </a:br>
+            <a:r>
+              <a:rPr lang="en-US" sz="1400" dirty="0"/>
+              <a:t>Budweiser Logo</a:t>
+            </a:r>
+            <a:br>
+              <a:rPr lang="en-US" sz="1400" dirty="0"/>
+            </a:br>
+            <a:r>
+              <a:rPr lang="en-US" sz="1400" dirty="0">
+                <a:hlinkClick r:id="rId4"/>
+              </a:rPr>
+              <a:t>https://www.anheuser-busch.com/beers.html</a:t>
+            </a:r>
+            <a:endParaRPr lang="en-US" sz="1400" dirty="0"/>
+          </a:p>
+          <a:p>
+            <a:endParaRPr lang="en-US" sz="1400" dirty="0"/>
+          </a:p>
+          <a:p>
+            <a:r>
+              <a:rPr lang="en-US" sz="1400" dirty="0"/>
+              <a:t>Budweiser Image – Slide 1</a:t>
+            </a:r>
+            <a:br>
+              <a:rPr lang="en-US" sz="1400" dirty="0"/>
+            </a:br>
+            <a:r>
+              <a:rPr lang="en-US" sz="1400" dirty="0">
+                <a:hlinkClick r:id="rId5"/>
+              </a:rPr>
+              <a:t>https://si.wsj.net/public/resources/images/BN-TL780_2kRu4_OR_20170516101058.jpg?width=620&amp;height=413</a:t>
+            </a:r>
+            <a:endParaRPr lang="en-US" sz="1400" dirty="0"/>
+          </a:p>
+          <a:p>
+            <a:endParaRPr lang="en-US" sz="1400" dirty="0"/>
+          </a:p>
+          <a:p>
+            <a:r>
+              <a:rPr lang="en-US" sz="1400" dirty="0"/>
+              <a:t>Budweiser Image – Slide 19</a:t>
+            </a:r>
+            <a:br>
+              <a:rPr lang="en-US" sz="1400" dirty="0"/>
+            </a:br>
+            <a:r>
+              <a:rPr lang="en-US" sz="1400" dirty="0">
+                <a:hlinkClick r:id="rId6"/>
+              </a:rPr>
+              <a:t>https://i.pinimg.com/474x/f4/cd/7c/f4cd7c82c85fc46dc9a403af77e1289e--patio-the-photo.jpg</a:t>
+            </a:r>
+            <a:endParaRPr lang="en-US" sz="1400" dirty="0"/>
+          </a:p>
+          <a:p>
+            <a:endParaRPr lang="en-US" sz="1400" dirty="0"/>
+          </a:p>
+          <a:p>
+            <a:r>
+              <a:rPr lang="en-US" sz="1400" dirty="0"/>
+              <a:t>Data</a:t>
+            </a:r>
+            <a:br>
+              <a:rPr lang="en-US" sz="1400" dirty="0"/>
+            </a:br>
+            <a:r>
+              <a:rPr lang="en-US" sz="1400" dirty="0"/>
+              <a:t>-Beers.csv</a:t>
+            </a:r>
+            <a:br>
+              <a:rPr lang="en-US" sz="1400" dirty="0"/>
+            </a:br>
+            <a:r>
+              <a:rPr lang="en-US" sz="1400" dirty="0"/>
+              <a:t>-Breweries.csv</a:t>
+            </a:r>
+            <a:br>
+              <a:rPr lang="en-US" sz="1400" dirty="0"/>
+            </a:br>
+            <a:r>
+              <a:rPr lang="en-US" sz="1400" dirty="0"/>
+              <a:t>-cities.csv</a:t>
+            </a:r>
+          </a:p>
+          <a:p>
+            <a:r>
+              <a:rPr lang="en-US" sz="1400" dirty="0"/>
+              <a:t>-Census API: </a:t>
+            </a:r>
+            <a:r>
+              <a:rPr lang="en-US" sz="1200" dirty="0"/>
+              <a:t> </a:t>
+            </a:r>
+            <a:r>
+              <a:rPr lang="en-US" sz="1200" dirty="0">
+                <a:hlinkClick r:id="rId7"/>
+              </a:rPr>
+              <a:t>https://www.census.gov/data/developers/data-sets.html</a:t>
+            </a:r>
+            <a:br>
+              <a:rPr lang="en-US" dirty="0"/>
+            </a:br>
+            <a:endParaRPr lang="en-US" dirty="0"/>
+          </a:p>
+          <a:p>
+            <a:endParaRPr lang="en-US" dirty="0"/>
+          </a:p>
+          <a:p>
+            <a:endParaRPr lang="en-US" dirty="0"/>
+          </a:p>
+          <a:p>
+            <a:endParaRPr lang="en-US" dirty="0"/>
+          </a:p>
+          <a:p>
+            <a:endParaRPr lang="en-US" dirty="0"/>
+          </a:p>
+          <a:p>
+            <a:endParaRPr lang="en-US" dirty="0"/>
+          </a:p>
+          <a:p>
+            <a:endParaRPr lang="en-US" dirty="0"/>
+          </a:p>
+        </p:txBody>
+      </p:sp>
+    </p:spTree>
+    <p:extLst>
+      <p:ext uri="{BB962C8B-B14F-4D97-AF65-F5344CB8AC3E}">
+        <p14:creationId xmlns:p14="http://schemas.microsoft.com/office/powerpoint/2010/main" val="3661112003"/>
+      </p:ext>
+    </p:extLst>
+  </p:cSld>
+  <p:clrMapOvr>
+    <a:masterClrMapping/>
+  </p:clrMapOvr>
+</p:sld>
+</file>
+
+<file path=ppt/slides/slide3.xml><?xml version="1.0" encoding="utf-8"?>
+<p:sld xmlns:a="http://schemas.openxmlformats.org/drawingml/2006/main" xmlns:r="http://schemas.openxmlformats.org/officeDocument/2006/relationships" xmlns:p="http://schemas.openxmlformats.org/presentationml/2006/main">
+  <p:cSld>
+    <p:spTree>
+      <p:nvGrpSpPr>
+        <p:cNvPr id="1" name=""/>
+        <p:cNvGrpSpPr/>
+        <p:nvPr/>
+      </p:nvGrpSpPr>
+      <p:grpSpPr>
+        <a:xfrm>
+          <a:off x="0" y="0"/>
+          <a:ext cx="0" cy="0"/>
+          <a:chOff x="0" y="0"/>
+          <a:chExt cx="0" cy="0"/>
+        </a:xfrm>
+      </p:grpSpPr>
+      <p:sp>
+        <p:nvSpPr>
+          <p:cNvPr id="2" name="Title 1">
+            <a:extLst>
+              <a:ext uri="{FF2B5EF4-FFF2-40B4-BE49-F238E27FC236}">
+                <a16:creationId xmlns:a16="http://schemas.microsoft.com/office/drawing/2014/main" id="{ED95135E-4283-4599-B850-F011CF9B7C74}"/>
+              </a:ext>
+            </a:extLst>
+          </p:cNvPr>
+          <p:cNvSpPr>
+            <a:spLocks noGrp="1"/>
+          </p:cNvSpPr>
+          <p:nvPr>
+            <p:ph type="title"/>
+          </p:nvPr>
+        </p:nvSpPr>
+        <p:spPr>
+          <a:xfrm>
+            <a:off x="497711" y="336771"/>
+            <a:ext cx="7886700" cy="780398"/>
+          </a:xfrm>
+        </p:spPr>
+        <p:txBody>
+          <a:bodyPr>
+            <a:normAutofit/>
+          </a:bodyPr>
+          <a:lstStyle/>
+          <a:p>
+            <a:r>
+              <a:rPr lang="en-US" sz="2800" dirty="0">
+                <a:solidFill>
+                  <a:schemeClr val="tx1">
+                    <a:lumMod val="65000"/>
+                    <a:lumOff val="35000"/>
+                  </a:schemeClr>
+                </a:solidFill>
+              </a:rPr>
               <a:t>Introduction</a:t>
             </a:r>
           </a:p>
@@ -6001,7 +6825,7 @@
 </p:sld>
 </file>
 
-<file path=ppt/slides/slide3.xml><?xml version="1.0" encoding="utf-8"?>
+<file path=ppt/slides/slide4.xml><?xml version="1.0" encoding="utf-8"?>
 <p:sld xmlns:a="http://schemas.openxmlformats.org/drawingml/2006/main" xmlns:r="http://schemas.openxmlformats.org/officeDocument/2006/relationships" xmlns:p="http://schemas.openxmlformats.org/presentationml/2006/main">
   <p:cSld>
     <p:spTree>
@@ -6338,257 +7162,6 @@
     <p:extLst>
       <p:ext uri="{BB962C8B-B14F-4D97-AF65-F5344CB8AC3E}">
         <p14:creationId xmlns:p14="http://schemas.microsoft.com/office/powerpoint/2010/main" val="3248181659"/>
-      </p:ext>
-    </p:extLst>
-  </p:cSld>
-  <p:clrMapOvr>
-    <a:masterClrMapping/>
-  </p:clrMapOvr>
-</p:sld>
-</file>
-
-<file path=ppt/slides/slide4.xml><?xml version="1.0" encoding="utf-8"?>
-<p:sld xmlns:a="http://schemas.openxmlformats.org/drawingml/2006/main" xmlns:r="http://schemas.openxmlformats.org/officeDocument/2006/relationships" xmlns:p="http://schemas.openxmlformats.org/presentationml/2006/main">
-  <p:cSld>
-    <p:spTree>
-      <p:nvGrpSpPr>
-        <p:cNvPr id="1" name=""/>
-        <p:cNvGrpSpPr/>
-        <p:nvPr/>
-      </p:nvGrpSpPr>
-      <p:grpSpPr>
-        <a:xfrm>
-          <a:off x="0" y="0"/>
-          <a:ext cx="0" cy="0"/>
-          <a:chOff x="0" y="0"/>
-          <a:chExt cx="0" cy="0"/>
-        </a:xfrm>
-      </p:grpSpPr>
-      <p:sp>
-        <p:nvSpPr>
-          <p:cNvPr id="2" name="Title 1">
-            <a:extLst>
-              <a:ext uri="{FF2B5EF4-FFF2-40B4-BE49-F238E27FC236}">
-                <a16:creationId xmlns:a16="http://schemas.microsoft.com/office/drawing/2014/main" id="{ED95135E-4283-4599-B850-F011CF9B7C74}"/>
-              </a:ext>
-            </a:extLst>
-          </p:cNvPr>
-          <p:cNvSpPr>
-            <a:spLocks noGrp="1"/>
-          </p:cNvSpPr>
-          <p:nvPr>
-            <p:ph type="title"/>
-          </p:nvPr>
-        </p:nvSpPr>
-        <p:spPr>
-          <a:xfrm>
-            <a:off x="497711" y="336771"/>
-            <a:ext cx="7886700" cy="780398"/>
-          </a:xfrm>
-        </p:spPr>
-        <p:txBody>
-          <a:bodyPr>
-            <a:normAutofit/>
-          </a:bodyPr>
-          <a:lstStyle/>
-          <a:p>
-            <a:r>
-              <a:rPr lang="en-US" sz="2800" dirty="0">
-                <a:solidFill>
-                  <a:schemeClr val="tx1">
-                    <a:lumMod val="65000"/>
-                    <a:lumOff val="35000"/>
-                  </a:schemeClr>
-                </a:solidFill>
-              </a:rPr>
-              <a:t>How many craft breweries are in each state?</a:t>
-            </a:r>
-          </a:p>
-        </p:txBody>
-      </p:sp>
-      <p:sp>
-        <p:nvSpPr>
-          <p:cNvPr id="3" name="Content Placeholder 2">
-            <a:extLst>
-              <a:ext uri="{FF2B5EF4-FFF2-40B4-BE49-F238E27FC236}">
-                <a16:creationId xmlns:a16="http://schemas.microsoft.com/office/drawing/2014/main" id="{2DD55975-366F-4C51-B7D6-EEAFD411A8C3}"/>
-              </a:ext>
-            </a:extLst>
-          </p:cNvPr>
-          <p:cNvSpPr>
-            <a:spLocks noGrp="1"/>
-          </p:cNvSpPr>
-          <p:nvPr>
-            <p:ph idx="1"/>
-          </p:nvPr>
-        </p:nvSpPr>
-        <p:spPr>
-          <a:xfrm>
-            <a:off x="574876" y="1162010"/>
-            <a:ext cx="7886700" cy="4351338"/>
-          </a:xfrm>
-        </p:spPr>
-        <p:txBody>
-          <a:bodyPr/>
-          <a:lstStyle/>
-          <a:p>
-            <a:pPr marL="0" indent="0">
-              <a:spcAft>
-                <a:spcPts val="600"/>
-              </a:spcAft>
-              <a:buNone/>
-            </a:pPr>
-            <a:endParaRPr lang="en-US" sz="1600" dirty="0"/>
-          </a:p>
-          <a:p>
-            <a:pPr marL="0" indent="0">
-              <a:buNone/>
-            </a:pPr>
-            <a:endParaRPr lang="en-US" sz="1600" dirty="0"/>
-          </a:p>
-          <a:p>
-            <a:endParaRPr lang="en-US" sz="1600" dirty="0"/>
-          </a:p>
-          <a:p>
-            <a:pPr marL="0" indent="0">
-              <a:buNone/>
-            </a:pPr>
-            <a:endParaRPr lang="en-US" dirty="0"/>
-          </a:p>
-        </p:txBody>
-      </p:sp>
-      <p:pic>
-        <p:nvPicPr>
-          <p:cNvPr id="5" name="Picture 4" descr="A close up of a sign&#10;&#10;Description automatically generated">
-            <a:extLst>
-              <a:ext uri="{FF2B5EF4-FFF2-40B4-BE49-F238E27FC236}">
-                <a16:creationId xmlns:a16="http://schemas.microsoft.com/office/drawing/2014/main" id="{F9271491-99A6-4D00-B738-0E34E6686EFF}"/>
-              </a:ext>
-            </a:extLst>
-          </p:cNvPr>
-          <p:cNvPicPr>
-            <a:picLocks noChangeAspect="1"/>
-          </p:cNvPicPr>
-          <p:nvPr/>
-        </p:nvPicPr>
-        <p:blipFill>
-          <a:blip r:embed="rId2">
-            <a:extLst>
-              <a:ext uri="{28A0092B-C50C-407E-A947-70E740481C1C}">
-                <a14:useLocalDpi xmlns:a14="http://schemas.microsoft.com/office/drawing/2010/main" val="0"/>
-              </a:ext>
-            </a:extLst>
-          </a:blip>
-          <a:stretch>
-            <a:fillRect/>
-          </a:stretch>
-        </p:blipFill>
-        <p:spPr>
-          <a:xfrm>
-            <a:off x="7492438" y="6106511"/>
-            <a:ext cx="1153851" cy="414718"/>
-          </a:xfrm>
-          <a:prstGeom prst="rect">
-            <a:avLst/>
-          </a:prstGeom>
-        </p:spPr>
-      </p:pic>
-      <p:cxnSp>
-        <p:nvCxnSpPr>
-          <p:cNvPr id="7" name="Straight Connector 6">
-            <a:extLst>
-              <a:ext uri="{FF2B5EF4-FFF2-40B4-BE49-F238E27FC236}">
-                <a16:creationId xmlns:a16="http://schemas.microsoft.com/office/drawing/2014/main" id="{754C5E05-D462-4273-82D1-C656D562E12C}"/>
-              </a:ext>
-            </a:extLst>
-          </p:cNvPr>
-          <p:cNvCxnSpPr>
-            <a:cxnSpLocks/>
-          </p:cNvCxnSpPr>
-          <p:nvPr/>
-        </p:nvCxnSpPr>
-        <p:spPr>
-          <a:xfrm>
-            <a:off x="574876" y="945266"/>
-            <a:ext cx="8071413" cy="0"/>
-          </a:xfrm>
-          <a:prstGeom prst="line">
-            <a:avLst/>
-          </a:prstGeom>
-          <a:ln>
-            <a:solidFill>
-              <a:schemeClr val="bg2">
-                <a:lumMod val="75000"/>
-              </a:schemeClr>
-            </a:solidFill>
-          </a:ln>
-        </p:spPr>
-        <p:style>
-          <a:lnRef idx="1">
-            <a:schemeClr val="accent6"/>
-          </a:lnRef>
-          <a:fillRef idx="0">
-            <a:schemeClr val="accent6"/>
-          </a:fillRef>
-          <a:effectRef idx="0">
-            <a:schemeClr val="accent6"/>
-          </a:effectRef>
-          <a:fontRef idx="minor">
-            <a:schemeClr val="tx1"/>
-          </a:fontRef>
-        </p:style>
-      </p:cxnSp>
-      <p:pic>
-        <p:nvPicPr>
-          <p:cNvPr id="4" name="Picture 2">
-            <a:extLst>
-              <a:ext uri="{FF2B5EF4-FFF2-40B4-BE49-F238E27FC236}">
-                <a16:creationId xmlns:a16="http://schemas.microsoft.com/office/drawing/2014/main" id="{07470C0E-E377-406E-8F63-B5267F5F5B3A}"/>
-              </a:ext>
-            </a:extLst>
-          </p:cNvPr>
-          <p:cNvPicPr>
-            <a:picLocks noChangeAspect="1" noChangeArrowheads="1"/>
-          </p:cNvPicPr>
-          <p:nvPr/>
-        </p:nvPicPr>
-        <p:blipFill>
-          <a:blip r:embed="rId3">
-            <a:extLst>
-              <a:ext uri="{28A0092B-C50C-407E-A947-70E740481C1C}">
-                <a14:useLocalDpi xmlns:a14="http://schemas.microsoft.com/office/drawing/2010/main" val="0"/>
-              </a:ext>
-            </a:extLst>
-          </a:blip>
-          <a:srcRect/>
-          <a:stretch>
-            <a:fillRect/>
-          </a:stretch>
-        </p:blipFill>
-        <p:spPr bwMode="auto">
-          <a:xfrm>
-            <a:off x="470590" y="1010306"/>
-            <a:ext cx="6814633" cy="5451707"/>
-          </a:xfrm>
-          <a:prstGeom prst="rect">
-            <a:avLst/>
-          </a:prstGeom>
-          <a:noFill/>
-          <a:extLst>
-            <a:ext uri="{909E8E84-426E-40DD-AFC4-6F175D3DCCD1}">
-              <a14:hiddenFill xmlns:a14="http://schemas.microsoft.com/office/drawing/2010/main">
-                <a:solidFill>
-                  <a:srgbClr val="FFFFFF"/>
-                </a:solidFill>
-              </a14:hiddenFill>
-            </a:ext>
-          </a:extLst>
-        </p:spPr>
-      </p:pic>
-    </p:spTree>
-    <p:extLst>
-      <p:ext uri="{BB962C8B-B14F-4D97-AF65-F5344CB8AC3E}">
-        <p14:creationId xmlns:p14="http://schemas.microsoft.com/office/powerpoint/2010/main" val="70452358"/>
       </p:ext>
     </p:extLst>
   </p:cSld>
@@ -6615,48 +7188,6 @@
           <a:chExt cx="0" cy="0"/>
         </a:xfrm>
       </p:grpSpPr>
-      <p:pic>
-        <p:nvPicPr>
-          <p:cNvPr id="9" name="Content Placeholder 8">
-            <a:extLst>
-              <a:ext uri="{FF2B5EF4-FFF2-40B4-BE49-F238E27FC236}">
-                <a16:creationId xmlns:a16="http://schemas.microsoft.com/office/drawing/2014/main" id="{794B8CDC-AE8C-4BC6-948A-BECA47456308}"/>
-              </a:ext>
-            </a:extLst>
-          </p:cNvPr>
-          <p:cNvPicPr>
-            <a:picLocks noGrp="1" noChangeAspect="1"/>
-          </p:cNvPicPr>
-          <p:nvPr>
-            <p:ph idx="1"/>
-          </p:nvPr>
-        </p:nvPicPr>
-        <p:blipFill>
-          <a:blip r:embed="rId2">
-            <a:extLst>
-              <a:ext uri="{28A0092B-C50C-407E-A947-70E740481C1C}">
-                <a14:useLocalDpi xmlns:a14="http://schemas.microsoft.com/office/drawing/2010/main" val="0"/>
-              </a:ext>
-            </a:extLst>
-          </a:blip>
-          <a:stretch>
-            <a:fillRect/>
-          </a:stretch>
-        </p:blipFill>
-        <p:spPr>
-          <a:xfrm>
-            <a:off x="574876" y="1691036"/>
-            <a:ext cx="8473475" cy="4571864"/>
-          </a:xfrm>
-          <a:ln>
-            <a:solidFill>
-              <a:schemeClr val="bg1">
-                <a:lumMod val="75000"/>
-              </a:schemeClr>
-            </a:solidFill>
-          </a:ln>
-        </p:spPr>
-      </p:pic>
       <p:sp>
         <p:nvSpPr>
           <p:cNvPr id="2" name="Title 1">
@@ -6694,8 +7225,59 @@
                   </a:schemeClr>
                 </a:solidFill>
               </a:rPr>
-              <a:t>What is the median ABV and IBU in each state?</a:t>
-            </a:r>
+              <a:t>How many craft breweries are in each state?</a:t>
+            </a:r>
+          </a:p>
+        </p:txBody>
+      </p:sp>
+      <p:sp>
+        <p:nvSpPr>
+          <p:cNvPr id="3" name="Content Placeholder 2">
+            <a:extLst>
+              <a:ext uri="{FF2B5EF4-FFF2-40B4-BE49-F238E27FC236}">
+                <a16:creationId xmlns:a16="http://schemas.microsoft.com/office/drawing/2014/main" id="{2DD55975-366F-4C51-B7D6-EEAFD411A8C3}"/>
+              </a:ext>
+            </a:extLst>
+          </p:cNvPr>
+          <p:cNvSpPr>
+            <a:spLocks noGrp="1"/>
+          </p:cNvSpPr>
+          <p:nvPr>
+            <p:ph idx="1"/>
+          </p:nvPr>
+        </p:nvSpPr>
+        <p:spPr>
+          <a:xfrm>
+            <a:off x="574876" y="1162010"/>
+            <a:ext cx="7886700" cy="4351338"/>
+          </a:xfrm>
+        </p:spPr>
+        <p:txBody>
+          <a:bodyPr/>
+          <a:lstStyle/>
+          <a:p>
+            <a:pPr marL="0" indent="0">
+              <a:spcAft>
+                <a:spcPts val="600"/>
+              </a:spcAft>
+              <a:buNone/>
+            </a:pPr>
+            <a:endParaRPr lang="en-US" sz="1600" dirty="0"/>
+          </a:p>
+          <a:p>
+            <a:pPr marL="0" indent="0">
+              <a:buNone/>
+            </a:pPr>
+            <a:endParaRPr lang="en-US" sz="1600" dirty="0"/>
+          </a:p>
+          <a:p>
+            <a:endParaRPr lang="en-US" sz="1600" dirty="0"/>
+          </a:p>
+          <a:p>
+            <a:pPr marL="0" indent="0">
+              <a:buNone/>
+            </a:pPr>
+            <a:endParaRPr lang="en-US" dirty="0"/>
           </a:p>
         </p:txBody>
       </p:sp>
@@ -6714,7 +7296,7 @@
           <p:nvPr/>
         </p:nvPicPr>
         <p:blipFill>
-          <a:blip r:embed="rId3">
+          <a:blip r:embed="rId2">
             <a:extLst>
               <a:ext uri="{28A0092B-C50C-407E-A947-70E740481C1C}">
                 <a14:useLocalDpi xmlns:a14="http://schemas.microsoft.com/office/drawing/2010/main" val="0"/>
@@ -6780,233 +7362,57 @@
           </a:fontRef>
         </p:style>
       </p:cxnSp>
-      <p:sp>
-        <p:nvSpPr>
-          <p:cNvPr id="6" name="TextBox 5">
-            <a:extLst>
-              <a:ext uri="{FF2B5EF4-FFF2-40B4-BE49-F238E27FC236}">
-                <a16:creationId xmlns:a16="http://schemas.microsoft.com/office/drawing/2014/main" id="{A8067DA2-C7F8-448C-B049-E6571E083E41}"/>
-              </a:ext>
-            </a:extLst>
-          </p:cNvPr>
-          <p:cNvSpPr txBox="1"/>
+      <p:pic>
+        <p:nvPicPr>
+          <p:cNvPr id="4" name="Picture 2">
+            <a:extLst>
+              <a:ext uri="{FF2B5EF4-FFF2-40B4-BE49-F238E27FC236}">
+                <a16:creationId xmlns:a16="http://schemas.microsoft.com/office/drawing/2014/main" id="{07470C0E-E377-406E-8F63-B5267F5F5B3A}"/>
+              </a:ext>
+            </a:extLst>
+          </p:cNvPr>
+          <p:cNvPicPr>
+            <a:picLocks noChangeAspect="1" noChangeArrowheads="1"/>
+          </p:cNvPicPr>
           <p:nvPr/>
-        </p:nvSpPr>
-        <p:spPr>
-          <a:xfrm>
-            <a:off x="497711" y="1030542"/>
-            <a:ext cx="8290476" cy="523220"/>
+        </p:nvPicPr>
+        <p:blipFill>
+          <a:blip r:embed="rId3">
+            <a:extLst>
+              <a:ext uri="{28A0092B-C50C-407E-A947-70E740481C1C}">
+                <a14:useLocalDpi xmlns:a14="http://schemas.microsoft.com/office/drawing/2010/main" val="0"/>
+              </a:ext>
+            </a:extLst>
+          </a:blip>
+          <a:srcRect/>
+          <a:stretch>
+            <a:fillRect/>
+          </a:stretch>
+        </p:blipFill>
+        <p:spPr bwMode="auto">
+          <a:xfrm>
+            <a:off x="470590" y="1010306"/>
+            <a:ext cx="6814633" cy="5451707"/>
           </a:xfrm>
           <a:prstGeom prst="rect">
             <a:avLst/>
           </a:prstGeom>
-          <a:solidFill>
-            <a:schemeClr val="bg1">
-              <a:alpha val="93000"/>
-            </a:schemeClr>
-          </a:solidFill>
-        </p:spPr>
-        <p:txBody>
-          <a:bodyPr wrap="square" rtlCol="0">
-            <a:spAutoFit/>
-          </a:bodyPr>
-          <a:lstStyle/>
-          <a:p>
-            <a:r>
-              <a:rPr lang="en-US" sz="1400" dirty="0"/>
-              <a:t>Maine has the highest median ABV and IBU of all the states. Arkansas and Utah have the lowest median ABV, while Wisconsin has the lowest median IBU.</a:t>
-            </a:r>
-          </a:p>
-        </p:txBody>
-      </p:sp>
-      <p:sp>
-        <p:nvSpPr>
-          <p:cNvPr id="10" name="Arrow: Down 9">
-            <a:extLst>
-              <a:ext uri="{FF2B5EF4-FFF2-40B4-BE49-F238E27FC236}">
-                <a16:creationId xmlns:a16="http://schemas.microsoft.com/office/drawing/2014/main" id="{73D07171-F01C-45EF-9182-BF1FD5A11288}"/>
-              </a:ext>
-            </a:extLst>
-          </p:cNvPr>
-          <p:cNvSpPr/>
-          <p:nvPr/>
-        </p:nvSpPr>
-        <p:spPr>
-          <a:xfrm rot="2981259">
-            <a:off x="1329354" y="3194969"/>
-            <a:ext cx="114300" cy="258451"/>
-          </a:xfrm>
-          <a:prstGeom prst="downArrow">
-            <a:avLst/>
-          </a:prstGeom>
-        </p:spPr>
-        <p:style>
-          <a:lnRef idx="2">
-            <a:schemeClr val="accent1">
-              <a:shade val="50000"/>
-            </a:schemeClr>
-          </a:lnRef>
-          <a:fillRef idx="1">
-            <a:schemeClr val="accent1"/>
-          </a:fillRef>
-          <a:effectRef idx="0">
-            <a:schemeClr val="accent1"/>
-          </a:effectRef>
-          <a:fontRef idx="minor">
-            <a:schemeClr val="lt1"/>
-          </a:fontRef>
-        </p:style>
-        <p:txBody>
-          <a:bodyPr rtlCol="0" anchor="ctr"/>
-          <a:lstStyle/>
-          <a:p>
-            <a:pPr algn="ctr"/>
-            <a:endParaRPr lang="en-US"/>
-          </a:p>
-        </p:txBody>
-      </p:sp>
-      <p:sp>
-        <p:nvSpPr>
-          <p:cNvPr id="12" name="Arrow: Down 11">
-            <a:extLst>
-              <a:ext uri="{FF2B5EF4-FFF2-40B4-BE49-F238E27FC236}">
-                <a16:creationId xmlns:a16="http://schemas.microsoft.com/office/drawing/2014/main" id="{8A1B6696-B49B-4C88-A22F-5FA7BDA1EF34}"/>
-              </a:ext>
-            </a:extLst>
-          </p:cNvPr>
-          <p:cNvSpPr/>
-          <p:nvPr/>
-        </p:nvSpPr>
-        <p:spPr>
-          <a:xfrm rot="3444909">
-            <a:off x="3710780" y="1838134"/>
-            <a:ext cx="114300" cy="258451"/>
-          </a:xfrm>
-          <a:prstGeom prst="downArrow">
-            <a:avLst/>
-          </a:prstGeom>
-        </p:spPr>
-        <p:style>
-          <a:lnRef idx="2">
-            <a:schemeClr val="accent1">
-              <a:shade val="50000"/>
-            </a:schemeClr>
-          </a:lnRef>
-          <a:fillRef idx="1">
-            <a:schemeClr val="accent1"/>
-          </a:fillRef>
-          <a:effectRef idx="0">
-            <a:schemeClr val="accent1"/>
-          </a:effectRef>
-          <a:fontRef idx="minor">
-            <a:schemeClr val="lt1"/>
-          </a:fontRef>
-        </p:style>
-        <p:txBody>
-          <a:bodyPr rtlCol="0" anchor="ctr"/>
-          <a:lstStyle/>
-          <a:p>
-            <a:pPr algn="ctr"/>
-            <a:endParaRPr lang="en-US"/>
-          </a:p>
-        </p:txBody>
-      </p:sp>
-      <p:sp>
-        <p:nvSpPr>
-          <p:cNvPr id="11" name="Arrow: Down 10">
-            <a:extLst>
-              <a:ext uri="{FF2B5EF4-FFF2-40B4-BE49-F238E27FC236}">
-                <a16:creationId xmlns:a16="http://schemas.microsoft.com/office/drawing/2014/main" id="{BD06F93B-00AB-41F2-8FCD-A85F72387F5D}"/>
-              </a:ext>
-            </a:extLst>
-          </p:cNvPr>
-          <p:cNvSpPr/>
-          <p:nvPr/>
-        </p:nvSpPr>
-        <p:spPr>
-          <a:xfrm rot="18582522">
-            <a:off x="6026971" y="3271048"/>
-            <a:ext cx="114300" cy="258451"/>
-          </a:xfrm>
-          <a:prstGeom prst="downArrow">
-            <a:avLst/>
-          </a:prstGeom>
-        </p:spPr>
-        <p:style>
-          <a:lnRef idx="2">
-            <a:schemeClr val="accent1">
-              <a:shade val="50000"/>
-            </a:schemeClr>
-          </a:lnRef>
-          <a:fillRef idx="1">
-            <a:schemeClr val="accent1"/>
-          </a:fillRef>
-          <a:effectRef idx="0">
-            <a:schemeClr val="accent1"/>
-          </a:effectRef>
-          <a:fontRef idx="minor">
-            <a:schemeClr val="lt1"/>
-          </a:fontRef>
-        </p:style>
-        <p:txBody>
-          <a:bodyPr rtlCol="0" anchor="ctr"/>
-          <a:lstStyle/>
-          <a:p>
-            <a:pPr algn="ctr"/>
-            <a:endParaRPr lang="en-US"/>
-          </a:p>
-        </p:txBody>
-      </p:sp>
-      <p:sp>
-        <p:nvSpPr>
-          <p:cNvPr id="13" name="Arrow: Down 12">
-            <a:extLst>
-              <a:ext uri="{FF2B5EF4-FFF2-40B4-BE49-F238E27FC236}">
-                <a16:creationId xmlns:a16="http://schemas.microsoft.com/office/drawing/2014/main" id="{ECB1CC6F-DF53-433A-90C7-626F3658CB0F}"/>
-              </a:ext>
-            </a:extLst>
-          </p:cNvPr>
-          <p:cNvSpPr/>
-          <p:nvPr/>
-        </p:nvSpPr>
-        <p:spPr>
-          <a:xfrm rot="10800000">
-            <a:off x="6741786" y="6106511"/>
-            <a:ext cx="114300" cy="258451"/>
-          </a:xfrm>
-          <a:prstGeom prst="downArrow">
-            <a:avLst/>
-          </a:prstGeom>
-        </p:spPr>
-        <p:style>
-          <a:lnRef idx="2">
-            <a:schemeClr val="accent1">
-              <a:shade val="50000"/>
-            </a:schemeClr>
-          </a:lnRef>
-          <a:fillRef idx="1">
-            <a:schemeClr val="accent1"/>
-          </a:fillRef>
-          <a:effectRef idx="0">
-            <a:schemeClr val="accent1"/>
-          </a:effectRef>
-          <a:fontRef idx="minor">
-            <a:schemeClr val="lt1"/>
-          </a:fontRef>
-        </p:style>
-        <p:txBody>
-          <a:bodyPr rtlCol="0" anchor="ctr"/>
-          <a:lstStyle/>
-          <a:p>
-            <a:pPr algn="ctr"/>
-            <a:endParaRPr lang="en-US"/>
-          </a:p>
-        </p:txBody>
-      </p:sp>
+          <a:noFill/>
+          <a:extLst>
+            <a:ext uri="{909E8E84-426E-40DD-AFC4-6F175D3DCCD1}">
+              <a14:hiddenFill xmlns:a14="http://schemas.microsoft.com/office/drawing/2010/main">
+                <a:solidFill>
+                  <a:srgbClr val="FFFFFF"/>
+                </a:solidFill>
+              </a14:hiddenFill>
+            </a:ext>
+          </a:extLst>
+        </p:spPr>
+      </p:pic>
     </p:spTree>
     <p:extLst>
       <p:ext uri="{BB962C8B-B14F-4D97-AF65-F5344CB8AC3E}">
-        <p14:creationId xmlns:p14="http://schemas.microsoft.com/office/powerpoint/2010/main" val="3272948218"/>
+        <p14:creationId xmlns:p14="http://schemas.microsoft.com/office/powerpoint/2010/main" val="70452358"/>
       </p:ext>
     </p:extLst>
   </p:cSld>
@@ -7035,36 +7441,41 @@
       </p:grpSpPr>
       <p:pic>
         <p:nvPicPr>
-          <p:cNvPr id="3" name="Picture 2">
-            <a:extLst>
-              <a:ext uri="{FF2B5EF4-FFF2-40B4-BE49-F238E27FC236}">
-                <a16:creationId xmlns:a16="http://schemas.microsoft.com/office/drawing/2014/main" id="{803DEE8E-E5E5-4A87-8423-6DA5A1134B0C}"/>
+          <p:cNvPr id="9" name="Content Placeholder 8">
+            <a:extLst>
+              <a:ext uri="{FF2B5EF4-FFF2-40B4-BE49-F238E27FC236}">
+                <a16:creationId xmlns:a16="http://schemas.microsoft.com/office/drawing/2014/main" id="{794B8CDC-AE8C-4BC6-948A-BECA47456308}"/>
               </a:ext>
             </a:extLst>
           </p:cNvPr>
           <p:cNvPicPr>
-            <a:picLocks noChangeAspect="1"/>
+            <a:picLocks noGrp="1" noChangeAspect="1"/>
           </p:cNvPicPr>
-          <p:nvPr/>
+          <p:nvPr>
+            <p:ph idx="1"/>
+          </p:nvPr>
         </p:nvPicPr>
         <p:blipFill>
-          <a:blip r:embed="rId2"/>
+          <a:blip r:embed="rId2">
+            <a:extLst>
+              <a:ext uri="{28A0092B-C50C-407E-A947-70E740481C1C}">
+                <a14:useLocalDpi xmlns:a14="http://schemas.microsoft.com/office/drawing/2010/main" val="0"/>
+              </a:ext>
+            </a:extLst>
+          </a:blip>
           <a:stretch>
             <a:fillRect/>
           </a:stretch>
         </p:blipFill>
         <p:spPr>
           <a:xfrm>
-            <a:off x="574876" y="2457705"/>
-            <a:ext cx="7903937" cy="4001621"/>
-          </a:xfrm>
-          <a:prstGeom prst="rect">
-            <a:avLst/>
-          </a:prstGeom>
+            <a:off x="574876" y="1691036"/>
+            <a:ext cx="8473475" cy="4571864"/>
+          </a:xfrm>
           <a:ln>
             <a:solidFill>
               <a:schemeClr val="bg1">
-                <a:lumMod val="85000"/>
+                <a:lumMod val="75000"/>
               </a:schemeClr>
             </a:solidFill>
           </a:ln>
@@ -7088,8 +7499,8 @@
         </p:nvSpPr>
         <p:spPr>
           <a:xfrm>
-            <a:off x="552450" y="336771"/>
-            <a:ext cx="7777222" cy="780398"/>
+            <a:off x="497711" y="336771"/>
+            <a:ext cx="7886700" cy="780398"/>
           </a:xfrm>
         </p:spPr>
         <p:txBody>
@@ -7107,7 +7518,7 @@
                   </a:schemeClr>
                 </a:solidFill>
               </a:rPr>
-              <a:t>What states have the maximum ABV and IBU?</a:t>
+              <a:t>What is the median ABV and IBU in each state?</a:t>
             </a:r>
           </a:p>
         </p:txBody>
@@ -7198,7 +7609,7 @@
           <p:cNvPr id="6" name="TextBox 5">
             <a:extLst>
               <a:ext uri="{FF2B5EF4-FFF2-40B4-BE49-F238E27FC236}">
-                <a16:creationId xmlns:a16="http://schemas.microsoft.com/office/drawing/2014/main" id="{49B21544-ABD2-4231-B32F-C12E8438152C}"/>
+                <a16:creationId xmlns:a16="http://schemas.microsoft.com/office/drawing/2014/main" id="{A8067DA2-C7F8-448C-B049-E6571E083E41}"/>
               </a:ext>
             </a:extLst>
           </p:cNvPr>
@@ -7207,13 +7618,17 @@
         </p:nvSpPr>
         <p:spPr>
           <a:xfrm>
-            <a:off x="479083" y="973242"/>
-            <a:ext cx="8262997" cy="1323439"/>
+            <a:off x="497711" y="1030542"/>
+            <a:ext cx="8290476" cy="523220"/>
           </a:xfrm>
           <a:prstGeom prst="rect">
             <a:avLst/>
           </a:prstGeom>
-          <a:noFill/>
+          <a:solidFill>
+            <a:schemeClr val="bg1">
+              <a:alpha val="93000"/>
+            </a:schemeClr>
+          </a:solidFill>
         </p:spPr>
         <p:txBody>
           <a:bodyPr wrap="square" rtlCol="0">
@@ -7222,17 +7637,8 @@
           <a:lstStyle/>
           <a:p>
             <a:r>
-              <a:rPr lang="en-US" sz="1600" dirty="0"/>
-              <a:t>Kentucky has the highest ABV beer at 0.125, which is called ‘London Balling’,  made by Against the Grain Brewery, located in Louisville, KY.</a:t>
-            </a:r>
-          </a:p>
-          <a:p>
-            <a:endParaRPr lang="en-US" sz="1600" dirty="0"/>
-          </a:p>
-          <a:p>
-            <a:r>
-              <a:rPr lang="en-US" sz="1600" dirty="0"/>
-              <a:t>Oregon has the highest IBU beer at 138, which is called ‘Bitter Bitch Imperial IPA’, made by Astoria Brewing Company, located in Astoria, OR.</a:t>
+              <a:rPr lang="en-US" sz="1400" dirty="0"/>
+              <a:t>Maine has the highest median ABV and IBU of all the states. Arkansas and Utah have the lowest median ABV, while Wisconsin has the lowest median IBU.</a:t>
             </a:r>
           </a:p>
         </p:txBody>
@@ -7242,7 +7648,7 @@
           <p:cNvPr id="10" name="Arrow: Down 9">
             <a:extLst>
               <a:ext uri="{FF2B5EF4-FFF2-40B4-BE49-F238E27FC236}">
-                <a16:creationId xmlns:a16="http://schemas.microsoft.com/office/drawing/2014/main" id="{E77DAADB-29EE-4C62-96F6-649B18319293}"/>
+                <a16:creationId xmlns:a16="http://schemas.microsoft.com/office/drawing/2014/main" id="{73D07171-F01C-45EF-9182-BF1FD5A11288}"/>
               </a:ext>
             </a:extLst>
           </p:cNvPr>
@@ -7250,9 +7656,9 @@
           <p:nvPr/>
         </p:nvSpPr>
         <p:spPr>
-          <a:xfrm>
-            <a:off x="3105918" y="2515125"/>
-            <a:ext cx="97156" cy="152400"/>
+          <a:xfrm rot="2981259">
+            <a:off x="1329354" y="3194969"/>
+            <a:ext cx="114300" cy="258451"/>
           </a:xfrm>
           <a:prstGeom prst="downArrow">
             <a:avLst/>
@@ -7285,10 +7691,10 @@
       </p:sp>
       <p:sp>
         <p:nvSpPr>
-          <p:cNvPr id="11" name="Arrow: Down 10">
-            <a:extLst>
-              <a:ext uri="{FF2B5EF4-FFF2-40B4-BE49-F238E27FC236}">
-                <a16:creationId xmlns:a16="http://schemas.microsoft.com/office/drawing/2014/main" id="{BC974B24-0D4C-42D4-A8BF-824D7D751CA5}"/>
+          <p:cNvPr id="12" name="Arrow: Down 11">
+            <a:extLst>
+              <a:ext uri="{FF2B5EF4-FFF2-40B4-BE49-F238E27FC236}">
+                <a16:creationId xmlns:a16="http://schemas.microsoft.com/office/drawing/2014/main" id="{8A1B6696-B49B-4C88-A22F-5FA7BDA1EF34}"/>
               </a:ext>
             </a:extLst>
           </p:cNvPr>
@@ -7296,9 +7702,9 @@
           <p:nvPr/>
         </p:nvSpPr>
         <p:spPr>
-          <a:xfrm>
-            <a:off x="5746832" y="3203476"/>
-            <a:ext cx="97156" cy="265627"/>
+          <a:xfrm rot="3444909">
+            <a:off x="3710780" y="1838134"/>
+            <a:ext cx="114300" cy="258451"/>
           </a:xfrm>
           <a:prstGeom prst="downArrow">
             <a:avLst/>
@@ -7329,10 +7735,102 @@
           </a:p>
         </p:txBody>
       </p:sp>
+      <p:sp>
+        <p:nvSpPr>
+          <p:cNvPr id="11" name="Arrow: Down 10">
+            <a:extLst>
+              <a:ext uri="{FF2B5EF4-FFF2-40B4-BE49-F238E27FC236}">
+                <a16:creationId xmlns:a16="http://schemas.microsoft.com/office/drawing/2014/main" id="{BD06F93B-00AB-41F2-8FCD-A85F72387F5D}"/>
+              </a:ext>
+            </a:extLst>
+          </p:cNvPr>
+          <p:cNvSpPr/>
+          <p:nvPr/>
+        </p:nvSpPr>
+        <p:spPr>
+          <a:xfrm rot="18582522">
+            <a:off x="6026971" y="3271048"/>
+            <a:ext cx="114300" cy="258451"/>
+          </a:xfrm>
+          <a:prstGeom prst="downArrow">
+            <a:avLst/>
+          </a:prstGeom>
+        </p:spPr>
+        <p:style>
+          <a:lnRef idx="2">
+            <a:schemeClr val="accent1">
+              <a:shade val="50000"/>
+            </a:schemeClr>
+          </a:lnRef>
+          <a:fillRef idx="1">
+            <a:schemeClr val="accent1"/>
+          </a:fillRef>
+          <a:effectRef idx="0">
+            <a:schemeClr val="accent1"/>
+          </a:effectRef>
+          <a:fontRef idx="minor">
+            <a:schemeClr val="lt1"/>
+          </a:fontRef>
+        </p:style>
+        <p:txBody>
+          <a:bodyPr rtlCol="0" anchor="ctr"/>
+          <a:lstStyle/>
+          <a:p>
+            <a:pPr algn="ctr"/>
+            <a:endParaRPr lang="en-US"/>
+          </a:p>
+        </p:txBody>
+      </p:sp>
+      <p:sp>
+        <p:nvSpPr>
+          <p:cNvPr id="13" name="Arrow: Down 12">
+            <a:extLst>
+              <a:ext uri="{FF2B5EF4-FFF2-40B4-BE49-F238E27FC236}">
+                <a16:creationId xmlns:a16="http://schemas.microsoft.com/office/drawing/2014/main" id="{ECB1CC6F-DF53-433A-90C7-626F3658CB0F}"/>
+              </a:ext>
+            </a:extLst>
+          </p:cNvPr>
+          <p:cNvSpPr/>
+          <p:nvPr/>
+        </p:nvSpPr>
+        <p:spPr>
+          <a:xfrm rot="10800000">
+            <a:off x="6741786" y="6106511"/>
+            <a:ext cx="114300" cy="258451"/>
+          </a:xfrm>
+          <a:prstGeom prst="downArrow">
+            <a:avLst/>
+          </a:prstGeom>
+        </p:spPr>
+        <p:style>
+          <a:lnRef idx="2">
+            <a:schemeClr val="accent1">
+              <a:shade val="50000"/>
+            </a:schemeClr>
+          </a:lnRef>
+          <a:fillRef idx="1">
+            <a:schemeClr val="accent1"/>
+          </a:fillRef>
+          <a:effectRef idx="0">
+            <a:schemeClr val="accent1"/>
+          </a:effectRef>
+          <a:fontRef idx="minor">
+            <a:schemeClr val="lt1"/>
+          </a:fontRef>
+        </p:style>
+        <p:txBody>
+          <a:bodyPr rtlCol="0" anchor="ctr"/>
+          <a:lstStyle/>
+          <a:p>
+            <a:pPr algn="ctr"/>
+            <a:endParaRPr lang="en-US"/>
+          </a:p>
+        </p:txBody>
+      </p:sp>
     </p:spTree>
     <p:extLst>
       <p:ext uri="{BB962C8B-B14F-4D97-AF65-F5344CB8AC3E}">
-        <p14:creationId xmlns:p14="http://schemas.microsoft.com/office/powerpoint/2010/main" val="4080758490"/>
+        <p14:creationId xmlns:p14="http://schemas.microsoft.com/office/powerpoint/2010/main" val="3272948218"/>
       </p:ext>
     </p:extLst>
   </p:cSld>
@@ -7359,6 +7857,43 @@
           <a:chExt cx="0" cy="0"/>
         </a:xfrm>
       </p:grpSpPr>
+      <p:pic>
+        <p:nvPicPr>
+          <p:cNvPr id="3" name="Picture 2">
+            <a:extLst>
+              <a:ext uri="{FF2B5EF4-FFF2-40B4-BE49-F238E27FC236}">
+                <a16:creationId xmlns:a16="http://schemas.microsoft.com/office/drawing/2014/main" id="{803DEE8E-E5E5-4A87-8423-6DA5A1134B0C}"/>
+              </a:ext>
+            </a:extLst>
+          </p:cNvPr>
+          <p:cNvPicPr>
+            <a:picLocks noChangeAspect="1"/>
+          </p:cNvPicPr>
+          <p:nvPr/>
+        </p:nvPicPr>
+        <p:blipFill>
+          <a:blip r:embed="rId2"/>
+          <a:stretch>
+            <a:fillRect/>
+          </a:stretch>
+        </p:blipFill>
+        <p:spPr>
+          <a:xfrm>
+            <a:off x="574876" y="2457705"/>
+            <a:ext cx="7903937" cy="4001621"/>
+          </a:xfrm>
+          <a:prstGeom prst="rect">
+            <a:avLst/>
+          </a:prstGeom>
+          <a:ln>
+            <a:solidFill>
+              <a:schemeClr val="bg1">
+                <a:lumMod val="85000"/>
+              </a:schemeClr>
+            </a:solidFill>
+          </a:ln>
+        </p:spPr>
+      </p:pic>
       <p:sp>
         <p:nvSpPr>
           <p:cNvPr id="2" name="Title 1">
@@ -7377,13 +7912,13 @@
         </p:nvSpPr>
         <p:spPr>
           <a:xfrm>
-            <a:off x="497711" y="336771"/>
-            <a:ext cx="7886700" cy="780398"/>
+            <a:off x="552450" y="336771"/>
+            <a:ext cx="7777222" cy="780398"/>
           </a:xfrm>
         </p:spPr>
         <p:txBody>
           <a:bodyPr>
-            <a:normAutofit fontScale="90000"/>
+            <a:normAutofit/>
           </a:bodyPr>
           <a:lstStyle/>
           <a:p>
@@ -7396,11 +7931,47 @@
                   </a:schemeClr>
                 </a:solidFill>
               </a:rPr>
-              <a:t>What are the summary statistics and distribution of ABV?</a:t>
-            </a:r>
-          </a:p>
-        </p:txBody>
-      </p:sp>
+              <a:t>What states have the maximum ABV and IBU?</a:t>
+            </a:r>
+          </a:p>
+        </p:txBody>
+      </p:sp>
+      <p:pic>
+        <p:nvPicPr>
+          <p:cNvPr id="5" name="Picture 4" descr="A close up of a sign&#10;&#10;Description automatically generated">
+            <a:extLst>
+              <a:ext uri="{FF2B5EF4-FFF2-40B4-BE49-F238E27FC236}">
+                <a16:creationId xmlns:a16="http://schemas.microsoft.com/office/drawing/2014/main" id="{F9271491-99A6-4D00-B738-0E34E6686EFF}"/>
+              </a:ext>
+            </a:extLst>
+          </p:cNvPr>
+          <p:cNvPicPr>
+            <a:picLocks noChangeAspect="1"/>
+          </p:cNvPicPr>
+          <p:nvPr/>
+        </p:nvPicPr>
+        <p:blipFill>
+          <a:blip r:embed="rId3">
+            <a:extLst>
+              <a:ext uri="{28A0092B-C50C-407E-A947-70E740481C1C}">
+                <a14:useLocalDpi xmlns:a14="http://schemas.microsoft.com/office/drawing/2010/main" val="0"/>
+              </a:ext>
+            </a:extLst>
+          </a:blip>
+          <a:stretch>
+            <a:fillRect/>
+          </a:stretch>
+        </p:blipFill>
+        <p:spPr>
+          <a:xfrm>
+            <a:off x="7492438" y="6106511"/>
+            <a:ext cx="1153851" cy="414718"/>
+          </a:xfrm>
+          <a:prstGeom prst="rect">
+            <a:avLst/>
+          </a:prstGeom>
+        </p:spPr>
+      </p:pic>
       <p:cxnSp>
         <p:nvCxnSpPr>
           <p:cNvPr id="7" name="Straight Connector 6">
@@ -7446,41 +8017,12 @@
           </a:fontRef>
         </p:style>
       </p:cxnSp>
-      <p:pic>
-        <p:nvPicPr>
-          <p:cNvPr id="9" name="Picture 8">
-            <a:extLst>
-              <a:ext uri="{FF2B5EF4-FFF2-40B4-BE49-F238E27FC236}">
-                <a16:creationId xmlns:a16="http://schemas.microsoft.com/office/drawing/2014/main" id="{1D855B2C-13BC-44FF-8E12-8CAC142FA867}"/>
-              </a:ext>
-            </a:extLst>
-          </p:cNvPr>
-          <p:cNvPicPr>
-            <a:picLocks noChangeAspect="1"/>
-          </p:cNvPicPr>
-          <p:nvPr/>
-        </p:nvPicPr>
-        <p:blipFill rotWithShape="1">
-          <a:blip r:embed="rId2"/>
-          <a:srcRect t="4905" b="7276"/>
-          <a:stretch/>
-        </p:blipFill>
-        <p:spPr>
-          <a:xfrm>
-            <a:off x="574876" y="2170258"/>
-            <a:ext cx="5543550" cy="476793"/>
-          </a:xfrm>
-          <a:prstGeom prst="rect">
-            <a:avLst/>
-          </a:prstGeom>
-        </p:spPr>
-      </p:pic>
-      <p:sp>
-        <p:nvSpPr>
-          <p:cNvPr id="10" name="TextBox 9">
-            <a:extLst>
-              <a:ext uri="{FF2B5EF4-FFF2-40B4-BE49-F238E27FC236}">
-                <a16:creationId xmlns:a16="http://schemas.microsoft.com/office/drawing/2014/main" id="{0555177E-5254-4035-BECD-12641885622F}"/>
+      <p:sp>
+        <p:nvSpPr>
+          <p:cNvPr id="6" name="TextBox 5">
+            <a:extLst>
+              <a:ext uri="{FF2B5EF4-FFF2-40B4-BE49-F238E27FC236}">
+                <a16:creationId xmlns:a16="http://schemas.microsoft.com/office/drawing/2014/main" id="{49B21544-ABD2-4231-B32F-C12E8438152C}"/>
               </a:ext>
             </a:extLst>
           </p:cNvPr>
@@ -7489,8 +8031,8 @@
         </p:nvSpPr>
         <p:spPr>
           <a:xfrm>
-            <a:off x="493878" y="1073532"/>
-            <a:ext cx="8262997" cy="1200329"/>
+            <a:off x="479083" y="973242"/>
+            <a:ext cx="8262997" cy="1323439"/>
           </a:xfrm>
           <a:prstGeom prst="rect">
             <a:avLst/>
@@ -7504,148 +8046,117 @@
           <a:lstStyle/>
           <a:p>
             <a:r>
-              <a:rPr lang="en-US" dirty="0"/>
-              <a:t>Below are the summary statistics of ABV for craft beers.  This shows the minimum, maximum, median, and 1</a:t>
-            </a:r>
-            <a:r>
-              <a:rPr lang="en-US" baseline="30000" dirty="0"/>
-              <a:t>st</a:t>
-            </a:r>
-            <a:r>
-              <a:rPr lang="en-US" dirty="0"/>
-              <a:t> &amp; 3</a:t>
-            </a:r>
-            <a:r>
-              <a:rPr lang="en-US" baseline="30000" dirty="0"/>
-              <a:t>rd</a:t>
-            </a:r>
-            <a:r>
-              <a:rPr lang="en-US" dirty="0"/>
-              <a:t> quartiles of the data set.  There are 32 outliers of 0.096 and above.  </a:t>
-            </a:r>
-          </a:p>
-          <a:p>
-            <a:endParaRPr lang="en-US" dirty="0"/>
-          </a:p>
-        </p:txBody>
-      </p:sp>
-      <p:pic>
-        <p:nvPicPr>
-          <p:cNvPr id="2050" name="Picture 2">
-            <a:extLst>
-              <a:ext uri="{FF2B5EF4-FFF2-40B4-BE49-F238E27FC236}">
-                <a16:creationId xmlns:a16="http://schemas.microsoft.com/office/drawing/2014/main" id="{0F428284-41EC-46CF-BD07-ADFE5DADDC67}"/>
-              </a:ext>
-            </a:extLst>
-          </p:cNvPr>
-          <p:cNvPicPr>
-            <a:picLocks noChangeAspect="1" noChangeArrowheads="1"/>
-          </p:cNvPicPr>
+              <a:rPr lang="en-US" sz="1600" dirty="0"/>
+              <a:t>Kentucky has the highest ABV beer at 0.125, which is called ‘London Balling’,  made by Against the Grain Brewery, located in Louisville, KY.</a:t>
+            </a:r>
+          </a:p>
+          <a:p>
+            <a:endParaRPr lang="en-US" sz="1600" dirty="0"/>
+          </a:p>
+          <a:p>
+            <a:r>
+              <a:rPr lang="en-US" sz="1600" dirty="0"/>
+              <a:t>Oregon has the highest IBU beer at 138, which is called ‘Bitter Bitch Imperial IPA’, made by Astoria Brewing Company, located in Astoria, OR.</a:t>
+            </a:r>
+          </a:p>
+        </p:txBody>
+      </p:sp>
+      <p:sp>
+        <p:nvSpPr>
+          <p:cNvPr id="10" name="Arrow: Down 9">
+            <a:extLst>
+              <a:ext uri="{FF2B5EF4-FFF2-40B4-BE49-F238E27FC236}">
+                <a16:creationId xmlns:a16="http://schemas.microsoft.com/office/drawing/2014/main" id="{E77DAADB-29EE-4C62-96F6-649B18319293}"/>
+              </a:ext>
+            </a:extLst>
+          </p:cNvPr>
+          <p:cNvSpPr/>
           <p:nvPr/>
-        </p:nvPicPr>
-        <p:blipFill>
-          <a:blip r:embed="rId3">
-            <a:extLst>
-              <a:ext uri="{28A0092B-C50C-407E-A947-70E740481C1C}">
-                <a14:useLocalDpi xmlns:a14="http://schemas.microsoft.com/office/drawing/2010/main" val="0"/>
-              </a:ext>
-            </a:extLst>
-          </a:blip>
-          <a:srcRect/>
-          <a:stretch>
-            <a:fillRect/>
-          </a:stretch>
-        </p:blipFill>
-        <p:spPr bwMode="auto">
-          <a:xfrm>
-            <a:off x="239043" y="2762250"/>
-            <a:ext cx="5285457" cy="3603562"/>
-          </a:xfrm>
-          <a:prstGeom prst="rect">
+        </p:nvSpPr>
+        <p:spPr>
+          <a:xfrm>
+            <a:off x="3105918" y="2515125"/>
+            <a:ext cx="97156" cy="152400"/>
+          </a:xfrm>
+          <a:prstGeom prst="downArrow">
             <a:avLst/>
           </a:prstGeom>
-          <a:noFill/>
-          <a:extLst>
-            <a:ext uri="{909E8E84-426E-40DD-AFC4-6F175D3DCCD1}">
-              <a14:hiddenFill xmlns:a14="http://schemas.microsoft.com/office/drawing/2010/main">
-                <a:solidFill>
-                  <a:srgbClr val="FFFFFF"/>
-                </a:solidFill>
-              </a14:hiddenFill>
-            </a:ext>
-          </a:extLst>
-        </p:spPr>
-      </p:pic>
-      <p:pic>
-        <p:nvPicPr>
-          <p:cNvPr id="6" name="Picture 5">
-            <a:extLst>
-              <a:ext uri="{FF2B5EF4-FFF2-40B4-BE49-F238E27FC236}">
-                <a16:creationId xmlns:a16="http://schemas.microsoft.com/office/drawing/2014/main" id="{11F764B2-7000-4924-9B7C-A5098D0BD6FE}"/>
-              </a:ext>
-            </a:extLst>
-          </p:cNvPr>
-          <p:cNvPicPr>
-            <a:picLocks noChangeAspect="1"/>
-          </p:cNvPicPr>
+        </p:spPr>
+        <p:style>
+          <a:lnRef idx="2">
+            <a:schemeClr val="accent1">
+              <a:shade val="50000"/>
+            </a:schemeClr>
+          </a:lnRef>
+          <a:fillRef idx="1">
+            <a:schemeClr val="accent1"/>
+          </a:fillRef>
+          <a:effectRef idx="0">
+            <a:schemeClr val="accent1"/>
+          </a:effectRef>
+          <a:fontRef idx="minor">
+            <a:schemeClr val="lt1"/>
+          </a:fontRef>
+        </p:style>
+        <p:txBody>
+          <a:bodyPr rtlCol="0" anchor="ctr"/>
+          <a:lstStyle/>
+          <a:p>
+            <a:pPr algn="ctr"/>
+            <a:endParaRPr lang="en-US"/>
+          </a:p>
+        </p:txBody>
+      </p:sp>
+      <p:sp>
+        <p:nvSpPr>
+          <p:cNvPr id="11" name="Arrow: Down 10">
+            <a:extLst>
+              <a:ext uri="{FF2B5EF4-FFF2-40B4-BE49-F238E27FC236}">
+                <a16:creationId xmlns:a16="http://schemas.microsoft.com/office/drawing/2014/main" id="{BC974B24-0D4C-42D4-A8BF-824D7D751CA5}"/>
+              </a:ext>
+            </a:extLst>
+          </p:cNvPr>
+          <p:cNvSpPr/>
           <p:nvPr/>
-        </p:nvPicPr>
-        <p:blipFill>
-          <a:blip r:embed="rId4"/>
-          <a:stretch>
-            <a:fillRect/>
-          </a:stretch>
-        </p:blipFill>
-        <p:spPr>
-          <a:xfrm>
-            <a:off x="5524500" y="3010050"/>
-            <a:ext cx="3022825" cy="3038862"/>
-          </a:xfrm>
-          <a:prstGeom prst="rect">
+        </p:nvSpPr>
+        <p:spPr>
+          <a:xfrm>
+            <a:off x="5746832" y="3203476"/>
+            <a:ext cx="97156" cy="265627"/>
+          </a:xfrm>
+          <a:prstGeom prst="downArrow">
             <a:avLst/>
           </a:prstGeom>
         </p:spPr>
-      </p:pic>
-      <p:pic>
-        <p:nvPicPr>
-          <p:cNvPr id="5" name="Picture 4" descr="A close up of a sign&#10;&#10;Description automatically generated">
-            <a:extLst>
-              <a:ext uri="{FF2B5EF4-FFF2-40B4-BE49-F238E27FC236}">
-                <a16:creationId xmlns:a16="http://schemas.microsoft.com/office/drawing/2014/main" id="{F9271491-99A6-4D00-B738-0E34E6686EFF}"/>
-              </a:ext>
-            </a:extLst>
-          </p:cNvPr>
-          <p:cNvPicPr>
-            <a:picLocks noChangeAspect="1"/>
-          </p:cNvPicPr>
-          <p:nvPr/>
-        </p:nvPicPr>
-        <p:blipFill>
-          <a:blip r:embed="rId5">
-            <a:extLst>
-              <a:ext uri="{28A0092B-C50C-407E-A947-70E740481C1C}">
-                <a14:useLocalDpi xmlns:a14="http://schemas.microsoft.com/office/drawing/2010/main" val="0"/>
-              </a:ext>
-            </a:extLst>
-          </a:blip>
-          <a:stretch>
-            <a:fillRect/>
-          </a:stretch>
-        </p:blipFill>
-        <p:spPr>
-          <a:xfrm>
-            <a:off x="7492438" y="6106511"/>
-            <a:ext cx="1153851" cy="414718"/>
-          </a:xfrm>
-          <a:prstGeom prst="rect">
-            <a:avLst/>
-          </a:prstGeom>
-        </p:spPr>
-      </p:pic>
+        <p:style>
+          <a:lnRef idx="2">
+            <a:schemeClr val="accent1">
+              <a:shade val="50000"/>
+            </a:schemeClr>
+          </a:lnRef>
+          <a:fillRef idx="1">
+            <a:schemeClr val="accent1"/>
+          </a:fillRef>
+          <a:effectRef idx="0">
+            <a:schemeClr val="accent1"/>
+          </a:effectRef>
+          <a:fontRef idx="minor">
+            <a:schemeClr val="lt1"/>
+          </a:fontRef>
+        </p:style>
+        <p:txBody>
+          <a:bodyPr rtlCol="0" anchor="ctr"/>
+          <a:lstStyle/>
+          <a:p>
+            <a:pPr algn="ctr"/>
+            <a:endParaRPr lang="en-US"/>
+          </a:p>
+        </p:txBody>
+      </p:sp>
     </p:spTree>
     <p:extLst>
       <p:ext uri="{BB962C8B-B14F-4D97-AF65-F5344CB8AC3E}">
-        <p14:creationId xmlns:p14="http://schemas.microsoft.com/office/powerpoint/2010/main" val="3493497212"/>
+        <p14:creationId xmlns:p14="http://schemas.microsoft.com/office/powerpoint/2010/main" val="4080758490"/>
       </p:ext>
     </p:extLst>
   </p:cSld>
@@ -7672,53 +8183,6 @@
           <a:chExt cx="0" cy="0"/>
         </a:xfrm>
       </p:grpSpPr>
-      <p:pic>
-        <p:nvPicPr>
-          <p:cNvPr id="3076" name="Picture 4">
-            <a:extLst>
-              <a:ext uri="{FF2B5EF4-FFF2-40B4-BE49-F238E27FC236}">
-                <a16:creationId xmlns:a16="http://schemas.microsoft.com/office/drawing/2014/main" id="{FB3D9696-BDF3-41E3-9CD5-EB7CF8C87445}"/>
-              </a:ext>
-            </a:extLst>
-          </p:cNvPr>
-          <p:cNvPicPr>
-            <a:picLocks noChangeAspect="1" noChangeArrowheads="1"/>
-          </p:cNvPicPr>
-          <p:nvPr/>
-        </p:nvPicPr>
-        <p:blipFill>
-          <a:blip r:embed="rId2">
-            <a:extLst>
-              <a:ext uri="{28A0092B-C50C-407E-A947-70E740481C1C}">
-                <a14:useLocalDpi xmlns:a14="http://schemas.microsoft.com/office/drawing/2010/main" val="0"/>
-              </a:ext>
-            </a:extLst>
-          </a:blip>
-          <a:srcRect/>
-          <a:stretch>
-            <a:fillRect/>
-          </a:stretch>
-        </p:blipFill>
-        <p:spPr bwMode="auto">
-          <a:xfrm>
-            <a:off x="574876" y="2561130"/>
-            <a:ext cx="7288418" cy="3590769"/>
-          </a:xfrm>
-          <a:prstGeom prst="rect">
-            <a:avLst/>
-          </a:prstGeom>
-          <a:noFill/>
-          <a:extLst>
-            <a:ext uri="{909E8E84-426E-40DD-AFC4-6F175D3DCCD1}">
-              <a14:hiddenFill xmlns:a14="http://schemas.microsoft.com/office/drawing/2010/main">
-                <a:solidFill>
-                  <a:srgbClr val="FFFFFF"/>
-                </a:solidFill>
-              </a14:hiddenFill>
-            </a:ext>
-          </a:extLst>
-        </p:spPr>
-      </p:pic>
       <p:sp>
         <p:nvSpPr>
           <p:cNvPr id="2" name="Title 1">
@@ -7737,8 +8201,8 @@
         </p:nvSpPr>
         <p:spPr>
           <a:xfrm>
-            <a:off x="552450" y="336771"/>
-            <a:ext cx="7777222" cy="780398"/>
+            <a:off x="497711" y="336771"/>
+            <a:ext cx="7886700" cy="780398"/>
           </a:xfrm>
         </p:spPr>
         <p:txBody>
@@ -7761,42 +8225,6 @@
           </a:p>
         </p:txBody>
       </p:sp>
-      <p:pic>
-        <p:nvPicPr>
-          <p:cNvPr id="5" name="Picture 4" descr="A close up of a sign&#10;&#10;Description automatically generated">
-            <a:extLst>
-              <a:ext uri="{FF2B5EF4-FFF2-40B4-BE49-F238E27FC236}">
-                <a16:creationId xmlns:a16="http://schemas.microsoft.com/office/drawing/2014/main" id="{F9271491-99A6-4D00-B738-0E34E6686EFF}"/>
-              </a:ext>
-            </a:extLst>
-          </p:cNvPr>
-          <p:cNvPicPr>
-            <a:picLocks noChangeAspect="1"/>
-          </p:cNvPicPr>
-          <p:nvPr/>
-        </p:nvPicPr>
-        <p:blipFill>
-          <a:blip r:embed="rId3">
-            <a:extLst>
-              <a:ext uri="{28A0092B-C50C-407E-A947-70E740481C1C}">
-                <a14:useLocalDpi xmlns:a14="http://schemas.microsoft.com/office/drawing/2010/main" val="0"/>
-              </a:ext>
-            </a:extLst>
-          </a:blip>
-          <a:stretch>
-            <a:fillRect/>
-          </a:stretch>
-        </p:blipFill>
-        <p:spPr>
-          <a:xfrm>
-            <a:off x="7492438" y="6106511"/>
-            <a:ext cx="1153851" cy="414718"/>
-          </a:xfrm>
-          <a:prstGeom prst="rect">
-            <a:avLst/>
-          </a:prstGeom>
-        </p:spPr>
-      </p:pic>
       <p:cxnSp>
         <p:nvCxnSpPr>
           <p:cNvPr id="7" name="Straight Connector 6">
@@ -7842,12 +8270,41 @@
           </a:fontRef>
         </p:style>
       </p:cxnSp>
-      <p:sp>
-        <p:nvSpPr>
-          <p:cNvPr id="15" name="TextBox 14">
-            <a:extLst>
-              <a:ext uri="{FF2B5EF4-FFF2-40B4-BE49-F238E27FC236}">
-                <a16:creationId xmlns:a16="http://schemas.microsoft.com/office/drawing/2014/main" id="{303B690A-98D9-4FB5-8EA2-7534E462A6AF}"/>
+      <p:pic>
+        <p:nvPicPr>
+          <p:cNvPr id="9" name="Picture 8">
+            <a:extLst>
+              <a:ext uri="{FF2B5EF4-FFF2-40B4-BE49-F238E27FC236}">
+                <a16:creationId xmlns:a16="http://schemas.microsoft.com/office/drawing/2014/main" id="{1D855B2C-13BC-44FF-8E12-8CAC142FA867}"/>
+              </a:ext>
+            </a:extLst>
+          </p:cNvPr>
+          <p:cNvPicPr>
+            <a:picLocks noChangeAspect="1"/>
+          </p:cNvPicPr>
+          <p:nvPr/>
+        </p:nvPicPr>
+        <p:blipFill rotWithShape="1">
+          <a:blip r:embed="rId2"/>
+          <a:srcRect t="4905" b="7276"/>
+          <a:stretch/>
+        </p:blipFill>
+        <p:spPr>
+          <a:xfrm>
+            <a:off x="574876" y="2170258"/>
+            <a:ext cx="5543550" cy="476793"/>
+          </a:xfrm>
+          <a:prstGeom prst="rect">
+            <a:avLst/>
+          </a:prstGeom>
+        </p:spPr>
+      </p:pic>
+      <p:sp>
+        <p:nvSpPr>
+          <p:cNvPr id="10" name="TextBox 9">
+            <a:extLst>
+              <a:ext uri="{FF2B5EF4-FFF2-40B4-BE49-F238E27FC236}">
+                <a16:creationId xmlns:a16="http://schemas.microsoft.com/office/drawing/2014/main" id="{0555177E-5254-4035-BECD-12641885622F}"/>
               </a:ext>
             </a:extLst>
           </p:cNvPr>
@@ -7856,8 +8313,8 @@
         </p:nvSpPr>
         <p:spPr>
           <a:xfrm>
-            <a:off x="520526" y="1066302"/>
-            <a:ext cx="7869763" cy="1754326"/>
+            <a:off x="493878" y="1073532"/>
+            <a:ext cx="8262997" cy="1200329"/>
           </a:xfrm>
           <a:prstGeom prst="rect">
             <a:avLst/>
@@ -7872,100 +8329,147 @@
           <a:p>
             <a:r>
               <a:rPr lang="en-US" dirty="0"/>
-              <a:t>The distribution of ABV is slightly right-skewed.  The data is concentrated at 0.050.  According to Central Limit Theorem, the sample size is large enough (n =1405), the population of the ABV is normally distributed. The data is significantly different from 0 and the 95 percent confidence interval is (0.059, 0.061).</a:t>
+              <a:t>Below are the summary statistics of ABV for craft beers.  This shows the minimum, maximum, median, and 1</a:t>
+            </a:r>
+            <a:r>
+              <a:rPr lang="en-US" baseline="30000" dirty="0"/>
+              <a:t>st</a:t>
+            </a:r>
+            <a:r>
+              <a:rPr lang="en-US" dirty="0"/>
+              <a:t> &amp; 3</a:t>
+            </a:r>
+            <a:r>
+              <a:rPr lang="en-US" baseline="30000" dirty="0"/>
+              <a:t>rd</a:t>
+            </a:r>
+            <a:r>
+              <a:rPr lang="en-US" dirty="0"/>
+              <a:t> quartiles of the data set.  There are 32 outliers of 0.096 and above.  </a:t>
             </a:r>
           </a:p>
           <a:p>
             <a:endParaRPr lang="en-US" dirty="0"/>
           </a:p>
-          <a:p>
-            <a:endParaRPr lang="en-US" dirty="0"/>
-          </a:p>
-        </p:txBody>
-      </p:sp>
-      <p:sp>
-        <p:nvSpPr>
-          <p:cNvPr id="3" name="Right Brace 2">
-            <a:extLst>
-              <a:ext uri="{FF2B5EF4-FFF2-40B4-BE49-F238E27FC236}">
-                <a16:creationId xmlns:a16="http://schemas.microsoft.com/office/drawing/2014/main" id="{72221DB8-07CA-4ACA-9576-E4BF40499387}"/>
-              </a:ext>
-            </a:extLst>
-          </p:cNvPr>
-          <p:cNvSpPr/>
+        </p:txBody>
+      </p:sp>
+      <p:pic>
+        <p:nvPicPr>
+          <p:cNvPr id="2050" name="Picture 2">
+            <a:extLst>
+              <a:ext uri="{FF2B5EF4-FFF2-40B4-BE49-F238E27FC236}">
+                <a16:creationId xmlns:a16="http://schemas.microsoft.com/office/drawing/2014/main" id="{0F428284-41EC-46CF-BD07-ADFE5DADDC67}"/>
+              </a:ext>
+            </a:extLst>
+          </p:cNvPr>
+          <p:cNvPicPr>
+            <a:picLocks noChangeAspect="1" noChangeArrowheads="1"/>
+          </p:cNvPicPr>
           <p:nvPr/>
-        </p:nvSpPr>
-        <p:spPr>
-          <a:xfrm rot="5400000">
-            <a:off x="6153916" y="4925574"/>
-            <a:ext cx="176214" cy="2276435"/>
-          </a:xfrm>
-          <a:prstGeom prst="rightBrace">
-            <a:avLst/>
-          </a:prstGeom>
-        </p:spPr>
-        <p:style>
-          <a:lnRef idx="1">
-            <a:schemeClr val="accent1"/>
-          </a:lnRef>
-          <a:fillRef idx="0">
-            <a:schemeClr val="accent1"/>
-          </a:fillRef>
-          <a:effectRef idx="0">
-            <a:schemeClr val="accent1"/>
-          </a:effectRef>
-          <a:fontRef idx="minor">
-            <a:schemeClr val="tx1"/>
-          </a:fontRef>
-        </p:style>
-        <p:txBody>
-          <a:bodyPr rtlCol="0" anchor="ctr"/>
-          <a:lstStyle/>
-          <a:p>
-            <a:pPr algn="ctr"/>
-            <a:endParaRPr lang="en-US"/>
-          </a:p>
-        </p:txBody>
-      </p:sp>
-      <p:sp>
-        <p:nvSpPr>
-          <p:cNvPr id="4" name="TextBox 3">
-            <a:extLst>
-              <a:ext uri="{FF2B5EF4-FFF2-40B4-BE49-F238E27FC236}">
-                <a16:creationId xmlns:a16="http://schemas.microsoft.com/office/drawing/2014/main" id="{A7BD6F0B-2C9D-4FFC-9E37-322455463167}"/>
-              </a:ext>
-            </a:extLst>
-          </p:cNvPr>
-          <p:cNvSpPr txBox="1"/>
-          <p:nvPr/>
-        </p:nvSpPr>
-        <p:spPr>
-          <a:xfrm>
-            <a:off x="5801063" y="6151899"/>
-            <a:ext cx="1009651" cy="369332"/>
+        </p:nvPicPr>
+        <p:blipFill>
+          <a:blip r:embed="rId3">
+            <a:extLst>
+              <a:ext uri="{28A0092B-C50C-407E-A947-70E740481C1C}">
+                <a14:useLocalDpi xmlns:a14="http://schemas.microsoft.com/office/drawing/2010/main" val="0"/>
+              </a:ext>
+            </a:extLst>
+          </a:blip>
+          <a:srcRect/>
+          <a:stretch>
+            <a:fillRect/>
+          </a:stretch>
+        </p:blipFill>
+        <p:spPr bwMode="auto">
+          <a:xfrm>
+            <a:off x="239043" y="2762250"/>
+            <a:ext cx="5285457" cy="3603562"/>
           </a:xfrm>
           <a:prstGeom prst="rect">
             <a:avLst/>
           </a:prstGeom>
           <a:noFill/>
-        </p:spPr>
-        <p:txBody>
-          <a:bodyPr wrap="square" rtlCol="0">
-            <a:spAutoFit/>
-          </a:bodyPr>
-          <a:lstStyle/>
-          <a:p>
-            <a:r>
-              <a:rPr lang="en-US" dirty="0"/>
-              <a:t>outliers</a:t>
-            </a:r>
-          </a:p>
-        </p:txBody>
-      </p:sp>
+          <a:extLst>
+            <a:ext uri="{909E8E84-426E-40DD-AFC4-6F175D3DCCD1}">
+              <a14:hiddenFill xmlns:a14="http://schemas.microsoft.com/office/drawing/2010/main">
+                <a:solidFill>
+                  <a:srgbClr val="FFFFFF"/>
+                </a:solidFill>
+              </a14:hiddenFill>
+            </a:ext>
+          </a:extLst>
+        </p:spPr>
+      </p:pic>
+      <p:pic>
+        <p:nvPicPr>
+          <p:cNvPr id="6" name="Picture 5">
+            <a:extLst>
+              <a:ext uri="{FF2B5EF4-FFF2-40B4-BE49-F238E27FC236}">
+                <a16:creationId xmlns:a16="http://schemas.microsoft.com/office/drawing/2014/main" id="{11F764B2-7000-4924-9B7C-A5098D0BD6FE}"/>
+              </a:ext>
+            </a:extLst>
+          </p:cNvPr>
+          <p:cNvPicPr>
+            <a:picLocks noChangeAspect="1"/>
+          </p:cNvPicPr>
+          <p:nvPr/>
+        </p:nvPicPr>
+        <p:blipFill>
+          <a:blip r:embed="rId4"/>
+          <a:stretch>
+            <a:fillRect/>
+          </a:stretch>
+        </p:blipFill>
+        <p:spPr>
+          <a:xfrm>
+            <a:off x="5524500" y="3010050"/>
+            <a:ext cx="3022825" cy="3038862"/>
+          </a:xfrm>
+          <a:prstGeom prst="rect">
+            <a:avLst/>
+          </a:prstGeom>
+        </p:spPr>
+      </p:pic>
+      <p:pic>
+        <p:nvPicPr>
+          <p:cNvPr id="5" name="Picture 4" descr="A close up of a sign&#10;&#10;Description automatically generated">
+            <a:extLst>
+              <a:ext uri="{FF2B5EF4-FFF2-40B4-BE49-F238E27FC236}">
+                <a16:creationId xmlns:a16="http://schemas.microsoft.com/office/drawing/2014/main" id="{F9271491-99A6-4D00-B738-0E34E6686EFF}"/>
+              </a:ext>
+            </a:extLst>
+          </p:cNvPr>
+          <p:cNvPicPr>
+            <a:picLocks noChangeAspect="1"/>
+          </p:cNvPicPr>
+          <p:nvPr/>
+        </p:nvPicPr>
+        <p:blipFill>
+          <a:blip r:embed="rId5">
+            <a:extLst>
+              <a:ext uri="{28A0092B-C50C-407E-A947-70E740481C1C}">
+                <a14:useLocalDpi xmlns:a14="http://schemas.microsoft.com/office/drawing/2010/main" val="0"/>
+              </a:ext>
+            </a:extLst>
+          </a:blip>
+          <a:stretch>
+            <a:fillRect/>
+          </a:stretch>
+        </p:blipFill>
+        <p:spPr>
+          <a:xfrm>
+            <a:off x="7492438" y="6106511"/>
+            <a:ext cx="1153851" cy="414718"/>
+          </a:xfrm>
+          <a:prstGeom prst="rect">
+            <a:avLst/>
+          </a:prstGeom>
+        </p:spPr>
+      </p:pic>
     </p:spTree>
     <p:extLst>
       <p:ext uri="{BB962C8B-B14F-4D97-AF65-F5344CB8AC3E}">
-        <p14:creationId xmlns:p14="http://schemas.microsoft.com/office/powerpoint/2010/main" val="2944746457"/>
+        <p14:creationId xmlns:p14="http://schemas.microsoft.com/office/powerpoint/2010/main" val="3493497212"/>
       </p:ext>
     </p:extLst>
   </p:cSld>
@@ -7992,6 +8496,53 @@
           <a:chExt cx="0" cy="0"/>
         </a:xfrm>
       </p:grpSpPr>
+      <p:pic>
+        <p:nvPicPr>
+          <p:cNvPr id="3076" name="Picture 4">
+            <a:extLst>
+              <a:ext uri="{FF2B5EF4-FFF2-40B4-BE49-F238E27FC236}">
+                <a16:creationId xmlns:a16="http://schemas.microsoft.com/office/drawing/2014/main" id="{FB3D9696-BDF3-41E3-9CD5-EB7CF8C87445}"/>
+              </a:ext>
+            </a:extLst>
+          </p:cNvPr>
+          <p:cNvPicPr>
+            <a:picLocks noChangeAspect="1" noChangeArrowheads="1"/>
+          </p:cNvPicPr>
+          <p:nvPr/>
+        </p:nvPicPr>
+        <p:blipFill>
+          <a:blip r:embed="rId2">
+            <a:extLst>
+              <a:ext uri="{28A0092B-C50C-407E-A947-70E740481C1C}">
+                <a14:useLocalDpi xmlns:a14="http://schemas.microsoft.com/office/drawing/2010/main" val="0"/>
+              </a:ext>
+            </a:extLst>
+          </a:blip>
+          <a:srcRect/>
+          <a:stretch>
+            <a:fillRect/>
+          </a:stretch>
+        </p:blipFill>
+        <p:spPr bwMode="auto">
+          <a:xfrm>
+            <a:off x="574876" y="2561130"/>
+            <a:ext cx="7288418" cy="3590769"/>
+          </a:xfrm>
+          <a:prstGeom prst="rect">
+            <a:avLst/>
+          </a:prstGeom>
+          <a:noFill/>
+          <a:extLst>
+            <a:ext uri="{909E8E84-426E-40DD-AFC4-6F175D3DCCD1}">
+              <a14:hiddenFill xmlns:a14="http://schemas.microsoft.com/office/drawing/2010/main">
+                <a:solidFill>
+                  <a:srgbClr val="FFFFFF"/>
+                </a:solidFill>
+              </a14:hiddenFill>
+            </a:ext>
+          </a:extLst>
+        </p:spPr>
+      </p:pic>
       <p:sp>
         <p:nvSpPr>
           <p:cNvPr id="2" name="Title 1">
@@ -8010,18 +8561,18 @@
         </p:nvSpPr>
         <p:spPr>
           <a:xfrm>
-            <a:off x="497711" y="336771"/>
-            <a:ext cx="7886700" cy="780398"/>
+            <a:off x="552450" y="336771"/>
+            <a:ext cx="7777222" cy="780398"/>
           </a:xfrm>
         </p:spPr>
         <p:txBody>
           <a:bodyPr>
-            <a:normAutofit/>
+            <a:normAutofit fontScale="90000"/>
           </a:bodyPr>
           <a:lstStyle/>
           <a:p>
             <a:r>
-              <a:rPr lang="en-US" sz="2200" dirty="0">
+              <a:rPr lang="en-US" sz="2800" dirty="0">
                 <a:solidFill>
                   <a:schemeClr val="tx1">
                     <a:lumMod val="65000"/>
@@ -8029,7 +8580,7 @@
                   </a:schemeClr>
                 </a:solidFill>
               </a:rPr>
-              <a:t>Is there a relationship between bitterness and alcohol content?</a:t>
+              <a:t>What are the summary statistics and distribution of ABV?</a:t>
             </a:r>
           </a:p>
         </p:txBody>
@@ -8049,7 +8600,7 @@
           <p:nvPr/>
         </p:nvPicPr>
         <p:blipFill>
-          <a:blip r:embed="rId2">
+          <a:blip r:embed="rId3">
             <a:extLst>
               <a:ext uri="{28A0092B-C50C-407E-A947-70E740481C1C}">
                 <a14:useLocalDpi xmlns:a14="http://schemas.microsoft.com/office/drawing/2010/main" val="0"/>
@@ -8117,89 +8668,128 @@
       </p:cxnSp>
       <p:sp>
         <p:nvSpPr>
-          <p:cNvPr id="11" name="Rectangle 10">
-            <a:extLst>
-              <a:ext uri="{FF2B5EF4-FFF2-40B4-BE49-F238E27FC236}">
-                <a16:creationId xmlns:a16="http://schemas.microsoft.com/office/drawing/2014/main" id="{2AE95AC1-8A01-4FA3-B041-99AA7191AB8F}"/>
-              </a:ext>
-            </a:extLst>
-          </p:cNvPr>
-          <p:cNvSpPr/>
+          <p:cNvPr id="15" name="TextBox 14">
+            <a:extLst>
+              <a:ext uri="{FF2B5EF4-FFF2-40B4-BE49-F238E27FC236}">
+                <a16:creationId xmlns:a16="http://schemas.microsoft.com/office/drawing/2014/main" id="{303B690A-98D9-4FB5-8EA2-7534E462A6AF}"/>
+              </a:ext>
+            </a:extLst>
+          </p:cNvPr>
+          <p:cNvSpPr txBox="1"/>
           <p:nvPr/>
         </p:nvSpPr>
         <p:spPr>
           <a:xfrm>
-            <a:off x="474050" y="1023088"/>
-            <a:ext cx="8273064" cy="1200329"/>
-          </a:xfrm>
-          <a:prstGeom prst="rect">
-            <a:avLst/>
-          </a:prstGeom>
-        </p:spPr>
-        <p:txBody>
-          <a:bodyPr wrap="square">
-            <a:spAutoFit/>
-          </a:bodyPr>
-          <a:lstStyle/>
-          <a:p>
-            <a:r>
-              <a:rPr lang="en-US" dirty="0"/>
-              <a:t>Higher ABV values are associated with higher IBUs and vice versa.  With p-value &lt; 2.2e-16, there is sufficient evidence at alpha = .05 level of significance to suggest that the data is linearly correlated. Correlation estimate = 0.67 suggests that the relationship between IBU and ABV is positive and strong.</a:t>
-            </a:r>
-          </a:p>
-        </p:txBody>
-      </p:sp>
-      <p:pic>
-        <p:nvPicPr>
-          <p:cNvPr id="1030" name="Picture 6">
-            <a:extLst>
-              <a:ext uri="{FF2B5EF4-FFF2-40B4-BE49-F238E27FC236}">
-                <a16:creationId xmlns:a16="http://schemas.microsoft.com/office/drawing/2014/main" id="{09DA59E7-3E7F-4F8B-A3D5-9260C6A4833F}"/>
-              </a:ext>
-            </a:extLst>
-          </p:cNvPr>
-          <p:cNvPicPr>
-            <a:picLocks noChangeAspect="1" noChangeArrowheads="1"/>
-          </p:cNvPicPr>
-          <p:nvPr/>
-        </p:nvPicPr>
-        <p:blipFill>
-          <a:blip r:embed="rId3">
-            <a:extLst>
-              <a:ext uri="{28A0092B-C50C-407E-A947-70E740481C1C}">
-                <a14:useLocalDpi xmlns:a14="http://schemas.microsoft.com/office/drawing/2010/main" val="0"/>
-              </a:ext>
-            </a:extLst>
-          </a:blip>
-          <a:srcRect/>
-          <a:stretch>
-            <a:fillRect/>
-          </a:stretch>
-        </p:blipFill>
-        <p:spPr bwMode="auto">
-          <a:xfrm>
-            <a:off x="667232" y="2409386"/>
-            <a:ext cx="7382550" cy="3691275"/>
+            <a:off x="520526" y="1066302"/>
+            <a:ext cx="7869763" cy="1754326"/>
           </a:xfrm>
           <a:prstGeom prst="rect">
             <a:avLst/>
           </a:prstGeom>
           <a:noFill/>
-          <a:extLst>
-            <a:ext uri="{909E8E84-426E-40DD-AFC4-6F175D3DCCD1}">
-              <a14:hiddenFill xmlns:a14="http://schemas.microsoft.com/office/drawing/2010/main">
-                <a:solidFill>
-                  <a:srgbClr val="FFFFFF"/>
-                </a:solidFill>
-              </a14:hiddenFill>
-            </a:ext>
-          </a:extLst>
-        </p:spPr>
-      </p:pic>
+        </p:spPr>
+        <p:txBody>
+          <a:bodyPr wrap="square" rtlCol="0">
+            <a:spAutoFit/>
+          </a:bodyPr>
+          <a:lstStyle/>
+          <a:p>
+            <a:r>
+              <a:rPr lang="en-US" dirty="0"/>
+              <a:t>The distribution of ABV is slightly right-skewed.  The data is concentrated at 0.050.  According to Central Limit Theorem, the sample size is large enough (n =1405), the population of the ABV is normally distributed. The data is significantly different from 0 and the 95 percent confidence interval is (0.059, 0.061).</a:t>
+            </a:r>
+          </a:p>
+          <a:p>
+            <a:endParaRPr lang="en-US" dirty="0"/>
+          </a:p>
+          <a:p>
+            <a:endParaRPr lang="en-US" dirty="0"/>
+          </a:p>
+        </p:txBody>
+      </p:sp>
+      <p:sp>
+        <p:nvSpPr>
+          <p:cNvPr id="3" name="Right Brace 2">
+            <a:extLst>
+              <a:ext uri="{FF2B5EF4-FFF2-40B4-BE49-F238E27FC236}">
+                <a16:creationId xmlns:a16="http://schemas.microsoft.com/office/drawing/2014/main" id="{72221DB8-07CA-4ACA-9576-E4BF40499387}"/>
+              </a:ext>
+            </a:extLst>
+          </p:cNvPr>
+          <p:cNvSpPr/>
+          <p:nvPr/>
+        </p:nvSpPr>
+        <p:spPr>
+          <a:xfrm rot="5400000">
+            <a:off x="6153916" y="4925574"/>
+            <a:ext cx="176214" cy="2276435"/>
+          </a:xfrm>
+          <a:prstGeom prst="rightBrace">
+            <a:avLst/>
+          </a:prstGeom>
+        </p:spPr>
+        <p:style>
+          <a:lnRef idx="1">
+            <a:schemeClr val="accent1"/>
+          </a:lnRef>
+          <a:fillRef idx="0">
+            <a:schemeClr val="accent1"/>
+          </a:fillRef>
+          <a:effectRef idx="0">
+            <a:schemeClr val="accent1"/>
+          </a:effectRef>
+          <a:fontRef idx="minor">
+            <a:schemeClr val="tx1"/>
+          </a:fontRef>
+        </p:style>
+        <p:txBody>
+          <a:bodyPr rtlCol="0" anchor="ctr"/>
+          <a:lstStyle/>
+          <a:p>
+            <a:pPr algn="ctr"/>
+            <a:endParaRPr lang="en-US"/>
+          </a:p>
+        </p:txBody>
+      </p:sp>
+      <p:sp>
+        <p:nvSpPr>
+          <p:cNvPr id="4" name="TextBox 3">
+            <a:extLst>
+              <a:ext uri="{FF2B5EF4-FFF2-40B4-BE49-F238E27FC236}">
+                <a16:creationId xmlns:a16="http://schemas.microsoft.com/office/drawing/2014/main" id="{A7BD6F0B-2C9D-4FFC-9E37-322455463167}"/>
+              </a:ext>
+            </a:extLst>
+          </p:cNvPr>
+          <p:cNvSpPr txBox="1"/>
+          <p:nvPr/>
+        </p:nvSpPr>
+        <p:spPr>
+          <a:xfrm>
+            <a:off x="5801063" y="6151899"/>
+            <a:ext cx="1009651" cy="369332"/>
+          </a:xfrm>
+          <a:prstGeom prst="rect">
+            <a:avLst/>
+          </a:prstGeom>
+          <a:noFill/>
+        </p:spPr>
+        <p:txBody>
+          <a:bodyPr wrap="square" rtlCol="0">
+            <a:spAutoFit/>
+          </a:bodyPr>
+          <a:lstStyle/>
+          <a:p>
+            <a:r>
+              <a:rPr lang="en-US" dirty="0"/>
+              <a:t>outliers</a:t>
+            </a:r>
+          </a:p>
+        </p:txBody>
+      </p:sp>
     </p:spTree>
     <p:extLst>
       <p:ext uri="{BB962C8B-B14F-4D97-AF65-F5344CB8AC3E}">
-        <p14:creationId xmlns:p14="http://schemas.microsoft.com/office/powerpoint/2010/main" val="2887043045"/>
+        <p14:creationId xmlns:p14="http://schemas.microsoft.com/office/powerpoint/2010/main" val="2944746457"/>
       </p:ext>
     </p:extLst>
   </p:cSld>

</xml_diff>